<commit_message>
Added CJ to presentation
</commit_message>
<xml_diff>
--- a/Presentation.pptx
+++ b/Presentation.pptx
@@ -11,6 +11,7 @@
     <p:sldId id="259" r:id="rId5"/>
     <p:sldId id="260" r:id="rId6"/>
     <p:sldId id="261" r:id="rId7"/>
+    <p:sldId id="263" r:id="rId8"/>
   </p:sldIdLst>
   <p:sldSz cx="12192000" cy="6858000"/>
   <p:notesSz cx="6858000" cy="9144000"/>
@@ -109,6 +110,11 @@
       </a:defRPr>
     </a:lvl9pPr>
   </p:defaultTextStyle>
+  <p:extLst>
+    <p:ext uri="{EFAFB233-063F-42B5-8137-9DF3F51BA10A}">
+      <p15:sldGuideLst xmlns:p15="http://schemas.microsoft.com/office/powerpoint/2012/main"/>
+    </p:ext>
+  </p:extLst>
 </p:presentation>
 </file>
 
@@ -857,7 +863,7 @@
           <a:p>
             <a:fld id="{C02C31D5-3281-4246-B14E-A29AB474AA1B}" type="datetimeFigureOut">
               <a:rPr lang="it-IT" smtClean="0"/>
-              <a:t>30/03/2019</a:t>
+              <a:t>02/04/2019</a:t>
             </a:fld>
             <a:endParaRPr lang="it-IT"/>
           </a:p>
@@ -1108,7 +1114,7 @@
           <a:p>
             <a:fld id="{C02C31D5-3281-4246-B14E-A29AB474AA1B}" type="datetimeFigureOut">
               <a:rPr lang="it-IT" smtClean="0"/>
-              <a:t>30/03/2019</a:t>
+              <a:t>02/04/2019</a:t>
             </a:fld>
             <a:endParaRPr lang="it-IT"/>
           </a:p>
@@ -1422,7 +1428,7 @@
           <a:p>
             <a:fld id="{C02C31D5-3281-4246-B14E-A29AB474AA1B}" type="datetimeFigureOut">
               <a:rPr lang="it-IT" smtClean="0"/>
-              <a:t>30/03/2019</a:t>
+              <a:t>02/04/2019</a:t>
             </a:fld>
             <a:endParaRPr lang="it-IT"/>
           </a:p>
@@ -1755,7 +1761,7 @@
           <a:p>
             <a:fld id="{C02C31D5-3281-4246-B14E-A29AB474AA1B}" type="datetimeFigureOut">
               <a:rPr lang="it-IT" smtClean="0"/>
-              <a:t>30/03/2019</a:t>
+              <a:t>02/04/2019</a:t>
             </a:fld>
             <a:endParaRPr lang="it-IT"/>
           </a:p>
@@ -2069,7 +2075,7 @@
           <a:p>
             <a:fld id="{C02C31D5-3281-4246-B14E-A29AB474AA1B}" type="datetimeFigureOut">
               <a:rPr lang="it-IT" smtClean="0"/>
-              <a:t>30/03/2019</a:t>
+              <a:t>02/04/2019</a:t>
             </a:fld>
             <a:endParaRPr lang="it-IT"/>
           </a:p>
@@ -2462,7 +2468,7 @@
           <a:p>
             <a:fld id="{C02C31D5-3281-4246-B14E-A29AB474AA1B}" type="datetimeFigureOut">
               <a:rPr lang="it-IT" smtClean="0"/>
-              <a:t>30/03/2019</a:t>
+              <a:t>02/04/2019</a:t>
             </a:fld>
             <a:endParaRPr lang="it-IT"/>
           </a:p>
@@ -2632,7 +2638,7 @@
           <a:p>
             <a:fld id="{C02C31D5-3281-4246-B14E-A29AB474AA1B}" type="datetimeFigureOut">
               <a:rPr lang="it-IT" smtClean="0"/>
-              <a:t>30/03/2019</a:t>
+              <a:t>02/04/2019</a:t>
             </a:fld>
             <a:endParaRPr lang="it-IT"/>
           </a:p>
@@ -2812,7 +2818,7 @@
           <a:p>
             <a:fld id="{C02C31D5-3281-4246-B14E-A29AB474AA1B}" type="datetimeFigureOut">
               <a:rPr lang="it-IT" smtClean="0"/>
-              <a:t>30/03/2019</a:t>
+              <a:t>02/04/2019</a:t>
             </a:fld>
             <a:endParaRPr lang="it-IT"/>
           </a:p>
@@ -2982,7 +2988,7 @@
           <a:p>
             <a:fld id="{C02C31D5-3281-4246-B14E-A29AB474AA1B}" type="datetimeFigureOut">
               <a:rPr lang="it-IT" smtClean="0"/>
-              <a:t>30/03/2019</a:t>
+              <a:t>02/04/2019</a:t>
             </a:fld>
             <a:endParaRPr lang="it-IT"/>
           </a:p>
@@ -3229,7 +3235,7 @@
           <a:p>
             <a:fld id="{C02C31D5-3281-4246-B14E-A29AB474AA1B}" type="datetimeFigureOut">
               <a:rPr lang="it-IT" smtClean="0"/>
-              <a:t>30/03/2019</a:t>
+              <a:t>02/04/2019</a:t>
             </a:fld>
             <a:endParaRPr lang="it-IT"/>
           </a:p>
@@ -3461,7 +3467,7 @@
           <a:p>
             <a:fld id="{C02C31D5-3281-4246-B14E-A29AB474AA1B}" type="datetimeFigureOut">
               <a:rPr lang="it-IT" smtClean="0"/>
-              <a:t>30/03/2019</a:t>
+              <a:t>02/04/2019</a:t>
             </a:fld>
             <a:endParaRPr lang="it-IT"/>
           </a:p>
@@ -3835,7 +3841,7 @@
           <a:p>
             <a:fld id="{C02C31D5-3281-4246-B14E-A29AB474AA1B}" type="datetimeFigureOut">
               <a:rPr lang="it-IT" smtClean="0"/>
-              <a:t>30/03/2019</a:t>
+              <a:t>02/04/2019</a:t>
             </a:fld>
             <a:endParaRPr lang="it-IT"/>
           </a:p>
@@ -3958,7 +3964,7 @@
           <a:p>
             <a:fld id="{C02C31D5-3281-4246-B14E-A29AB474AA1B}" type="datetimeFigureOut">
               <a:rPr lang="it-IT" smtClean="0"/>
-              <a:t>30/03/2019</a:t>
+              <a:t>02/04/2019</a:t>
             </a:fld>
             <a:endParaRPr lang="it-IT"/>
           </a:p>
@@ -4053,7 +4059,7 @@
           <a:p>
             <a:fld id="{C02C31D5-3281-4246-B14E-A29AB474AA1B}" type="datetimeFigureOut">
               <a:rPr lang="it-IT" smtClean="0"/>
-              <a:t>30/03/2019</a:t>
+              <a:t>02/04/2019</a:t>
             </a:fld>
             <a:endParaRPr lang="it-IT"/>
           </a:p>
@@ -4308,7 +4314,7 @@
           <a:p>
             <a:fld id="{C02C31D5-3281-4246-B14E-A29AB474AA1B}" type="datetimeFigureOut">
               <a:rPr lang="it-IT" smtClean="0"/>
-              <a:t>30/03/2019</a:t>
+              <a:t>02/04/2019</a:t>
             </a:fld>
             <a:endParaRPr lang="it-IT"/>
           </a:p>
@@ -4613,7 +4619,7 @@
           <a:p>
             <a:fld id="{C02C31D5-3281-4246-B14E-A29AB474AA1B}" type="datetimeFigureOut">
               <a:rPr lang="it-IT" smtClean="0"/>
-              <a:t>30/03/2019</a:t>
+              <a:t>02/04/2019</a:t>
             </a:fld>
             <a:endParaRPr lang="it-IT"/>
           </a:p>
@@ -5315,7 +5321,7 @@
           <a:p>
             <a:fld id="{C02C31D5-3281-4246-B14E-A29AB474AA1B}" type="datetimeFigureOut">
               <a:rPr lang="it-IT" smtClean="0"/>
-              <a:t>30/03/2019</a:t>
+              <a:t>02/04/2019</a:t>
             </a:fld>
             <a:endParaRPr lang="it-IT"/>
           </a:p>
@@ -6634,7 +6640,7 @@
         </p:spPr>
         <p:txBody>
           <a:bodyPr>
-            <a:normAutofit/>
+            <a:normAutofit lnSpcReduction="10000"/>
           </a:bodyPr>
           <a:lstStyle/>
           <a:p>
@@ -6679,11 +6685,25 @@
             </a:br>
             <a:r>
               <a:rPr lang="it-IT" dirty="0"/>
-              <a:t>Wakes up early with his wife and helps her in the shop, then head out for the deliveries while she takes the kids to school, he then takes them back home for lunch and helps them with their homework until dinner. When the kids are in bed he </a:t>
+              <a:t>Wakes up early with his wife and helps her in the shop, </a:t>
+            </a:r>
+            <a:br>
+              <a:rPr lang="it-IT" dirty="0"/>
+            </a:br>
+            <a:r>
+              <a:rPr lang="it-IT" dirty="0"/>
+              <a:t>then head out for the deliveries while she takes the kids to school, he then takes them back home for lunch and helps them with their homework until dinner. </a:t>
+            </a:r>
+            <a:br>
+              <a:rPr lang="it-IT" dirty="0"/>
+            </a:br>
+            <a:r>
+              <a:rPr lang="it-IT" dirty="0"/>
+              <a:t>When the kids are in bed he </a:t>
             </a:r>
             <a:r>
               <a:rPr lang="en-US" dirty="0"/>
-              <a:t>enjoys some classical music dreaming of his next fishing trip during the weekend.</a:t>
+              <a:t>enjoys some classical music while dreaming of his next fishing trip during the weekend.</a:t>
             </a:r>
           </a:p>
         </p:txBody>
@@ -7083,14 +7103,14 @@
             <p:ph idx="1"/>
             <p:extLst>
               <p:ext uri="{D42A27DB-BD31-4B8C-83A1-F6EECF244321}">
-                <p14:modId xmlns:p14="http://schemas.microsoft.com/office/powerpoint/2010/main" val="806173093"/>
+                <p14:modId xmlns:p14="http://schemas.microsoft.com/office/powerpoint/2010/main" val="3029262654"/>
               </p:ext>
             </p:extLst>
           </p:nvPr>
         </p:nvGraphicFramePr>
         <p:xfrm>
           <a:off x="372862" y="1100831"/>
-          <a:ext cx="10536366" cy="4617714"/>
+          <a:ext cx="9048229" cy="4824422"/>
         </p:xfrm>
         <a:graphic>
           <a:graphicData uri="http://schemas.openxmlformats.org/drawingml/2006/table">
@@ -7099,21 +7119,21 @@
                 <a:tableStyleId>{5C22544A-7EE6-4342-B048-85BDC9FD1C3A}</a:tableStyleId>
               </a:tblPr>
               <a:tblGrid>
-                <a:gridCol w="2598230">
+                <a:gridCol w="2231261">
                   <a:extLst>
                     <a:ext uri="{9D8B030D-6E8A-4147-A177-3AD203B41FA5}">
                       <a16:colId xmlns:a16="http://schemas.microsoft.com/office/drawing/2014/main" val="1782712679"/>
                     </a:ext>
                   </a:extLst>
                 </a:gridCol>
-                <a:gridCol w="3956368">
+                <a:gridCol w="3397578">
                   <a:extLst>
                     <a:ext uri="{9D8B030D-6E8A-4147-A177-3AD203B41FA5}">
                       <a16:colId xmlns:a16="http://schemas.microsoft.com/office/drawing/2014/main" val="3887935808"/>
                     </a:ext>
                   </a:extLst>
                 </a:gridCol>
-                <a:gridCol w="3981768">
+                <a:gridCol w="3419390">
                   <a:extLst>
                     <a:ext uri="{9D8B030D-6E8A-4147-A177-3AD203B41FA5}">
                       <a16:colId xmlns:a16="http://schemas.microsoft.com/office/drawing/2014/main" val="3492877072"/>
@@ -7286,7 +7306,38 @@
                       </a:r>
                     </a:p>
                   </a:txBody>
-                  <a:tcPr/>
+                  <a:tcPr>
+                    <a:gradFill>
+                      <a:gsLst>
+                        <a:gs pos="0">
+                          <a:schemeClr val="accent1">
+                            <a:lumMod val="5000"/>
+                            <a:lumOff val="95000"/>
+                            <a:alpha val="25000"/>
+                          </a:schemeClr>
+                        </a:gs>
+                        <a:gs pos="74000">
+                          <a:schemeClr val="accent1">
+                            <a:lumMod val="45000"/>
+                            <a:lumOff val="55000"/>
+                          </a:schemeClr>
+                        </a:gs>
+                        <a:gs pos="83000">
+                          <a:schemeClr val="accent1">
+                            <a:lumMod val="45000"/>
+                            <a:lumOff val="55000"/>
+                          </a:schemeClr>
+                        </a:gs>
+                        <a:gs pos="100000">
+                          <a:schemeClr val="accent1">
+                            <a:lumMod val="30000"/>
+                            <a:lumOff val="70000"/>
+                          </a:schemeClr>
+                        </a:gs>
+                      </a:gsLst>
+                      <a:lin ang="10800000" scaled="0"/>
+                    </a:gradFill>
+                  </a:tcPr>
                 </a:tc>
                 <a:tc>
                   <a:txBody>
@@ -7327,7 +7378,38 @@
                       <a:endParaRPr lang="it-IT" sz="1400" dirty="0"/>
                     </a:p>
                   </a:txBody>
-                  <a:tcPr/>
+                  <a:tcPr>
+                    <a:gradFill>
+                      <a:gsLst>
+                        <a:gs pos="0">
+                          <a:schemeClr val="accent1">
+                            <a:lumMod val="5000"/>
+                            <a:lumOff val="95000"/>
+                            <a:alpha val="25000"/>
+                          </a:schemeClr>
+                        </a:gs>
+                        <a:gs pos="74000">
+                          <a:schemeClr val="accent1">
+                            <a:lumMod val="45000"/>
+                            <a:lumOff val="55000"/>
+                          </a:schemeClr>
+                        </a:gs>
+                        <a:gs pos="83000">
+                          <a:schemeClr val="accent1">
+                            <a:lumMod val="45000"/>
+                            <a:lumOff val="55000"/>
+                          </a:schemeClr>
+                        </a:gs>
+                        <a:gs pos="100000">
+                          <a:schemeClr val="accent1">
+                            <a:lumMod val="30000"/>
+                            <a:lumOff val="70000"/>
+                          </a:schemeClr>
+                        </a:gs>
+                      </a:gsLst>
+                      <a:lin ang="10800000" scaled="0"/>
+                    </a:gradFill>
+                  </a:tcPr>
                 </a:tc>
                 <a:tc>
                   <a:txBody>
@@ -7376,7 +7458,38 @@
                       </a:r>
                     </a:p>
                   </a:txBody>
-                  <a:tcPr/>
+                  <a:tcPr>
+                    <a:gradFill>
+                      <a:gsLst>
+                        <a:gs pos="0">
+                          <a:schemeClr val="accent1">
+                            <a:lumMod val="5000"/>
+                            <a:lumOff val="95000"/>
+                            <a:alpha val="25000"/>
+                          </a:schemeClr>
+                        </a:gs>
+                        <a:gs pos="74000">
+                          <a:schemeClr val="accent1">
+                            <a:lumMod val="45000"/>
+                            <a:lumOff val="55000"/>
+                          </a:schemeClr>
+                        </a:gs>
+                        <a:gs pos="83000">
+                          <a:schemeClr val="accent1">
+                            <a:lumMod val="45000"/>
+                            <a:lumOff val="55000"/>
+                          </a:schemeClr>
+                        </a:gs>
+                        <a:gs pos="100000">
+                          <a:schemeClr val="accent1">
+                            <a:lumMod val="30000"/>
+                            <a:lumOff val="70000"/>
+                          </a:schemeClr>
+                        </a:gs>
+                      </a:gsLst>
+                      <a:lin ang="10800000" scaled="0"/>
+                    </a:gradFill>
+                  </a:tcPr>
                 </a:tc>
                 <a:extLst>
                   <a:ext uri="{0D108BD9-81ED-4DB2-BD59-A6C34878D82A}">
@@ -7416,7 +7529,7 @@
         </p:blipFill>
         <p:spPr>
           <a:xfrm>
-            <a:off x="4234997" y="1136343"/>
+            <a:off x="3856927" y="1162209"/>
             <a:ext cx="1118741" cy="991792"/>
           </a:xfrm>
           <a:prstGeom prst="rect">
@@ -7452,7 +7565,7 @@
         </p:blipFill>
         <p:spPr>
           <a:xfrm>
-            <a:off x="906605" y="1155621"/>
+            <a:off x="897369" y="1155621"/>
             <a:ext cx="1118741" cy="979863"/>
           </a:xfrm>
           <a:prstGeom prst="rect">
@@ -7488,7 +7601,7 @@
         </p:blipFill>
         <p:spPr>
           <a:xfrm>
-            <a:off x="8466908" y="1161780"/>
+            <a:off x="7233278" y="1159566"/>
             <a:ext cx="1118741" cy="1015595"/>
           </a:xfrm>
           <a:prstGeom prst="rect">
@@ -7576,14 +7689,14 @@
             <p:ph idx="1"/>
             <p:extLst>
               <p:ext uri="{D42A27DB-BD31-4B8C-83A1-F6EECF244321}">
-                <p14:modId xmlns:p14="http://schemas.microsoft.com/office/powerpoint/2010/main" val="2719998420"/>
+                <p14:modId xmlns:p14="http://schemas.microsoft.com/office/powerpoint/2010/main" val="1456152449"/>
               </p:ext>
             </p:extLst>
           </p:nvPr>
         </p:nvGraphicFramePr>
         <p:xfrm>
-          <a:off x="372862" y="1100831"/>
-          <a:ext cx="9925235" cy="5647750"/>
+          <a:off x="461818" y="1100832"/>
+          <a:ext cx="8691418" cy="5188802"/>
         </p:xfrm>
         <a:graphic>
           <a:graphicData uri="http://schemas.openxmlformats.org/drawingml/2006/table">
@@ -7592,21 +7705,21 @@
                 <a:tableStyleId>{5C22544A-7EE6-4342-B048-85BDC9FD1C3A}</a:tableStyleId>
               </a:tblPr>
               <a:tblGrid>
-                <a:gridCol w="3037205">
+                <a:gridCol w="2659647">
                   <a:extLst>
                     <a:ext uri="{9D8B030D-6E8A-4147-A177-3AD203B41FA5}">
                       <a16:colId xmlns:a16="http://schemas.microsoft.com/office/drawing/2014/main" val="3753530928"/>
                     </a:ext>
                   </a:extLst>
                 </a:gridCol>
-                <a:gridCol w="3209989">
+                <a:gridCol w="2845226">
                   <a:extLst>
                     <a:ext uri="{9D8B030D-6E8A-4147-A177-3AD203B41FA5}">
                       <a16:colId xmlns:a16="http://schemas.microsoft.com/office/drawing/2014/main" val="3718621616"/>
                     </a:ext>
                   </a:extLst>
                 </a:gridCol>
-                <a:gridCol w="3678041">
+                <a:gridCol w="3186545">
                   <a:extLst>
                     <a:ext uri="{9D8B030D-6E8A-4147-A177-3AD203B41FA5}">
                       <a16:colId xmlns:a16="http://schemas.microsoft.com/office/drawing/2014/main" val="4046599296"/>
@@ -7614,7 +7727,7 @@
                   </a:extLst>
                 </a:gridCol>
               </a:tblGrid>
-              <a:tr h="1118586">
+              <a:tr h="1152841">
                 <a:tc>
                   <a:txBody>
                     <a:bodyPr/>
@@ -7657,7 +7770,7 @@
                   </a:ext>
                 </a:extLst>
               </a:tr>
-              <a:tr h="4529164">
+              <a:tr h="4035961">
                 <a:tc>
                   <a:txBody>
                     <a:bodyPr/>
@@ -7680,13 +7793,7 @@
                     <a:p>
                       <a:r>
                         <a:rPr lang="it-IT" sz="1400" dirty="0"/>
-                        <a:t>If it’s too hot or too cold outdors</a:t>
-                      </a:r>
-                    </a:p>
-                    <a:p>
-                      <a:r>
-                        <a:rPr lang="it-IT" sz="1400" dirty="0"/>
-                        <a:t>activities won’t be appealing</a:t>
+                        <a:t>If it’s too hot or too cold outdors activities won’t be appealing</a:t>
                       </a:r>
                     </a:p>
                     <a:p>
@@ -7708,7 +7815,38 @@
                       </a:r>
                     </a:p>
                   </a:txBody>
-                  <a:tcPr/>
+                  <a:tcPr>
+                    <a:gradFill>
+                      <a:gsLst>
+                        <a:gs pos="0">
+                          <a:schemeClr val="accent1">
+                            <a:lumMod val="5000"/>
+                            <a:lumOff val="95000"/>
+                            <a:alpha val="25000"/>
+                          </a:schemeClr>
+                        </a:gs>
+                        <a:gs pos="74000">
+                          <a:schemeClr val="accent1">
+                            <a:lumMod val="45000"/>
+                            <a:lumOff val="55000"/>
+                          </a:schemeClr>
+                        </a:gs>
+                        <a:gs pos="83000">
+                          <a:schemeClr val="accent1">
+                            <a:lumMod val="45000"/>
+                            <a:lumOff val="55000"/>
+                          </a:schemeClr>
+                        </a:gs>
+                        <a:gs pos="100000">
+                          <a:schemeClr val="accent1">
+                            <a:lumMod val="30000"/>
+                            <a:lumOff val="70000"/>
+                          </a:schemeClr>
+                        </a:gs>
+                      </a:gsLst>
+                      <a:lin ang="10800000" scaled="0"/>
+                    </a:gradFill>
+                  </a:tcPr>
                 </a:tc>
                 <a:tc>
                   <a:txBody>
@@ -7717,25 +7855,7 @@
                     <a:p>
                       <a:r>
                         <a:rPr lang="en-US" sz="1400" dirty="0"/>
-                        <a:t>A natural area is ideal for camping or</a:t>
-                      </a:r>
-                    </a:p>
-                    <a:p>
-                      <a:r>
-                        <a:rPr lang="en-US" sz="1400" dirty="0"/>
-                        <a:t>building cabins where people could</a:t>
-                      </a:r>
-                    </a:p>
-                    <a:p>
-                      <a:r>
-                        <a:rPr lang="en-US" sz="1400" dirty="0"/>
-                        <a:t>spend their summer vacations or a</a:t>
-                      </a:r>
-                    </a:p>
-                    <a:p>
-                      <a:r>
-                        <a:rPr lang="en-US" sz="1400" dirty="0"/>
-                        <a:t>weekend in spring</a:t>
+                        <a:t>A natural area is ideal for camping or building cabins where people could spend their summer vacations or a weekend in spring</a:t>
                       </a:r>
                     </a:p>
                     <a:p>
@@ -7744,13 +7864,7 @@
                     <a:p>
                       <a:r>
                         <a:rPr lang="it-IT" sz="1400" dirty="0"/>
-                        <a:t>Other than fishing hunting is already</a:t>
-                      </a:r>
-                    </a:p>
-                    <a:p>
-                      <a:r>
-                        <a:rPr lang="it-IT" sz="1400" dirty="0"/>
-                        <a:t>practiced in some form</a:t>
+                        <a:t>Other than fishing hunting is already practiced in some form</a:t>
                       </a:r>
                     </a:p>
                     <a:p>
@@ -7763,7 +7877,38 @@
                       </a:r>
                     </a:p>
                   </a:txBody>
-                  <a:tcPr/>
+                  <a:tcPr>
+                    <a:gradFill>
+                      <a:gsLst>
+                        <a:gs pos="0">
+                          <a:schemeClr val="accent1">
+                            <a:lumMod val="5000"/>
+                            <a:lumOff val="95000"/>
+                            <a:alpha val="25000"/>
+                          </a:schemeClr>
+                        </a:gs>
+                        <a:gs pos="74000">
+                          <a:schemeClr val="accent1">
+                            <a:lumMod val="45000"/>
+                            <a:lumOff val="55000"/>
+                          </a:schemeClr>
+                        </a:gs>
+                        <a:gs pos="83000">
+                          <a:schemeClr val="accent1">
+                            <a:lumMod val="45000"/>
+                            <a:lumOff val="55000"/>
+                          </a:schemeClr>
+                        </a:gs>
+                        <a:gs pos="100000">
+                          <a:schemeClr val="accent1">
+                            <a:lumMod val="30000"/>
+                            <a:lumOff val="70000"/>
+                          </a:schemeClr>
+                        </a:gs>
+                      </a:gsLst>
+                      <a:lin ang="10800000" scaled="0"/>
+                    </a:gradFill>
+                  </a:tcPr>
                 </a:tc>
                 <a:tc>
                   <a:txBody>
@@ -7786,7 +7931,38 @@
                       <a:endParaRPr lang="it-IT" sz="1400" dirty="0"/>
                     </a:p>
                   </a:txBody>
-                  <a:tcPr/>
+                  <a:tcPr>
+                    <a:gradFill>
+                      <a:gsLst>
+                        <a:gs pos="0">
+                          <a:schemeClr val="accent1">
+                            <a:lumMod val="5000"/>
+                            <a:lumOff val="95000"/>
+                            <a:alpha val="25000"/>
+                          </a:schemeClr>
+                        </a:gs>
+                        <a:gs pos="74000">
+                          <a:schemeClr val="accent1">
+                            <a:lumMod val="45000"/>
+                            <a:lumOff val="55000"/>
+                          </a:schemeClr>
+                        </a:gs>
+                        <a:gs pos="83000">
+                          <a:schemeClr val="accent1">
+                            <a:lumMod val="45000"/>
+                            <a:lumOff val="55000"/>
+                          </a:schemeClr>
+                        </a:gs>
+                        <a:gs pos="100000">
+                          <a:schemeClr val="accent1">
+                            <a:lumMod val="30000"/>
+                            <a:lumOff val="70000"/>
+                          </a:schemeClr>
+                        </a:gs>
+                      </a:gsLst>
+                      <a:lin ang="10800000" scaled="0"/>
+                    </a:gradFill>
+                  </a:tcPr>
                 </a:tc>
                 <a:extLst>
                   <a:ext uri="{0D108BD9-81ED-4DB2-BD59-A6C34878D82A}">
@@ -7826,7 +8002,7 @@
         </p:blipFill>
         <p:spPr>
           <a:xfrm>
-            <a:off x="7837964" y="1174754"/>
+            <a:off x="6936922" y="1150357"/>
             <a:ext cx="1298724" cy="974043"/>
           </a:xfrm>
           <a:prstGeom prst="rect">
@@ -7862,7 +8038,7 @@
         </p:blipFill>
         <p:spPr>
           <a:xfrm>
-            <a:off x="4271382" y="1174755"/>
+            <a:off x="3932281" y="1174755"/>
             <a:ext cx="1408571" cy="919278"/>
           </a:xfrm>
           <a:prstGeom prst="rect">
@@ -7910,6 +8086,4296 @@
     <p:extLst>
       <p:ext uri="{BB962C8B-B14F-4D97-AF65-F5344CB8AC3E}">
         <p14:creationId xmlns:p14="http://schemas.microsoft.com/office/powerpoint/2010/main" val="38306291"/>
+      </p:ext>
+    </p:extLst>
+  </p:cSld>
+  <p:clrMapOvr>
+    <a:masterClrMapping/>
+  </p:clrMapOvr>
+</p:sld>
+</file>
+
+<file path=ppt/slides/slide7.xml><?xml version="1.0" encoding="utf-8"?>
+<p:sld xmlns:a="http://schemas.openxmlformats.org/drawingml/2006/main" xmlns:r="http://schemas.openxmlformats.org/officeDocument/2006/relationships" xmlns:p="http://schemas.openxmlformats.org/presentationml/2006/main">
+  <p:cSld>
+    <p:spTree>
+      <p:nvGrpSpPr>
+        <p:cNvPr id="1" name=""/>
+        <p:cNvGrpSpPr/>
+        <p:nvPr/>
+      </p:nvGrpSpPr>
+      <p:grpSpPr>
+        <a:xfrm>
+          <a:off x="0" y="0"/>
+          <a:ext cx="0" cy="0"/>
+          <a:chOff x="0" y="0"/>
+          <a:chExt cx="0" cy="0"/>
+        </a:xfrm>
+      </p:grpSpPr>
+      <p:sp>
+        <p:nvSpPr>
+          <p:cNvPr id="2" name="Title 1">
+            <a:extLst>
+              <a:ext uri="{FF2B5EF4-FFF2-40B4-BE49-F238E27FC236}">
+                <a16:creationId xmlns:a16="http://schemas.microsoft.com/office/drawing/2014/main" id="{EC46E426-C74C-49CF-A4CF-7B54C924B528}"/>
+              </a:ext>
+            </a:extLst>
+          </p:cNvPr>
+          <p:cNvSpPr>
+            <a:spLocks noGrp="1"/>
+          </p:cNvSpPr>
+          <p:nvPr>
+            <p:ph type="title"/>
+          </p:nvPr>
+        </p:nvSpPr>
+        <p:spPr>
+          <a:xfrm>
+            <a:off x="677334" y="467552"/>
+            <a:ext cx="8596668" cy="713173"/>
+          </a:xfrm>
+        </p:spPr>
+        <p:txBody>
+          <a:bodyPr/>
+          <a:lstStyle/>
+          <a:p>
+            <a:r>
+              <a:rPr lang="en-US" dirty="0"/>
+              <a:t>Customer Journey Map</a:t>
+            </a:r>
+            <a:endParaRPr lang="it-IT" dirty="0"/>
+          </a:p>
+        </p:txBody>
+      </p:sp>
+      <p:sp>
+        <p:nvSpPr>
+          <p:cNvPr id="9" name="object 3">
+            <a:extLst>
+              <a:ext uri="{FF2B5EF4-FFF2-40B4-BE49-F238E27FC236}">
+                <a16:creationId xmlns:a16="http://schemas.microsoft.com/office/drawing/2014/main" id="{46FC2A22-F36C-4945-AB64-3EA2BF347FDD}"/>
+              </a:ext>
+            </a:extLst>
+          </p:cNvPr>
+          <p:cNvSpPr/>
+          <p:nvPr/>
+        </p:nvSpPr>
+        <p:spPr>
+          <a:xfrm>
+            <a:off x="6951543" y="2231292"/>
+            <a:ext cx="2130425" cy="1440815"/>
+          </a:xfrm>
+          <a:custGeom>
+            <a:avLst/>
+            <a:gdLst/>
+            <a:ahLst/>
+            <a:cxnLst/>
+            <a:rect l="l" t="t" r="r" b="b"/>
+            <a:pathLst>
+              <a:path w="2130425" h="1440814">
+                <a:moveTo>
+                  <a:pt x="0" y="0"/>
+                </a:moveTo>
+                <a:lnTo>
+                  <a:pt x="1861581" y="0"/>
+                </a:lnTo>
+                <a:lnTo>
+                  <a:pt x="2130109" y="720184"/>
+                </a:lnTo>
+                <a:lnTo>
+                  <a:pt x="1861581" y="1440368"/>
+                </a:lnTo>
+                <a:lnTo>
+                  <a:pt x="0" y="1440368"/>
+                </a:lnTo>
+                <a:lnTo>
+                  <a:pt x="268527" y="720184"/>
+                </a:lnTo>
+                <a:lnTo>
+                  <a:pt x="0" y="0"/>
+                </a:lnTo>
+                <a:close/>
+              </a:path>
+            </a:pathLst>
+          </a:custGeom>
+          <a:ln/>
+        </p:spPr>
+        <p:style>
+          <a:lnRef idx="1">
+            <a:schemeClr val="accent1"/>
+          </a:lnRef>
+          <a:fillRef idx="2">
+            <a:schemeClr val="accent1"/>
+          </a:fillRef>
+          <a:effectRef idx="1">
+            <a:schemeClr val="accent1"/>
+          </a:effectRef>
+          <a:fontRef idx="minor">
+            <a:schemeClr val="dk1"/>
+          </a:fontRef>
+        </p:style>
+        <p:txBody>
+          <a:bodyPr wrap="square" lIns="0" tIns="0" rIns="0" bIns="0" rtlCol="0"/>
+          <a:lstStyle/>
+          <a:p>
+            <a:endParaRPr/>
+          </a:p>
+        </p:txBody>
+      </p:sp>
+      <p:sp>
+        <p:nvSpPr>
+          <p:cNvPr id="10" name="object 4">
+            <a:extLst>
+              <a:ext uri="{FF2B5EF4-FFF2-40B4-BE49-F238E27FC236}">
+                <a16:creationId xmlns:a16="http://schemas.microsoft.com/office/drawing/2014/main" id="{D5801C03-48D4-4228-89B7-E94A786B88D5}"/>
+              </a:ext>
+            </a:extLst>
+          </p:cNvPr>
+          <p:cNvSpPr/>
+          <p:nvPr/>
+        </p:nvSpPr>
+        <p:spPr>
+          <a:xfrm>
+            <a:off x="3109316" y="1144529"/>
+            <a:ext cx="2130425" cy="695325"/>
+          </a:xfrm>
+          <a:custGeom>
+            <a:avLst/>
+            <a:gdLst/>
+            <a:ahLst/>
+            <a:cxnLst/>
+            <a:rect l="l" t="t" r="r" b="b"/>
+            <a:pathLst>
+              <a:path w="2130425" h="695325">
+                <a:moveTo>
+                  <a:pt x="1782710" y="0"/>
+                </a:moveTo>
+                <a:lnTo>
+                  <a:pt x="0" y="0"/>
+                </a:lnTo>
+                <a:lnTo>
+                  <a:pt x="347400" y="347400"/>
+                </a:lnTo>
+                <a:lnTo>
+                  <a:pt x="0" y="694800"/>
+                </a:lnTo>
+                <a:lnTo>
+                  <a:pt x="1782710" y="694800"/>
+                </a:lnTo>
+                <a:lnTo>
+                  <a:pt x="2130110" y="347400"/>
+                </a:lnTo>
+                <a:lnTo>
+                  <a:pt x="1782710" y="0"/>
+                </a:lnTo>
+                <a:close/>
+              </a:path>
+            </a:pathLst>
+          </a:custGeom>
+        </p:spPr>
+        <p:style>
+          <a:lnRef idx="1">
+            <a:schemeClr val="accent2"/>
+          </a:lnRef>
+          <a:fillRef idx="2">
+            <a:schemeClr val="accent2"/>
+          </a:fillRef>
+          <a:effectRef idx="1">
+            <a:schemeClr val="accent2"/>
+          </a:effectRef>
+          <a:fontRef idx="minor">
+            <a:schemeClr val="dk1"/>
+          </a:fontRef>
+        </p:style>
+        <p:txBody>
+          <a:bodyPr wrap="square" lIns="0" tIns="0" rIns="0" bIns="0" rtlCol="0"/>
+          <a:lstStyle/>
+          <a:p>
+            <a:endParaRPr/>
+          </a:p>
+        </p:txBody>
+      </p:sp>
+      <p:sp>
+        <p:nvSpPr>
+          <p:cNvPr id="11" name="object 5">
+            <a:extLst>
+              <a:ext uri="{FF2B5EF4-FFF2-40B4-BE49-F238E27FC236}">
+                <a16:creationId xmlns:a16="http://schemas.microsoft.com/office/drawing/2014/main" id="{82FF21FF-5413-4407-8B46-9BFB90739239}"/>
+              </a:ext>
+            </a:extLst>
+          </p:cNvPr>
+          <p:cNvSpPr txBox="1"/>
+          <p:nvPr/>
+        </p:nvSpPr>
+        <p:spPr>
+          <a:xfrm>
+            <a:off x="3553530" y="1401159"/>
+            <a:ext cx="1242695" cy="184666"/>
+          </a:xfrm>
+          <a:prstGeom prst="rect">
+            <a:avLst/>
+          </a:prstGeom>
+        </p:spPr>
+        <p:txBody>
+          <a:bodyPr vert="horz" wrap="square" lIns="0" tIns="0" rIns="0" bIns="0" rtlCol="0">
+            <a:spAutoFit/>
+          </a:bodyPr>
+          <a:lstStyle/>
+          <a:p>
+            <a:pPr marL="12700"/>
+            <a:r>
+              <a:rPr sz="1200" spc="-20" dirty="0">
+                <a:solidFill>
+                  <a:srgbClr val="312D2B"/>
+                </a:solidFill>
+                <a:latin typeface="Arial"/>
+                <a:cs typeface="Arial"/>
+              </a:rPr>
+              <a:t>C</a:t>
+            </a:r>
+            <a:r>
+              <a:rPr sz="1200" spc="-15" dirty="0">
+                <a:solidFill>
+                  <a:srgbClr val="312D2B"/>
+                </a:solidFill>
+                <a:latin typeface="Arial"/>
+                <a:cs typeface="Arial"/>
+              </a:rPr>
+              <a:t>O</a:t>
+            </a:r>
+            <a:r>
+              <a:rPr sz="1200" spc="-20" dirty="0">
+                <a:solidFill>
+                  <a:srgbClr val="312D2B"/>
+                </a:solidFill>
+                <a:latin typeface="Arial"/>
+                <a:cs typeface="Arial"/>
+              </a:rPr>
+              <a:t>NS</a:t>
+            </a:r>
+            <a:r>
+              <a:rPr sz="1200" spc="-25" dirty="0">
+                <a:solidFill>
+                  <a:srgbClr val="312D2B"/>
+                </a:solidFill>
+                <a:latin typeface="Arial"/>
+                <a:cs typeface="Arial"/>
+              </a:rPr>
+              <a:t>I</a:t>
+            </a:r>
+            <a:r>
+              <a:rPr sz="1200" spc="-20" dirty="0">
+                <a:solidFill>
+                  <a:srgbClr val="312D2B"/>
+                </a:solidFill>
+                <a:latin typeface="Arial"/>
+                <a:cs typeface="Arial"/>
+              </a:rPr>
+              <a:t>D</a:t>
+            </a:r>
+            <a:r>
+              <a:rPr sz="1200" spc="-70" dirty="0">
+                <a:solidFill>
+                  <a:srgbClr val="312D2B"/>
+                </a:solidFill>
+                <a:latin typeface="Arial"/>
+                <a:cs typeface="Arial"/>
+              </a:rPr>
+              <a:t>E</a:t>
+            </a:r>
+            <a:r>
+              <a:rPr sz="1200" spc="-45" dirty="0">
+                <a:solidFill>
+                  <a:srgbClr val="312D2B"/>
+                </a:solidFill>
+                <a:latin typeface="Arial"/>
+                <a:cs typeface="Arial"/>
+              </a:rPr>
+              <a:t>R</a:t>
+            </a:r>
+            <a:r>
+              <a:rPr sz="1200" spc="-140" dirty="0">
+                <a:solidFill>
+                  <a:srgbClr val="312D2B"/>
+                </a:solidFill>
+                <a:latin typeface="Arial"/>
+                <a:cs typeface="Arial"/>
+              </a:rPr>
+              <a:t>A</a:t>
+            </a:r>
+            <a:r>
+              <a:rPr sz="1200" spc="-50" dirty="0">
+                <a:solidFill>
+                  <a:srgbClr val="312D2B"/>
+                </a:solidFill>
+                <a:latin typeface="Arial"/>
+                <a:cs typeface="Arial"/>
+              </a:rPr>
+              <a:t>T</a:t>
+            </a:r>
+            <a:r>
+              <a:rPr sz="1200" spc="-25" dirty="0">
+                <a:solidFill>
+                  <a:srgbClr val="312D2B"/>
+                </a:solidFill>
+                <a:latin typeface="Arial"/>
+                <a:cs typeface="Arial"/>
+              </a:rPr>
+              <a:t>IO</a:t>
+            </a:r>
+            <a:r>
+              <a:rPr sz="1200" spc="-5" dirty="0">
+                <a:solidFill>
+                  <a:srgbClr val="312D2B"/>
+                </a:solidFill>
+                <a:latin typeface="Arial"/>
+                <a:cs typeface="Arial"/>
+              </a:rPr>
+              <a:t>N</a:t>
+            </a:r>
+            <a:endParaRPr sz="1200">
+              <a:latin typeface="Arial"/>
+              <a:cs typeface="Arial"/>
+            </a:endParaRPr>
+          </a:p>
+        </p:txBody>
+      </p:sp>
+      <p:sp>
+        <p:nvSpPr>
+          <p:cNvPr id="12" name="object 7">
+            <a:extLst>
+              <a:ext uri="{FF2B5EF4-FFF2-40B4-BE49-F238E27FC236}">
+                <a16:creationId xmlns:a16="http://schemas.microsoft.com/office/drawing/2014/main" id="{43FFEBA4-20FC-4E56-ADEF-0A8F7D0A4190}"/>
+              </a:ext>
+            </a:extLst>
+          </p:cNvPr>
+          <p:cNvSpPr txBox="1"/>
+          <p:nvPr/>
+        </p:nvSpPr>
+        <p:spPr>
+          <a:xfrm>
+            <a:off x="427953" y="5133917"/>
+            <a:ext cx="1219835" cy="616194"/>
+          </a:xfrm>
+          <a:prstGeom prst="rect">
+            <a:avLst/>
+          </a:prstGeom>
+        </p:spPr>
+        <p:style>
+          <a:lnRef idx="1">
+            <a:schemeClr val="accent2"/>
+          </a:lnRef>
+          <a:fillRef idx="2">
+            <a:schemeClr val="accent2"/>
+          </a:fillRef>
+          <a:effectRef idx="1">
+            <a:schemeClr val="accent2"/>
+          </a:effectRef>
+          <a:fontRef idx="minor">
+            <a:schemeClr val="dk1"/>
+          </a:fontRef>
+        </p:style>
+        <p:txBody>
+          <a:bodyPr vert="horz" wrap="square" lIns="0" tIns="635" rIns="0" bIns="0" rtlCol="0">
+            <a:spAutoFit/>
+          </a:bodyPr>
+          <a:lstStyle/>
+          <a:p>
+            <a:pPr>
+              <a:spcBef>
+                <a:spcPts val="5"/>
+              </a:spcBef>
+            </a:pPr>
+            <a:endParaRPr dirty="0">
+              <a:latin typeface="Times New Roman"/>
+              <a:cs typeface="Times New Roman"/>
+            </a:endParaRPr>
+          </a:p>
+          <a:p>
+            <a:pPr marL="289560"/>
+            <a:r>
+              <a:rPr sz="1100" b="1" spc="10" dirty="0">
+                <a:solidFill>
+                  <a:srgbClr val="312D2B"/>
+                </a:solidFill>
+                <a:latin typeface="Arial"/>
+                <a:cs typeface="Arial"/>
+              </a:rPr>
+              <a:t>METRICS</a:t>
+            </a:r>
+            <a:endParaRPr lang="en-US" sz="1100" b="1" spc="10" dirty="0">
+              <a:solidFill>
+                <a:srgbClr val="312D2B"/>
+              </a:solidFill>
+              <a:latin typeface="Arial"/>
+              <a:cs typeface="Arial"/>
+            </a:endParaRPr>
+          </a:p>
+          <a:p>
+            <a:pPr marL="289560"/>
+            <a:endParaRPr sz="1100" dirty="0">
+              <a:latin typeface="Arial"/>
+              <a:cs typeface="Arial"/>
+            </a:endParaRPr>
+          </a:p>
+        </p:txBody>
+      </p:sp>
+      <p:sp>
+        <p:nvSpPr>
+          <p:cNvPr id="13" name="object 9">
+            <a:extLst>
+              <a:ext uri="{FF2B5EF4-FFF2-40B4-BE49-F238E27FC236}">
+                <a16:creationId xmlns:a16="http://schemas.microsoft.com/office/drawing/2014/main" id="{8DFE8D7C-D127-4373-96B5-0B272A922469}"/>
+              </a:ext>
+            </a:extLst>
+          </p:cNvPr>
+          <p:cNvSpPr txBox="1"/>
+          <p:nvPr/>
+        </p:nvSpPr>
+        <p:spPr>
+          <a:xfrm>
+            <a:off x="427953" y="5929689"/>
+            <a:ext cx="1219835" cy="698268"/>
+          </a:xfrm>
+          <a:prstGeom prst="rect">
+            <a:avLst/>
+          </a:prstGeom>
+        </p:spPr>
+        <p:style>
+          <a:lnRef idx="1">
+            <a:schemeClr val="accent2"/>
+          </a:lnRef>
+          <a:fillRef idx="2">
+            <a:schemeClr val="accent2"/>
+          </a:fillRef>
+          <a:effectRef idx="1">
+            <a:schemeClr val="accent2"/>
+          </a:effectRef>
+          <a:fontRef idx="minor">
+            <a:schemeClr val="dk1"/>
+          </a:fontRef>
+        </p:style>
+        <p:txBody>
+          <a:bodyPr vert="horz" wrap="square" lIns="0" tIns="5715" rIns="0" bIns="0" rtlCol="0">
+            <a:spAutoFit/>
+          </a:bodyPr>
+          <a:lstStyle/>
+          <a:p>
+            <a:pPr>
+              <a:spcBef>
+                <a:spcPts val="45"/>
+              </a:spcBef>
+            </a:pPr>
+            <a:endParaRPr sz="1250" dirty="0">
+              <a:latin typeface="Times New Roman"/>
+              <a:cs typeface="Times New Roman"/>
+            </a:endParaRPr>
+          </a:p>
+          <a:p>
+            <a:pPr marL="153670" marR="145415" indent="11430">
+              <a:lnSpc>
+                <a:spcPts val="1300"/>
+              </a:lnSpc>
+            </a:pPr>
+            <a:r>
+              <a:rPr sz="1100" b="1" spc="15" dirty="0">
+                <a:solidFill>
+                  <a:srgbClr val="312D2B"/>
+                </a:solidFill>
+                <a:latin typeface="Arial"/>
+                <a:cs typeface="Arial"/>
+              </a:rPr>
+              <a:t>Im</a:t>
+            </a:r>
+            <a:r>
+              <a:rPr sz="1100" b="1" dirty="0">
+                <a:solidFill>
+                  <a:srgbClr val="312D2B"/>
+                </a:solidFill>
+                <a:latin typeface="Arial"/>
+                <a:cs typeface="Arial"/>
+              </a:rPr>
+              <a:t>p</a:t>
+            </a:r>
+            <a:r>
+              <a:rPr sz="1100" b="1" spc="-10" dirty="0">
+                <a:solidFill>
+                  <a:srgbClr val="312D2B"/>
+                </a:solidFill>
+                <a:latin typeface="Arial"/>
+                <a:cs typeface="Arial"/>
+              </a:rPr>
+              <a:t>r</a:t>
+            </a:r>
+            <a:r>
+              <a:rPr sz="1100" b="1" dirty="0">
+                <a:solidFill>
+                  <a:srgbClr val="312D2B"/>
+                </a:solidFill>
+                <a:latin typeface="Arial"/>
+                <a:cs typeface="Arial"/>
+              </a:rPr>
+              <a:t>o</a:t>
+            </a:r>
+            <a:r>
+              <a:rPr sz="1100" b="1" spc="-40" dirty="0">
+                <a:solidFill>
+                  <a:srgbClr val="312D2B"/>
+                </a:solidFill>
+                <a:latin typeface="Arial"/>
+                <a:cs typeface="Arial"/>
+              </a:rPr>
+              <a:t>v</a:t>
+            </a:r>
+            <a:r>
+              <a:rPr sz="1100" b="1" spc="20" dirty="0">
+                <a:solidFill>
+                  <a:srgbClr val="312D2B"/>
+                </a:solidFill>
+                <a:latin typeface="Arial"/>
+                <a:cs typeface="Arial"/>
+              </a:rPr>
+              <a:t>e</a:t>
+            </a:r>
+            <a:r>
+              <a:rPr sz="1100" b="1" spc="15" dirty="0">
+                <a:solidFill>
+                  <a:srgbClr val="312D2B"/>
+                </a:solidFill>
+                <a:latin typeface="Arial"/>
+                <a:cs typeface="Arial"/>
+              </a:rPr>
+              <a:t>m</a:t>
+            </a:r>
+            <a:r>
+              <a:rPr sz="1100" b="1" spc="20" dirty="0">
+                <a:solidFill>
+                  <a:srgbClr val="312D2B"/>
+                </a:solidFill>
+                <a:latin typeface="Arial"/>
+                <a:cs typeface="Arial"/>
+              </a:rPr>
+              <a:t>e</a:t>
+            </a:r>
+            <a:r>
+              <a:rPr sz="1100" b="1" spc="-25" dirty="0">
+                <a:solidFill>
+                  <a:srgbClr val="312D2B"/>
+                </a:solidFill>
+                <a:latin typeface="Arial"/>
+                <a:cs typeface="Arial"/>
+              </a:rPr>
+              <a:t>n</a:t>
+            </a:r>
+            <a:r>
+              <a:rPr sz="1100" b="1" spc="15" dirty="0">
+                <a:solidFill>
+                  <a:srgbClr val="312D2B"/>
+                </a:solidFill>
+                <a:latin typeface="Arial"/>
+                <a:cs typeface="Arial"/>
+              </a:rPr>
+              <a:t>t  </a:t>
+            </a:r>
+            <a:r>
+              <a:rPr sz="1100" b="1" spc="-10" dirty="0">
+                <a:solidFill>
+                  <a:srgbClr val="312D2B"/>
+                </a:solidFill>
+                <a:latin typeface="Arial"/>
+                <a:cs typeface="Arial"/>
+              </a:rPr>
+              <a:t>O</a:t>
+            </a:r>
+            <a:r>
+              <a:rPr sz="1100" b="1" dirty="0">
+                <a:solidFill>
+                  <a:srgbClr val="312D2B"/>
+                </a:solidFill>
+                <a:latin typeface="Arial"/>
+                <a:cs typeface="Arial"/>
+              </a:rPr>
+              <a:t>ppo</a:t>
+            </a:r>
+            <a:r>
+              <a:rPr sz="1100" b="1" spc="-10" dirty="0">
+                <a:solidFill>
+                  <a:srgbClr val="312D2B"/>
+                </a:solidFill>
+                <a:latin typeface="Arial"/>
+                <a:cs typeface="Arial"/>
+              </a:rPr>
+              <a:t>r</a:t>
+            </a:r>
+            <a:r>
+              <a:rPr sz="1100" b="1" spc="20" dirty="0">
+                <a:solidFill>
+                  <a:srgbClr val="312D2B"/>
+                </a:solidFill>
+                <a:latin typeface="Arial"/>
+                <a:cs typeface="Arial"/>
+              </a:rPr>
+              <a:t>t</a:t>
+            </a:r>
+            <a:r>
+              <a:rPr sz="1100" b="1" spc="-25" dirty="0">
+                <a:solidFill>
+                  <a:srgbClr val="312D2B"/>
+                </a:solidFill>
+                <a:latin typeface="Arial"/>
+                <a:cs typeface="Arial"/>
+              </a:rPr>
+              <a:t>uni</a:t>
+            </a:r>
+            <a:r>
+              <a:rPr sz="1100" b="1" spc="20" dirty="0">
+                <a:solidFill>
+                  <a:srgbClr val="312D2B"/>
+                </a:solidFill>
+                <a:latin typeface="Arial"/>
+                <a:cs typeface="Arial"/>
+              </a:rPr>
+              <a:t>t</a:t>
+            </a:r>
+            <a:r>
+              <a:rPr sz="1100" b="1" spc="-25" dirty="0">
+                <a:solidFill>
+                  <a:srgbClr val="312D2B"/>
+                </a:solidFill>
+                <a:latin typeface="Arial"/>
+                <a:cs typeface="Arial"/>
+              </a:rPr>
+              <a:t>i</a:t>
+            </a:r>
+            <a:r>
+              <a:rPr sz="1100" b="1" spc="20" dirty="0">
+                <a:solidFill>
+                  <a:srgbClr val="312D2B"/>
+                </a:solidFill>
+                <a:latin typeface="Arial"/>
+                <a:cs typeface="Arial"/>
+              </a:rPr>
+              <a:t>e</a:t>
+            </a:r>
+            <a:r>
+              <a:rPr sz="1100" b="1" spc="-25" dirty="0">
+                <a:solidFill>
+                  <a:srgbClr val="312D2B"/>
+                </a:solidFill>
+                <a:latin typeface="Arial"/>
+                <a:cs typeface="Arial"/>
+              </a:rPr>
+              <a:t>s</a:t>
+            </a:r>
+            <a:endParaRPr lang="en-US" sz="1100" b="1" spc="-25" dirty="0">
+              <a:solidFill>
+                <a:srgbClr val="312D2B"/>
+              </a:solidFill>
+              <a:latin typeface="Arial"/>
+              <a:cs typeface="Arial"/>
+            </a:endParaRPr>
+          </a:p>
+          <a:p>
+            <a:pPr marL="153670" marR="145415" indent="11430">
+              <a:lnSpc>
+                <a:spcPts val="1300"/>
+              </a:lnSpc>
+            </a:pPr>
+            <a:endParaRPr sz="1100" dirty="0">
+              <a:latin typeface="Arial"/>
+              <a:cs typeface="Arial"/>
+            </a:endParaRPr>
+          </a:p>
+        </p:txBody>
+      </p:sp>
+      <p:sp>
+        <p:nvSpPr>
+          <p:cNvPr id="14" name="object 11">
+            <a:extLst>
+              <a:ext uri="{FF2B5EF4-FFF2-40B4-BE49-F238E27FC236}">
+                <a16:creationId xmlns:a16="http://schemas.microsoft.com/office/drawing/2014/main" id="{82D144D4-3A71-4588-B383-74167EB293B1}"/>
+              </a:ext>
+            </a:extLst>
+          </p:cNvPr>
+          <p:cNvSpPr/>
+          <p:nvPr/>
+        </p:nvSpPr>
+        <p:spPr>
+          <a:xfrm>
+            <a:off x="2290055" y="4934160"/>
+            <a:ext cx="6791959" cy="14604"/>
+          </a:xfrm>
+          <a:custGeom>
+            <a:avLst/>
+            <a:gdLst/>
+            <a:ahLst/>
+            <a:cxnLst/>
+            <a:rect l="l" t="t" r="r" b="b"/>
+            <a:pathLst>
+              <a:path w="6791959" h="14604">
+                <a:moveTo>
+                  <a:pt x="0" y="0"/>
+                </a:moveTo>
+                <a:lnTo>
+                  <a:pt x="6791598" y="14208"/>
+                </a:lnTo>
+              </a:path>
+            </a:pathLst>
+          </a:custGeom>
+          <a:ln w="25400">
+            <a:solidFill>
+              <a:srgbClr val="494A47"/>
+            </a:solidFill>
+          </a:ln>
+        </p:spPr>
+        <p:txBody>
+          <a:bodyPr wrap="square" lIns="0" tIns="0" rIns="0" bIns="0" rtlCol="0"/>
+          <a:lstStyle/>
+          <a:p>
+            <a:endParaRPr/>
+          </a:p>
+        </p:txBody>
+      </p:sp>
+      <p:sp>
+        <p:nvSpPr>
+          <p:cNvPr id="15" name="object 12">
+            <a:extLst>
+              <a:ext uri="{FF2B5EF4-FFF2-40B4-BE49-F238E27FC236}">
+                <a16:creationId xmlns:a16="http://schemas.microsoft.com/office/drawing/2014/main" id="{4A827045-E880-4A5F-9FA6-8E2EFDD1A13C}"/>
+              </a:ext>
+            </a:extLst>
+          </p:cNvPr>
+          <p:cNvSpPr txBox="1"/>
+          <p:nvPr/>
+        </p:nvSpPr>
+        <p:spPr>
+          <a:xfrm>
+            <a:off x="506693" y="4832699"/>
+            <a:ext cx="1651000" cy="200055"/>
+          </a:xfrm>
+          <a:prstGeom prst="rect">
+            <a:avLst/>
+          </a:prstGeom>
+        </p:spPr>
+        <p:txBody>
+          <a:bodyPr vert="horz" wrap="square" lIns="0" tIns="0" rIns="0" bIns="0" rtlCol="0">
+            <a:spAutoFit/>
+          </a:bodyPr>
+          <a:lstStyle/>
+          <a:p>
+            <a:pPr marL="12700"/>
+            <a:r>
+              <a:rPr sz="1300" b="1" dirty="0">
+                <a:solidFill>
+                  <a:srgbClr val="494A47"/>
+                </a:solidFill>
+                <a:latin typeface="Arial"/>
+                <a:cs typeface="Arial"/>
+              </a:rPr>
+              <a:t>RECOMMENDATION</a:t>
+            </a:r>
+            <a:endParaRPr sz="1300">
+              <a:latin typeface="Arial"/>
+              <a:cs typeface="Arial"/>
+            </a:endParaRPr>
+          </a:p>
+        </p:txBody>
+      </p:sp>
+      <p:sp>
+        <p:nvSpPr>
+          <p:cNvPr id="16" name="object 13">
+            <a:extLst>
+              <a:ext uri="{FF2B5EF4-FFF2-40B4-BE49-F238E27FC236}">
+                <a16:creationId xmlns:a16="http://schemas.microsoft.com/office/drawing/2014/main" id="{44478ED2-0028-4AF3-A1A0-319185D20088}"/>
+              </a:ext>
+            </a:extLst>
+          </p:cNvPr>
+          <p:cNvSpPr/>
+          <p:nvPr/>
+        </p:nvSpPr>
+        <p:spPr>
+          <a:xfrm>
+            <a:off x="5030430" y="1144529"/>
+            <a:ext cx="2130425" cy="695325"/>
+          </a:xfrm>
+          <a:custGeom>
+            <a:avLst/>
+            <a:gdLst/>
+            <a:ahLst/>
+            <a:cxnLst/>
+            <a:rect l="l" t="t" r="r" b="b"/>
+            <a:pathLst>
+              <a:path w="2130425" h="695325">
+                <a:moveTo>
+                  <a:pt x="1782711" y="0"/>
+                </a:moveTo>
+                <a:lnTo>
+                  <a:pt x="0" y="0"/>
+                </a:lnTo>
+                <a:lnTo>
+                  <a:pt x="347400" y="347400"/>
+                </a:lnTo>
+                <a:lnTo>
+                  <a:pt x="0" y="694800"/>
+                </a:lnTo>
+                <a:lnTo>
+                  <a:pt x="1782711" y="694800"/>
+                </a:lnTo>
+                <a:lnTo>
+                  <a:pt x="2130110" y="347400"/>
+                </a:lnTo>
+                <a:lnTo>
+                  <a:pt x="1782711" y="0"/>
+                </a:lnTo>
+                <a:close/>
+              </a:path>
+            </a:pathLst>
+          </a:custGeom>
+        </p:spPr>
+        <p:style>
+          <a:lnRef idx="1">
+            <a:schemeClr val="accent2"/>
+          </a:lnRef>
+          <a:fillRef idx="2">
+            <a:schemeClr val="accent2"/>
+          </a:fillRef>
+          <a:effectRef idx="1">
+            <a:schemeClr val="accent2"/>
+          </a:effectRef>
+          <a:fontRef idx="minor">
+            <a:schemeClr val="dk1"/>
+          </a:fontRef>
+        </p:style>
+        <p:txBody>
+          <a:bodyPr wrap="square" lIns="0" tIns="0" rIns="0" bIns="0" rtlCol="0"/>
+          <a:lstStyle/>
+          <a:p>
+            <a:endParaRPr/>
+          </a:p>
+        </p:txBody>
+      </p:sp>
+      <p:sp>
+        <p:nvSpPr>
+          <p:cNvPr id="17" name="object 14">
+            <a:extLst>
+              <a:ext uri="{FF2B5EF4-FFF2-40B4-BE49-F238E27FC236}">
+                <a16:creationId xmlns:a16="http://schemas.microsoft.com/office/drawing/2014/main" id="{AEAB9E9D-048F-4B03-9A16-F6C7E1F68E92}"/>
+              </a:ext>
+            </a:extLst>
+          </p:cNvPr>
+          <p:cNvSpPr txBox="1"/>
+          <p:nvPr/>
+        </p:nvSpPr>
+        <p:spPr>
+          <a:xfrm>
+            <a:off x="5530334" y="1391507"/>
+            <a:ext cx="1130300" cy="200055"/>
+          </a:xfrm>
+          <a:prstGeom prst="rect">
+            <a:avLst/>
+          </a:prstGeom>
+        </p:spPr>
+        <p:txBody>
+          <a:bodyPr vert="horz" wrap="square" lIns="0" tIns="0" rIns="0" bIns="0" rtlCol="0">
+            <a:spAutoFit/>
+          </a:bodyPr>
+          <a:lstStyle/>
+          <a:p>
+            <a:pPr marL="12700"/>
+            <a:r>
+              <a:rPr sz="1300" spc="-25" dirty="0">
+                <a:solidFill>
+                  <a:srgbClr val="312D2B"/>
+                </a:solidFill>
+                <a:latin typeface="Arial"/>
+                <a:cs typeface="Arial"/>
+              </a:rPr>
+              <a:t>ONBOARDING</a:t>
+            </a:r>
+            <a:endParaRPr sz="1300">
+              <a:latin typeface="Arial"/>
+              <a:cs typeface="Arial"/>
+            </a:endParaRPr>
+          </a:p>
+        </p:txBody>
+      </p:sp>
+      <p:sp>
+        <p:nvSpPr>
+          <p:cNvPr id="18" name="object 15">
+            <a:extLst>
+              <a:ext uri="{FF2B5EF4-FFF2-40B4-BE49-F238E27FC236}">
+                <a16:creationId xmlns:a16="http://schemas.microsoft.com/office/drawing/2014/main" id="{264E0CA2-5EE3-42F5-9106-0CCE29F9F97E}"/>
+              </a:ext>
+            </a:extLst>
+          </p:cNvPr>
+          <p:cNvSpPr/>
+          <p:nvPr/>
+        </p:nvSpPr>
+        <p:spPr>
+          <a:xfrm>
+            <a:off x="6951543" y="1144529"/>
+            <a:ext cx="2130425" cy="695325"/>
+          </a:xfrm>
+          <a:custGeom>
+            <a:avLst/>
+            <a:gdLst/>
+            <a:ahLst/>
+            <a:cxnLst/>
+            <a:rect l="l" t="t" r="r" b="b"/>
+            <a:pathLst>
+              <a:path w="2130425" h="695325">
+                <a:moveTo>
+                  <a:pt x="1782711" y="0"/>
+                </a:moveTo>
+                <a:lnTo>
+                  <a:pt x="0" y="0"/>
+                </a:lnTo>
+                <a:lnTo>
+                  <a:pt x="347400" y="347400"/>
+                </a:lnTo>
+                <a:lnTo>
+                  <a:pt x="0" y="694800"/>
+                </a:lnTo>
+                <a:lnTo>
+                  <a:pt x="1782711" y="694800"/>
+                </a:lnTo>
+                <a:lnTo>
+                  <a:pt x="2130110" y="347400"/>
+                </a:lnTo>
+                <a:lnTo>
+                  <a:pt x="1782711" y="0"/>
+                </a:lnTo>
+                <a:close/>
+              </a:path>
+            </a:pathLst>
+          </a:custGeom>
+        </p:spPr>
+        <p:style>
+          <a:lnRef idx="1">
+            <a:schemeClr val="accent2"/>
+          </a:lnRef>
+          <a:fillRef idx="2">
+            <a:schemeClr val="accent2"/>
+          </a:fillRef>
+          <a:effectRef idx="1">
+            <a:schemeClr val="accent2"/>
+          </a:effectRef>
+          <a:fontRef idx="minor">
+            <a:schemeClr val="dk1"/>
+          </a:fontRef>
+        </p:style>
+        <p:txBody>
+          <a:bodyPr wrap="square" lIns="0" tIns="0" rIns="0" bIns="0" rtlCol="0"/>
+          <a:lstStyle/>
+          <a:p>
+            <a:endParaRPr/>
+          </a:p>
+        </p:txBody>
+      </p:sp>
+      <p:sp>
+        <p:nvSpPr>
+          <p:cNvPr id="19" name="object 16">
+            <a:extLst>
+              <a:ext uri="{FF2B5EF4-FFF2-40B4-BE49-F238E27FC236}">
+                <a16:creationId xmlns:a16="http://schemas.microsoft.com/office/drawing/2014/main" id="{40D4A84B-2E65-438B-AA0D-890BF6C18702}"/>
+              </a:ext>
+            </a:extLst>
+          </p:cNvPr>
+          <p:cNvSpPr txBox="1"/>
+          <p:nvPr/>
+        </p:nvSpPr>
+        <p:spPr>
+          <a:xfrm>
+            <a:off x="7542634" y="1307687"/>
+            <a:ext cx="947419" cy="388620"/>
+          </a:xfrm>
+          <a:prstGeom prst="rect">
+            <a:avLst/>
+          </a:prstGeom>
+        </p:spPr>
+        <p:txBody>
+          <a:bodyPr vert="horz" wrap="square" lIns="0" tIns="0" rIns="0" bIns="0" rtlCol="0">
+            <a:spAutoFit/>
+          </a:bodyPr>
+          <a:lstStyle/>
+          <a:p>
+            <a:pPr marL="192405" marR="5080" indent="-180340">
+              <a:lnSpc>
+                <a:spcPts val="1490"/>
+              </a:lnSpc>
+            </a:pPr>
+            <a:r>
+              <a:rPr sz="1300" spc="-45" dirty="0">
+                <a:solidFill>
+                  <a:srgbClr val="312D2B"/>
+                </a:solidFill>
+                <a:latin typeface="Arial"/>
+                <a:cs typeface="Arial"/>
+              </a:rPr>
+              <a:t>CONVERT</a:t>
+            </a:r>
+            <a:r>
+              <a:rPr sz="1300" spc="-75" dirty="0">
+                <a:solidFill>
+                  <a:srgbClr val="312D2B"/>
+                </a:solidFill>
+                <a:latin typeface="Arial"/>
+                <a:cs typeface="Arial"/>
+              </a:rPr>
+              <a:t> </a:t>
+            </a:r>
+            <a:r>
+              <a:rPr sz="1300" spc="-50" dirty="0">
+                <a:solidFill>
+                  <a:srgbClr val="312D2B"/>
+                </a:solidFill>
+                <a:latin typeface="Arial"/>
+                <a:cs typeface="Arial"/>
+              </a:rPr>
+              <a:t>&amp;  </a:t>
+            </a:r>
+            <a:r>
+              <a:rPr sz="1300" spc="-60" dirty="0">
+                <a:solidFill>
+                  <a:srgbClr val="312D2B"/>
+                </a:solidFill>
+                <a:latin typeface="Arial"/>
+                <a:cs typeface="Arial"/>
+              </a:rPr>
+              <a:t>RETAIN</a:t>
+            </a:r>
+            <a:endParaRPr sz="1300">
+              <a:latin typeface="Arial"/>
+              <a:cs typeface="Arial"/>
+            </a:endParaRPr>
+          </a:p>
+        </p:txBody>
+      </p:sp>
+      <p:sp>
+        <p:nvSpPr>
+          <p:cNvPr id="20" name="object 17">
+            <a:extLst>
+              <a:ext uri="{FF2B5EF4-FFF2-40B4-BE49-F238E27FC236}">
+                <a16:creationId xmlns:a16="http://schemas.microsoft.com/office/drawing/2014/main" id="{2A17051A-E340-4F5B-A0E3-C97DDE5E0BB1}"/>
+              </a:ext>
+            </a:extLst>
+          </p:cNvPr>
+          <p:cNvSpPr/>
+          <p:nvPr/>
+        </p:nvSpPr>
+        <p:spPr>
+          <a:xfrm>
+            <a:off x="1718110" y="1144529"/>
+            <a:ext cx="1600200" cy="695325"/>
+          </a:xfrm>
+          <a:custGeom>
+            <a:avLst/>
+            <a:gdLst/>
+            <a:ahLst/>
+            <a:cxnLst/>
+            <a:rect l="l" t="t" r="r" b="b"/>
+            <a:pathLst>
+              <a:path w="1600200" h="695325">
+                <a:moveTo>
+                  <a:pt x="1252801" y="0"/>
+                </a:moveTo>
+                <a:lnTo>
+                  <a:pt x="0" y="0"/>
+                </a:lnTo>
+                <a:lnTo>
+                  <a:pt x="0" y="694800"/>
+                </a:lnTo>
+                <a:lnTo>
+                  <a:pt x="1252801" y="694800"/>
+                </a:lnTo>
+                <a:lnTo>
+                  <a:pt x="1600200" y="347399"/>
+                </a:lnTo>
+                <a:lnTo>
+                  <a:pt x="1252801" y="0"/>
+                </a:lnTo>
+                <a:close/>
+              </a:path>
+            </a:pathLst>
+          </a:custGeom>
+        </p:spPr>
+        <p:style>
+          <a:lnRef idx="1">
+            <a:schemeClr val="accent2"/>
+          </a:lnRef>
+          <a:fillRef idx="2">
+            <a:schemeClr val="accent2"/>
+          </a:fillRef>
+          <a:effectRef idx="1">
+            <a:schemeClr val="accent2"/>
+          </a:effectRef>
+          <a:fontRef idx="minor">
+            <a:schemeClr val="dk1"/>
+          </a:fontRef>
+        </p:style>
+        <p:txBody>
+          <a:bodyPr wrap="square" lIns="0" tIns="0" rIns="0" bIns="0" rtlCol="0"/>
+          <a:lstStyle/>
+          <a:p>
+            <a:endParaRPr/>
+          </a:p>
+        </p:txBody>
+      </p:sp>
+      <p:sp>
+        <p:nvSpPr>
+          <p:cNvPr id="21" name="object 18">
+            <a:extLst>
+              <a:ext uri="{FF2B5EF4-FFF2-40B4-BE49-F238E27FC236}">
+                <a16:creationId xmlns:a16="http://schemas.microsoft.com/office/drawing/2014/main" id="{AA6D5ACA-66B2-46C2-A0C8-78FD967FEC1D}"/>
+              </a:ext>
+            </a:extLst>
+          </p:cNvPr>
+          <p:cNvSpPr txBox="1"/>
+          <p:nvPr/>
+        </p:nvSpPr>
+        <p:spPr>
+          <a:xfrm>
+            <a:off x="1916185" y="1391507"/>
+            <a:ext cx="1031240" cy="200055"/>
+          </a:xfrm>
+          <a:prstGeom prst="rect">
+            <a:avLst/>
+          </a:prstGeom>
+        </p:spPr>
+        <p:txBody>
+          <a:bodyPr vert="horz" wrap="square" lIns="0" tIns="0" rIns="0" bIns="0" rtlCol="0">
+            <a:spAutoFit/>
+          </a:bodyPr>
+          <a:lstStyle/>
+          <a:p>
+            <a:pPr marL="12700"/>
+            <a:r>
+              <a:rPr sz="1300" spc="-60" dirty="0">
+                <a:solidFill>
+                  <a:srgbClr val="312D2B"/>
+                </a:solidFill>
+                <a:latin typeface="Arial"/>
+                <a:cs typeface="Arial"/>
+              </a:rPr>
+              <a:t>A</a:t>
+            </a:r>
+            <a:r>
+              <a:rPr sz="1300" spc="-65" dirty="0">
+                <a:solidFill>
+                  <a:srgbClr val="312D2B"/>
+                </a:solidFill>
+                <a:latin typeface="Arial"/>
+                <a:cs typeface="Arial"/>
+              </a:rPr>
+              <a:t>W</a:t>
+            </a:r>
+            <a:r>
+              <a:rPr sz="1300" spc="-30" dirty="0">
+                <a:solidFill>
+                  <a:srgbClr val="312D2B"/>
+                </a:solidFill>
+                <a:latin typeface="Arial"/>
+                <a:cs typeface="Arial"/>
+              </a:rPr>
+              <a:t>A</a:t>
+            </a:r>
+            <a:r>
+              <a:rPr sz="1300" spc="-55" dirty="0">
+                <a:solidFill>
+                  <a:srgbClr val="312D2B"/>
+                </a:solidFill>
+                <a:latin typeface="Arial"/>
+                <a:cs typeface="Arial"/>
+              </a:rPr>
+              <a:t>R</a:t>
+            </a:r>
+            <a:r>
+              <a:rPr sz="1300" spc="-70" dirty="0">
+                <a:solidFill>
+                  <a:srgbClr val="312D2B"/>
+                </a:solidFill>
+                <a:latin typeface="Arial"/>
+                <a:cs typeface="Arial"/>
+              </a:rPr>
+              <a:t>E</a:t>
+            </a:r>
+            <a:r>
+              <a:rPr sz="1300" spc="-10" dirty="0">
+                <a:solidFill>
+                  <a:srgbClr val="312D2B"/>
+                </a:solidFill>
+                <a:latin typeface="Arial"/>
+                <a:cs typeface="Arial"/>
+              </a:rPr>
+              <a:t>N</a:t>
+            </a:r>
+            <a:r>
+              <a:rPr sz="1300" spc="-70" dirty="0">
+                <a:solidFill>
+                  <a:srgbClr val="312D2B"/>
+                </a:solidFill>
+                <a:latin typeface="Arial"/>
+                <a:cs typeface="Arial"/>
+              </a:rPr>
+              <a:t>E</a:t>
+            </a:r>
+            <a:r>
+              <a:rPr sz="1300" spc="-30" dirty="0">
+                <a:solidFill>
+                  <a:srgbClr val="312D2B"/>
+                </a:solidFill>
+                <a:latin typeface="Arial"/>
+                <a:cs typeface="Arial"/>
+              </a:rPr>
+              <a:t>S</a:t>
+            </a:r>
+            <a:r>
+              <a:rPr sz="1300" spc="-25" dirty="0">
+                <a:solidFill>
+                  <a:srgbClr val="312D2B"/>
+                </a:solidFill>
+                <a:latin typeface="Arial"/>
+                <a:cs typeface="Arial"/>
+              </a:rPr>
+              <a:t>S</a:t>
+            </a:r>
+            <a:endParaRPr sz="1300">
+              <a:latin typeface="Arial"/>
+              <a:cs typeface="Arial"/>
+            </a:endParaRPr>
+          </a:p>
+        </p:txBody>
+      </p:sp>
+      <p:sp>
+        <p:nvSpPr>
+          <p:cNvPr id="22" name="object 19">
+            <a:extLst>
+              <a:ext uri="{FF2B5EF4-FFF2-40B4-BE49-F238E27FC236}">
+                <a16:creationId xmlns:a16="http://schemas.microsoft.com/office/drawing/2014/main" id="{72C2BFDE-7418-4F74-A00D-5A08E7F9AB8A}"/>
+              </a:ext>
+            </a:extLst>
+          </p:cNvPr>
+          <p:cNvSpPr/>
+          <p:nvPr/>
+        </p:nvSpPr>
+        <p:spPr>
+          <a:xfrm>
+            <a:off x="2290055" y="2047138"/>
+            <a:ext cx="6791959" cy="0"/>
+          </a:xfrm>
+          <a:custGeom>
+            <a:avLst/>
+            <a:gdLst/>
+            <a:ahLst/>
+            <a:cxnLst/>
+            <a:rect l="l" t="t" r="r" b="b"/>
+            <a:pathLst>
+              <a:path w="6791959">
+                <a:moveTo>
+                  <a:pt x="0" y="0"/>
+                </a:moveTo>
+                <a:lnTo>
+                  <a:pt x="6791598" y="1"/>
+                </a:lnTo>
+              </a:path>
+            </a:pathLst>
+          </a:custGeom>
+          <a:ln w="25400">
+            <a:solidFill>
+              <a:srgbClr val="494A47"/>
+            </a:solidFill>
+          </a:ln>
+        </p:spPr>
+        <p:txBody>
+          <a:bodyPr wrap="square" lIns="0" tIns="0" rIns="0" bIns="0" rtlCol="0"/>
+          <a:lstStyle/>
+          <a:p>
+            <a:endParaRPr/>
+          </a:p>
+        </p:txBody>
+      </p:sp>
+      <p:sp>
+        <p:nvSpPr>
+          <p:cNvPr id="23" name="object 20">
+            <a:extLst>
+              <a:ext uri="{FF2B5EF4-FFF2-40B4-BE49-F238E27FC236}">
+                <a16:creationId xmlns:a16="http://schemas.microsoft.com/office/drawing/2014/main" id="{42770FFD-3023-43E5-8CE5-566BAE1325D8}"/>
+              </a:ext>
+            </a:extLst>
+          </p:cNvPr>
+          <p:cNvSpPr txBox="1"/>
+          <p:nvPr/>
+        </p:nvSpPr>
+        <p:spPr>
+          <a:xfrm>
+            <a:off x="506692" y="1931004"/>
+            <a:ext cx="1583690" cy="200055"/>
+          </a:xfrm>
+          <a:prstGeom prst="rect">
+            <a:avLst/>
+          </a:prstGeom>
+        </p:spPr>
+        <p:txBody>
+          <a:bodyPr vert="horz" wrap="square" lIns="0" tIns="0" rIns="0" bIns="0" rtlCol="0">
+            <a:spAutoFit/>
+          </a:bodyPr>
+          <a:lstStyle/>
+          <a:p>
+            <a:pPr marL="12700"/>
+            <a:r>
+              <a:rPr sz="1300" b="1" spc="-15" dirty="0">
+                <a:solidFill>
+                  <a:srgbClr val="494A47"/>
+                </a:solidFill>
+                <a:latin typeface="Arial"/>
+                <a:cs typeface="Arial"/>
+              </a:rPr>
+              <a:t>USER</a:t>
+            </a:r>
+            <a:r>
+              <a:rPr sz="1300" b="1" spc="-60" dirty="0">
+                <a:solidFill>
+                  <a:srgbClr val="494A47"/>
+                </a:solidFill>
+                <a:latin typeface="Arial"/>
+                <a:cs typeface="Arial"/>
+              </a:rPr>
+              <a:t> </a:t>
+            </a:r>
+            <a:r>
+              <a:rPr sz="1300" b="1" spc="-10" dirty="0">
+                <a:solidFill>
+                  <a:srgbClr val="494A47"/>
+                </a:solidFill>
+                <a:latin typeface="Arial"/>
+                <a:cs typeface="Arial"/>
+              </a:rPr>
+              <a:t>EXPERIENCE</a:t>
+            </a:r>
+            <a:endParaRPr sz="1300">
+              <a:latin typeface="Arial"/>
+              <a:cs typeface="Arial"/>
+            </a:endParaRPr>
+          </a:p>
+        </p:txBody>
+      </p:sp>
+      <p:sp>
+        <p:nvSpPr>
+          <p:cNvPr id="24" name="object 21">
+            <a:extLst>
+              <a:ext uri="{FF2B5EF4-FFF2-40B4-BE49-F238E27FC236}">
+                <a16:creationId xmlns:a16="http://schemas.microsoft.com/office/drawing/2014/main" id="{01EAA8B8-F3D5-46C2-B992-B2D11AE460FA}"/>
+              </a:ext>
+            </a:extLst>
+          </p:cNvPr>
+          <p:cNvSpPr/>
+          <p:nvPr/>
+        </p:nvSpPr>
+        <p:spPr>
+          <a:xfrm>
+            <a:off x="5047880" y="2231290"/>
+            <a:ext cx="2112645" cy="1440815"/>
+          </a:xfrm>
+          <a:custGeom>
+            <a:avLst/>
+            <a:gdLst/>
+            <a:ahLst/>
+            <a:cxnLst/>
+            <a:rect l="l" t="t" r="r" b="b"/>
+            <a:pathLst>
+              <a:path w="2112645" h="1440814">
+                <a:moveTo>
+                  <a:pt x="1844130" y="0"/>
+                </a:moveTo>
+                <a:lnTo>
+                  <a:pt x="0" y="0"/>
+                </a:lnTo>
+                <a:lnTo>
+                  <a:pt x="268527" y="720185"/>
+                </a:lnTo>
+                <a:lnTo>
+                  <a:pt x="0" y="1440370"/>
+                </a:lnTo>
+                <a:lnTo>
+                  <a:pt x="1844130" y="1440370"/>
+                </a:lnTo>
+                <a:lnTo>
+                  <a:pt x="2112657" y="720185"/>
+                </a:lnTo>
+                <a:lnTo>
+                  <a:pt x="1844130" y="0"/>
+                </a:lnTo>
+                <a:close/>
+              </a:path>
+            </a:pathLst>
+          </a:custGeom>
+        </p:spPr>
+        <p:style>
+          <a:lnRef idx="1">
+            <a:schemeClr val="accent1"/>
+          </a:lnRef>
+          <a:fillRef idx="2">
+            <a:schemeClr val="accent1"/>
+          </a:fillRef>
+          <a:effectRef idx="1">
+            <a:schemeClr val="accent1"/>
+          </a:effectRef>
+          <a:fontRef idx="minor">
+            <a:schemeClr val="dk1"/>
+          </a:fontRef>
+        </p:style>
+        <p:txBody>
+          <a:bodyPr wrap="square" lIns="0" tIns="0" rIns="0" bIns="0" rtlCol="0"/>
+          <a:lstStyle/>
+          <a:p>
+            <a:endParaRPr/>
+          </a:p>
+        </p:txBody>
+      </p:sp>
+      <p:sp>
+        <p:nvSpPr>
+          <p:cNvPr id="26" name="object 22">
+            <a:extLst>
+              <a:ext uri="{FF2B5EF4-FFF2-40B4-BE49-F238E27FC236}">
+                <a16:creationId xmlns:a16="http://schemas.microsoft.com/office/drawing/2014/main" id="{E49FA06E-0ABC-4B1E-BB4A-D6CACCE3F6CF}"/>
+              </a:ext>
+            </a:extLst>
+          </p:cNvPr>
+          <p:cNvSpPr/>
+          <p:nvPr/>
+        </p:nvSpPr>
+        <p:spPr>
+          <a:xfrm>
+            <a:off x="5047880" y="2231290"/>
+            <a:ext cx="2112645" cy="1440815"/>
+          </a:xfrm>
+          <a:custGeom>
+            <a:avLst/>
+            <a:gdLst/>
+            <a:ahLst/>
+            <a:cxnLst/>
+            <a:rect l="l" t="t" r="r" b="b"/>
+            <a:pathLst>
+              <a:path w="2112645" h="1440814">
+                <a:moveTo>
+                  <a:pt x="0" y="0"/>
+                </a:moveTo>
+                <a:lnTo>
+                  <a:pt x="1844130" y="0"/>
+                </a:lnTo>
+                <a:lnTo>
+                  <a:pt x="2112657" y="720185"/>
+                </a:lnTo>
+                <a:lnTo>
+                  <a:pt x="1844130" y="1440370"/>
+                </a:lnTo>
+                <a:lnTo>
+                  <a:pt x="0" y="1440370"/>
+                </a:lnTo>
+                <a:lnTo>
+                  <a:pt x="268527" y="720185"/>
+                </a:lnTo>
+                <a:lnTo>
+                  <a:pt x="0" y="0"/>
+                </a:lnTo>
+                <a:close/>
+              </a:path>
+            </a:pathLst>
+          </a:custGeom>
+          <a:ln w="9525">
+            <a:solidFill>
+              <a:srgbClr val="4F81BD"/>
+            </a:solidFill>
+          </a:ln>
+        </p:spPr>
+        <p:txBody>
+          <a:bodyPr wrap="square" lIns="0" tIns="0" rIns="0" bIns="0" rtlCol="0"/>
+          <a:lstStyle/>
+          <a:p>
+            <a:endParaRPr/>
+          </a:p>
+        </p:txBody>
+      </p:sp>
+      <p:sp>
+        <p:nvSpPr>
+          <p:cNvPr id="28" name="object 23">
+            <a:extLst>
+              <a:ext uri="{FF2B5EF4-FFF2-40B4-BE49-F238E27FC236}">
+                <a16:creationId xmlns:a16="http://schemas.microsoft.com/office/drawing/2014/main" id="{8A759E49-C682-4435-8487-82A2DE063276}"/>
+              </a:ext>
+            </a:extLst>
+          </p:cNvPr>
+          <p:cNvSpPr/>
+          <p:nvPr/>
+        </p:nvSpPr>
+        <p:spPr>
+          <a:xfrm>
+            <a:off x="3109314" y="2231290"/>
+            <a:ext cx="2114550" cy="1440815"/>
+          </a:xfrm>
+          <a:custGeom>
+            <a:avLst/>
+            <a:gdLst/>
+            <a:ahLst/>
+            <a:cxnLst/>
+            <a:rect l="l" t="t" r="r" b="b"/>
+            <a:pathLst>
+              <a:path w="2114550" h="1440814">
+                <a:moveTo>
+                  <a:pt x="1845452" y="0"/>
+                </a:moveTo>
+                <a:lnTo>
+                  <a:pt x="0" y="0"/>
+                </a:lnTo>
+                <a:lnTo>
+                  <a:pt x="268526" y="720185"/>
+                </a:lnTo>
+                <a:lnTo>
+                  <a:pt x="0" y="1440369"/>
+                </a:lnTo>
+                <a:lnTo>
+                  <a:pt x="1845452" y="1440369"/>
+                </a:lnTo>
+                <a:lnTo>
+                  <a:pt x="2113978" y="720185"/>
+                </a:lnTo>
+                <a:lnTo>
+                  <a:pt x="1845452" y="0"/>
+                </a:lnTo>
+                <a:close/>
+              </a:path>
+            </a:pathLst>
+          </a:custGeom>
+        </p:spPr>
+        <p:style>
+          <a:lnRef idx="1">
+            <a:schemeClr val="accent1"/>
+          </a:lnRef>
+          <a:fillRef idx="2">
+            <a:schemeClr val="accent1"/>
+          </a:fillRef>
+          <a:effectRef idx="1">
+            <a:schemeClr val="accent1"/>
+          </a:effectRef>
+          <a:fontRef idx="minor">
+            <a:schemeClr val="dk1"/>
+          </a:fontRef>
+        </p:style>
+        <p:txBody>
+          <a:bodyPr wrap="square" lIns="0" tIns="0" rIns="0" bIns="0" rtlCol="0"/>
+          <a:lstStyle/>
+          <a:p>
+            <a:endParaRPr/>
+          </a:p>
+        </p:txBody>
+      </p:sp>
+      <p:sp>
+        <p:nvSpPr>
+          <p:cNvPr id="29" name="object 24">
+            <a:extLst>
+              <a:ext uri="{FF2B5EF4-FFF2-40B4-BE49-F238E27FC236}">
+                <a16:creationId xmlns:a16="http://schemas.microsoft.com/office/drawing/2014/main" id="{8FC0A99E-1939-4291-A466-EA7902F6ABE2}"/>
+              </a:ext>
+            </a:extLst>
+          </p:cNvPr>
+          <p:cNvSpPr/>
+          <p:nvPr/>
+        </p:nvSpPr>
+        <p:spPr>
+          <a:xfrm>
+            <a:off x="3109314" y="2231290"/>
+            <a:ext cx="2114550" cy="1440815"/>
+          </a:xfrm>
+          <a:custGeom>
+            <a:avLst/>
+            <a:gdLst/>
+            <a:ahLst/>
+            <a:cxnLst/>
+            <a:rect l="l" t="t" r="r" b="b"/>
+            <a:pathLst>
+              <a:path w="2114550" h="1440814">
+                <a:moveTo>
+                  <a:pt x="0" y="0"/>
+                </a:moveTo>
+                <a:lnTo>
+                  <a:pt x="1845452" y="0"/>
+                </a:lnTo>
+                <a:lnTo>
+                  <a:pt x="2113979" y="720184"/>
+                </a:lnTo>
+                <a:lnTo>
+                  <a:pt x="1845452" y="1440369"/>
+                </a:lnTo>
+                <a:lnTo>
+                  <a:pt x="0" y="1440369"/>
+                </a:lnTo>
+                <a:lnTo>
+                  <a:pt x="268526" y="720184"/>
+                </a:lnTo>
+                <a:lnTo>
+                  <a:pt x="0" y="0"/>
+                </a:lnTo>
+                <a:close/>
+              </a:path>
+            </a:pathLst>
+          </a:custGeom>
+          <a:ln w="9525">
+            <a:solidFill>
+              <a:srgbClr val="4F81BD"/>
+            </a:solidFill>
+          </a:ln>
+        </p:spPr>
+        <p:txBody>
+          <a:bodyPr wrap="square" lIns="0" tIns="0" rIns="0" bIns="0" rtlCol="0"/>
+          <a:lstStyle/>
+          <a:p>
+            <a:endParaRPr/>
+          </a:p>
+        </p:txBody>
+      </p:sp>
+      <p:sp>
+        <p:nvSpPr>
+          <p:cNvPr id="30" name="object 25">
+            <a:extLst>
+              <a:ext uri="{FF2B5EF4-FFF2-40B4-BE49-F238E27FC236}">
+                <a16:creationId xmlns:a16="http://schemas.microsoft.com/office/drawing/2014/main" id="{F992D5D0-2A1E-49F4-921D-E60D5D5D07D3}"/>
+              </a:ext>
+            </a:extLst>
+          </p:cNvPr>
+          <p:cNvSpPr/>
+          <p:nvPr/>
+        </p:nvSpPr>
+        <p:spPr>
+          <a:xfrm>
+            <a:off x="1731134" y="2231290"/>
+            <a:ext cx="1587500" cy="1440815"/>
+          </a:xfrm>
+          <a:custGeom>
+            <a:avLst/>
+            <a:gdLst/>
+            <a:ahLst/>
+            <a:cxnLst/>
+            <a:rect l="l" t="t" r="r" b="b"/>
+            <a:pathLst>
+              <a:path w="1587500" h="1440814">
+                <a:moveTo>
+                  <a:pt x="1308724" y="0"/>
+                </a:moveTo>
+                <a:lnTo>
+                  <a:pt x="0" y="0"/>
+                </a:lnTo>
+                <a:lnTo>
+                  <a:pt x="0" y="1440370"/>
+                </a:lnTo>
+                <a:lnTo>
+                  <a:pt x="1308724" y="1440370"/>
+                </a:lnTo>
+                <a:lnTo>
+                  <a:pt x="1587176" y="720186"/>
+                </a:lnTo>
+                <a:lnTo>
+                  <a:pt x="1308724" y="0"/>
+                </a:lnTo>
+                <a:close/>
+              </a:path>
+            </a:pathLst>
+          </a:custGeom>
+        </p:spPr>
+        <p:style>
+          <a:lnRef idx="1">
+            <a:schemeClr val="accent1"/>
+          </a:lnRef>
+          <a:fillRef idx="2">
+            <a:schemeClr val="accent1"/>
+          </a:fillRef>
+          <a:effectRef idx="1">
+            <a:schemeClr val="accent1"/>
+          </a:effectRef>
+          <a:fontRef idx="minor">
+            <a:schemeClr val="dk1"/>
+          </a:fontRef>
+        </p:style>
+        <p:txBody>
+          <a:bodyPr wrap="square" lIns="0" tIns="0" rIns="0" bIns="0" rtlCol="0"/>
+          <a:lstStyle/>
+          <a:p>
+            <a:endParaRPr/>
+          </a:p>
+        </p:txBody>
+      </p:sp>
+      <p:sp>
+        <p:nvSpPr>
+          <p:cNvPr id="31" name="object 26">
+            <a:extLst>
+              <a:ext uri="{FF2B5EF4-FFF2-40B4-BE49-F238E27FC236}">
+                <a16:creationId xmlns:a16="http://schemas.microsoft.com/office/drawing/2014/main" id="{9A976221-E4E9-4390-AA66-0028E2E03A70}"/>
+              </a:ext>
+            </a:extLst>
+          </p:cNvPr>
+          <p:cNvSpPr/>
+          <p:nvPr/>
+        </p:nvSpPr>
+        <p:spPr>
+          <a:xfrm>
+            <a:off x="1731134" y="2231290"/>
+            <a:ext cx="1587500" cy="1440815"/>
+          </a:xfrm>
+          <a:custGeom>
+            <a:avLst/>
+            <a:gdLst/>
+            <a:ahLst/>
+            <a:cxnLst/>
+            <a:rect l="l" t="t" r="r" b="b"/>
+            <a:pathLst>
+              <a:path w="1587500" h="1440814">
+                <a:moveTo>
+                  <a:pt x="0" y="0"/>
+                </a:moveTo>
+                <a:lnTo>
+                  <a:pt x="1308725" y="0"/>
+                </a:lnTo>
+                <a:lnTo>
+                  <a:pt x="1587177" y="720185"/>
+                </a:lnTo>
+                <a:lnTo>
+                  <a:pt x="1308725" y="1440370"/>
+                </a:lnTo>
+                <a:lnTo>
+                  <a:pt x="0" y="1440370"/>
+                </a:lnTo>
+                <a:lnTo>
+                  <a:pt x="0" y="0"/>
+                </a:lnTo>
+                <a:close/>
+              </a:path>
+            </a:pathLst>
+          </a:custGeom>
+          <a:ln w="9525">
+            <a:solidFill>
+              <a:srgbClr val="4F81BD"/>
+            </a:solidFill>
+          </a:ln>
+        </p:spPr>
+        <p:txBody>
+          <a:bodyPr wrap="square" lIns="0" tIns="0" rIns="0" bIns="0" rtlCol="0"/>
+          <a:lstStyle/>
+          <a:p>
+            <a:endParaRPr/>
+          </a:p>
+        </p:txBody>
+      </p:sp>
+      <p:sp>
+        <p:nvSpPr>
+          <p:cNvPr id="32" name="object 27">
+            <a:extLst>
+              <a:ext uri="{FF2B5EF4-FFF2-40B4-BE49-F238E27FC236}">
+                <a16:creationId xmlns:a16="http://schemas.microsoft.com/office/drawing/2014/main" id="{BE962421-E625-46EA-9D52-3982D03B8DED}"/>
+              </a:ext>
+            </a:extLst>
+          </p:cNvPr>
+          <p:cNvSpPr txBox="1"/>
+          <p:nvPr/>
+        </p:nvSpPr>
+        <p:spPr>
+          <a:xfrm>
+            <a:off x="1804823" y="2663216"/>
+            <a:ext cx="1304491" cy="171201"/>
+          </a:xfrm>
+          <a:prstGeom prst="rect">
+            <a:avLst/>
+          </a:prstGeom>
+          <a:solidFill>
+            <a:srgbClr val="FFFF00"/>
+          </a:solidFill>
+          <a:ln>
+            <a:noFill/>
+          </a:ln>
+        </p:spPr>
+        <p:txBody>
+          <a:bodyPr vert="horz" wrap="square" lIns="0" tIns="9525" rIns="0" bIns="0" rtlCol="0">
+            <a:spAutoFit/>
+          </a:bodyPr>
+          <a:lstStyle/>
+          <a:p>
+            <a:pPr marL="15240">
+              <a:spcBef>
+                <a:spcPts val="75"/>
+              </a:spcBef>
+            </a:pPr>
+            <a:r>
+              <a:rPr sz="1050" dirty="0">
+                <a:latin typeface="Arial"/>
+                <a:cs typeface="Arial"/>
+              </a:rPr>
+              <a:t>Elk River</a:t>
+            </a:r>
+            <a:r>
+              <a:rPr sz="1050" spc="-60" dirty="0">
+                <a:latin typeface="Arial"/>
+                <a:cs typeface="Arial"/>
+              </a:rPr>
+              <a:t> </a:t>
+            </a:r>
+            <a:r>
+              <a:rPr sz="1050" dirty="0">
+                <a:latin typeface="Arial"/>
+                <a:cs typeface="Arial"/>
+              </a:rPr>
+              <a:t>WebSite</a:t>
+            </a:r>
+          </a:p>
+        </p:txBody>
+      </p:sp>
+      <p:sp>
+        <p:nvSpPr>
+          <p:cNvPr id="33" name="object 28">
+            <a:extLst>
+              <a:ext uri="{FF2B5EF4-FFF2-40B4-BE49-F238E27FC236}">
+                <a16:creationId xmlns:a16="http://schemas.microsoft.com/office/drawing/2014/main" id="{7DA1F826-7594-454A-B7F1-5C191E31EB05}"/>
+              </a:ext>
+            </a:extLst>
+          </p:cNvPr>
+          <p:cNvSpPr txBox="1"/>
+          <p:nvPr/>
+        </p:nvSpPr>
+        <p:spPr>
+          <a:xfrm>
+            <a:off x="1810318" y="2347165"/>
+            <a:ext cx="1261745" cy="171201"/>
+          </a:xfrm>
+          <a:prstGeom prst="rect">
+            <a:avLst/>
+          </a:prstGeom>
+          <a:solidFill>
+            <a:srgbClr val="96D35F"/>
+          </a:solidFill>
+        </p:spPr>
+        <p:txBody>
+          <a:bodyPr vert="horz" wrap="square" lIns="0" tIns="9525" rIns="0" bIns="0" rtlCol="0">
+            <a:spAutoFit/>
+          </a:bodyPr>
+          <a:lstStyle/>
+          <a:p>
+            <a:pPr marL="15240">
+              <a:spcBef>
+                <a:spcPts val="75"/>
+              </a:spcBef>
+            </a:pPr>
+            <a:r>
+              <a:rPr sz="1050" dirty="0">
+                <a:latin typeface="Arial"/>
+                <a:cs typeface="Arial"/>
+              </a:rPr>
+              <a:t>Elk River</a:t>
+            </a:r>
+            <a:r>
+              <a:rPr sz="1050" spc="-110" dirty="0">
+                <a:latin typeface="Arial"/>
+                <a:cs typeface="Arial"/>
+              </a:rPr>
+              <a:t> </a:t>
+            </a:r>
+            <a:r>
+              <a:rPr sz="1050" dirty="0">
+                <a:latin typeface="Arial"/>
+                <a:cs typeface="Arial"/>
+              </a:rPr>
+              <a:t>Awareness</a:t>
+            </a:r>
+          </a:p>
+        </p:txBody>
+      </p:sp>
+      <p:sp>
+        <p:nvSpPr>
+          <p:cNvPr id="34" name="object 29">
+            <a:extLst>
+              <a:ext uri="{FF2B5EF4-FFF2-40B4-BE49-F238E27FC236}">
+                <a16:creationId xmlns:a16="http://schemas.microsoft.com/office/drawing/2014/main" id="{A160A06E-FBBB-401D-A490-B75CAB84C36E}"/>
+              </a:ext>
+            </a:extLst>
+          </p:cNvPr>
+          <p:cNvSpPr txBox="1"/>
+          <p:nvPr/>
+        </p:nvSpPr>
+        <p:spPr>
+          <a:xfrm>
+            <a:off x="7262191" y="2347165"/>
+            <a:ext cx="1085215" cy="171201"/>
+          </a:xfrm>
+          <a:prstGeom prst="rect">
+            <a:avLst/>
+          </a:prstGeom>
+          <a:solidFill>
+            <a:srgbClr val="96D35F"/>
+          </a:solidFill>
+        </p:spPr>
+        <p:txBody>
+          <a:bodyPr vert="horz" wrap="square" lIns="0" tIns="9525" rIns="0" bIns="0" rtlCol="0">
+            <a:spAutoFit/>
+          </a:bodyPr>
+          <a:lstStyle/>
+          <a:p>
+            <a:pPr marL="15240">
+              <a:spcBef>
+                <a:spcPts val="75"/>
+              </a:spcBef>
+            </a:pPr>
+            <a:r>
+              <a:rPr sz="1050" dirty="0">
+                <a:latin typeface="Arial"/>
+                <a:cs typeface="Arial"/>
+              </a:rPr>
+              <a:t>Payment</a:t>
+            </a:r>
+            <a:r>
+              <a:rPr sz="1050" spc="-40" dirty="0">
+                <a:latin typeface="Arial"/>
+                <a:cs typeface="Arial"/>
+              </a:rPr>
+              <a:t> </a:t>
+            </a:r>
+            <a:r>
+              <a:rPr sz="1050" dirty="0">
+                <a:latin typeface="Arial"/>
+                <a:cs typeface="Arial"/>
+              </a:rPr>
+              <a:t>Process</a:t>
+            </a:r>
+            <a:endParaRPr sz="1050">
+              <a:latin typeface="Arial"/>
+              <a:cs typeface="Arial"/>
+            </a:endParaRPr>
+          </a:p>
+        </p:txBody>
+      </p:sp>
+      <p:sp>
+        <p:nvSpPr>
+          <p:cNvPr id="36" name="object 30">
+            <a:extLst>
+              <a:ext uri="{FF2B5EF4-FFF2-40B4-BE49-F238E27FC236}">
+                <a16:creationId xmlns:a16="http://schemas.microsoft.com/office/drawing/2014/main" id="{ABEBF606-FD2D-457E-87E3-AE852E1C216D}"/>
+              </a:ext>
+            </a:extLst>
+          </p:cNvPr>
+          <p:cNvSpPr txBox="1"/>
+          <p:nvPr/>
+        </p:nvSpPr>
+        <p:spPr>
+          <a:xfrm>
+            <a:off x="5350086" y="2347165"/>
+            <a:ext cx="709295" cy="171201"/>
+          </a:xfrm>
+          <a:prstGeom prst="rect">
+            <a:avLst/>
+          </a:prstGeom>
+          <a:solidFill>
+            <a:srgbClr val="96D35F"/>
+          </a:solidFill>
+        </p:spPr>
+        <p:txBody>
+          <a:bodyPr vert="horz" wrap="square" lIns="0" tIns="9525" rIns="0" bIns="0" rtlCol="0">
+            <a:spAutoFit/>
+          </a:bodyPr>
+          <a:lstStyle/>
+          <a:p>
+            <a:pPr marL="15240">
+              <a:spcBef>
+                <a:spcPts val="75"/>
+              </a:spcBef>
+            </a:pPr>
+            <a:r>
+              <a:rPr sz="1050" dirty="0">
+                <a:latin typeface="Arial"/>
+                <a:cs typeface="Arial"/>
+              </a:rPr>
+              <a:t>Serach</a:t>
+            </a:r>
+            <a:r>
+              <a:rPr sz="1050" spc="-80" dirty="0">
+                <a:latin typeface="Arial"/>
+                <a:cs typeface="Arial"/>
+              </a:rPr>
+              <a:t> </a:t>
+            </a:r>
+            <a:r>
+              <a:rPr sz="1050" spc="-40" dirty="0">
+                <a:latin typeface="Arial"/>
+                <a:cs typeface="Arial"/>
+              </a:rPr>
+              <a:t>Tab</a:t>
+            </a:r>
+            <a:endParaRPr sz="1050">
+              <a:latin typeface="Arial"/>
+              <a:cs typeface="Arial"/>
+            </a:endParaRPr>
+          </a:p>
+        </p:txBody>
+      </p:sp>
+      <p:sp>
+        <p:nvSpPr>
+          <p:cNvPr id="37" name="object 31">
+            <a:extLst>
+              <a:ext uri="{FF2B5EF4-FFF2-40B4-BE49-F238E27FC236}">
+                <a16:creationId xmlns:a16="http://schemas.microsoft.com/office/drawing/2014/main" id="{D1AC1826-23AC-4A21-B455-FEE4FE509D20}"/>
+              </a:ext>
+            </a:extLst>
+          </p:cNvPr>
+          <p:cNvSpPr txBox="1"/>
+          <p:nvPr/>
+        </p:nvSpPr>
+        <p:spPr>
+          <a:xfrm>
+            <a:off x="3422176" y="2663216"/>
+            <a:ext cx="726440" cy="171201"/>
+          </a:xfrm>
+          <a:prstGeom prst="rect">
+            <a:avLst/>
+          </a:prstGeom>
+          <a:solidFill>
+            <a:srgbClr val="FFFC41"/>
+          </a:solidFill>
+        </p:spPr>
+        <p:txBody>
+          <a:bodyPr vert="horz" wrap="square" lIns="0" tIns="9525" rIns="0" bIns="0" rtlCol="0">
+            <a:spAutoFit/>
+          </a:bodyPr>
+          <a:lstStyle/>
+          <a:p>
+            <a:pPr marL="15240">
+              <a:spcBef>
+                <a:spcPts val="75"/>
+              </a:spcBef>
+            </a:pPr>
+            <a:r>
+              <a:rPr sz="1050" dirty="0">
+                <a:latin typeface="Arial"/>
+                <a:cs typeface="Arial"/>
+              </a:rPr>
+              <a:t>App</a:t>
+            </a:r>
+            <a:r>
+              <a:rPr sz="1050" spc="-65" dirty="0">
+                <a:latin typeface="Arial"/>
+                <a:cs typeface="Arial"/>
+              </a:rPr>
+              <a:t> </a:t>
+            </a:r>
+            <a:r>
+              <a:rPr sz="1050" dirty="0">
+                <a:latin typeface="Arial"/>
+                <a:cs typeface="Arial"/>
+              </a:rPr>
+              <a:t>Design</a:t>
+            </a:r>
+            <a:endParaRPr sz="1050">
+              <a:latin typeface="Arial"/>
+              <a:cs typeface="Arial"/>
+            </a:endParaRPr>
+          </a:p>
+        </p:txBody>
+      </p:sp>
+      <p:sp>
+        <p:nvSpPr>
+          <p:cNvPr id="38" name="object 32">
+            <a:extLst>
+              <a:ext uri="{FF2B5EF4-FFF2-40B4-BE49-F238E27FC236}">
+                <a16:creationId xmlns:a16="http://schemas.microsoft.com/office/drawing/2014/main" id="{93C7E9C7-0F4C-4CB9-9A77-D0EFCE243960}"/>
+              </a:ext>
+            </a:extLst>
+          </p:cNvPr>
+          <p:cNvSpPr txBox="1"/>
+          <p:nvPr/>
+        </p:nvSpPr>
+        <p:spPr>
+          <a:xfrm>
+            <a:off x="3390570" y="2347165"/>
+            <a:ext cx="1174751" cy="171201"/>
+          </a:xfrm>
+          <a:prstGeom prst="rect">
+            <a:avLst/>
+          </a:prstGeom>
+          <a:solidFill>
+            <a:srgbClr val="FFFC41"/>
+          </a:solidFill>
+        </p:spPr>
+        <p:txBody>
+          <a:bodyPr vert="horz" wrap="square" lIns="0" tIns="9525" rIns="0" bIns="0" rtlCol="0">
+            <a:spAutoFit/>
+          </a:bodyPr>
+          <a:lstStyle/>
+          <a:p>
+            <a:pPr marL="15240">
+              <a:spcBef>
+                <a:spcPts val="75"/>
+              </a:spcBef>
+            </a:pPr>
+            <a:r>
+              <a:rPr sz="1050" dirty="0">
+                <a:latin typeface="Arial"/>
+                <a:cs typeface="Arial"/>
+              </a:rPr>
+              <a:t>App Store</a:t>
+            </a:r>
+            <a:r>
+              <a:rPr sz="1050" spc="-40" dirty="0">
+                <a:latin typeface="Arial"/>
+                <a:cs typeface="Arial"/>
+              </a:rPr>
+              <a:t> </a:t>
+            </a:r>
+            <a:r>
+              <a:rPr sz="1050" dirty="0">
+                <a:latin typeface="Arial"/>
+                <a:cs typeface="Arial"/>
+              </a:rPr>
+              <a:t>Reviews</a:t>
+            </a:r>
+            <a:endParaRPr sz="1050">
+              <a:latin typeface="Arial"/>
+              <a:cs typeface="Arial"/>
+            </a:endParaRPr>
+          </a:p>
+        </p:txBody>
+      </p:sp>
+      <p:sp>
+        <p:nvSpPr>
+          <p:cNvPr id="39" name="object 33">
+            <a:extLst>
+              <a:ext uri="{FF2B5EF4-FFF2-40B4-BE49-F238E27FC236}">
+                <a16:creationId xmlns:a16="http://schemas.microsoft.com/office/drawing/2014/main" id="{D63C3E24-7890-4A0E-90EE-6467BC1851A9}"/>
+              </a:ext>
+            </a:extLst>
+          </p:cNvPr>
+          <p:cNvSpPr txBox="1"/>
+          <p:nvPr/>
+        </p:nvSpPr>
+        <p:spPr>
+          <a:xfrm>
+            <a:off x="3417376" y="2931851"/>
+            <a:ext cx="742950" cy="318135"/>
+          </a:xfrm>
+          <a:prstGeom prst="rect">
+            <a:avLst/>
+          </a:prstGeom>
+        </p:spPr>
+        <p:txBody>
+          <a:bodyPr vert="horz" wrap="square" lIns="0" tIns="0" rIns="0" bIns="0" rtlCol="0">
+            <a:spAutoFit/>
+          </a:bodyPr>
+          <a:lstStyle/>
+          <a:p>
+            <a:pPr marL="12700" marR="5080">
+              <a:lnSpc>
+                <a:spcPts val="1200"/>
+              </a:lnSpc>
+            </a:pPr>
+            <a:r>
+              <a:rPr sz="1050" dirty="0">
+                <a:latin typeface="Arial"/>
+                <a:cs typeface="Arial"/>
+              </a:rPr>
+              <a:t>Registration  (optional)</a:t>
+            </a:r>
+            <a:endParaRPr sz="1050">
+              <a:latin typeface="Arial"/>
+              <a:cs typeface="Arial"/>
+            </a:endParaRPr>
+          </a:p>
+        </p:txBody>
+      </p:sp>
+      <p:sp>
+        <p:nvSpPr>
+          <p:cNvPr id="40" name="object 34">
+            <a:extLst>
+              <a:ext uri="{FF2B5EF4-FFF2-40B4-BE49-F238E27FC236}">
+                <a16:creationId xmlns:a16="http://schemas.microsoft.com/office/drawing/2014/main" id="{CF7BDC43-18AE-4950-A52C-270C23F840E9}"/>
+              </a:ext>
+            </a:extLst>
+          </p:cNvPr>
+          <p:cNvSpPr txBox="1"/>
+          <p:nvPr/>
+        </p:nvSpPr>
+        <p:spPr>
+          <a:xfrm>
+            <a:off x="5381690" y="2987169"/>
+            <a:ext cx="1443990" cy="171201"/>
+          </a:xfrm>
+          <a:prstGeom prst="rect">
+            <a:avLst/>
+          </a:prstGeom>
+          <a:solidFill>
+            <a:srgbClr val="FF6251"/>
+          </a:solidFill>
+        </p:spPr>
+        <p:txBody>
+          <a:bodyPr vert="horz" wrap="square" lIns="0" tIns="9525" rIns="0" bIns="0" rtlCol="0">
+            <a:spAutoFit/>
+          </a:bodyPr>
+          <a:lstStyle/>
+          <a:p>
+            <a:pPr marL="15240">
+              <a:spcBef>
+                <a:spcPts val="75"/>
+              </a:spcBef>
+            </a:pPr>
+            <a:r>
+              <a:rPr sz="1050" dirty="0">
+                <a:latin typeface="Arial"/>
+                <a:cs typeface="Arial"/>
+              </a:rPr>
+              <a:t>Locals</a:t>
+            </a:r>
+            <a:r>
+              <a:rPr sz="1050" spc="-20" dirty="0">
+                <a:latin typeface="Arial"/>
+                <a:cs typeface="Arial"/>
+              </a:rPr>
+              <a:t> </a:t>
+            </a:r>
+            <a:r>
+              <a:rPr sz="1050" dirty="0">
+                <a:latin typeface="Arial"/>
+                <a:cs typeface="Arial"/>
+              </a:rPr>
+              <a:t>Responsiveness</a:t>
+            </a:r>
+            <a:endParaRPr sz="1050">
+              <a:latin typeface="Arial"/>
+              <a:cs typeface="Arial"/>
+            </a:endParaRPr>
+          </a:p>
+        </p:txBody>
+      </p:sp>
+      <p:sp>
+        <p:nvSpPr>
+          <p:cNvPr id="41" name="object 35">
+            <a:extLst>
+              <a:ext uri="{FF2B5EF4-FFF2-40B4-BE49-F238E27FC236}">
+                <a16:creationId xmlns:a16="http://schemas.microsoft.com/office/drawing/2014/main" id="{4523D2B9-3E3D-4342-ACA0-730A9219C8C3}"/>
+              </a:ext>
+            </a:extLst>
+          </p:cNvPr>
+          <p:cNvSpPr txBox="1"/>
+          <p:nvPr/>
+        </p:nvSpPr>
+        <p:spPr>
+          <a:xfrm>
+            <a:off x="5365888" y="2663216"/>
+            <a:ext cx="1234440" cy="171201"/>
+          </a:xfrm>
+          <a:prstGeom prst="rect">
+            <a:avLst/>
+          </a:prstGeom>
+          <a:solidFill>
+            <a:srgbClr val="FFFC41"/>
+          </a:solidFill>
+        </p:spPr>
+        <p:txBody>
+          <a:bodyPr vert="horz" wrap="square" lIns="0" tIns="9525" rIns="0" bIns="0" rtlCol="0">
+            <a:spAutoFit/>
+          </a:bodyPr>
+          <a:lstStyle/>
+          <a:p>
+            <a:pPr marL="15240">
+              <a:spcBef>
+                <a:spcPts val="75"/>
+              </a:spcBef>
+            </a:pPr>
+            <a:r>
+              <a:rPr sz="1050" dirty="0">
+                <a:latin typeface="Arial"/>
+                <a:cs typeface="Arial"/>
+              </a:rPr>
+              <a:t>Application</a:t>
+            </a:r>
+            <a:r>
+              <a:rPr sz="1050" spc="-30" dirty="0">
+                <a:latin typeface="Arial"/>
+                <a:cs typeface="Arial"/>
+              </a:rPr>
+              <a:t> </a:t>
+            </a:r>
+            <a:r>
+              <a:rPr sz="1050" dirty="0">
+                <a:latin typeface="Arial"/>
+                <a:cs typeface="Arial"/>
+              </a:rPr>
+              <a:t>Usability</a:t>
+            </a:r>
+            <a:endParaRPr sz="1050">
+              <a:latin typeface="Arial"/>
+              <a:cs typeface="Arial"/>
+            </a:endParaRPr>
+          </a:p>
+        </p:txBody>
+      </p:sp>
+      <p:sp>
+        <p:nvSpPr>
+          <p:cNvPr id="42" name="object 36">
+            <a:extLst>
+              <a:ext uri="{FF2B5EF4-FFF2-40B4-BE49-F238E27FC236}">
+                <a16:creationId xmlns:a16="http://schemas.microsoft.com/office/drawing/2014/main" id="{27530ABB-6B51-4AA9-AC41-BDD55027FC01}"/>
+              </a:ext>
+            </a:extLst>
+          </p:cNvPr>
+          <p:cNvSpPr txBox="1"/>
+          <p:nvPr/>
+        </p:nvSpPr>
+        <p:spPr>
+          <a:xfrm>
+            <a:off x="1804823" y="2987169"/>
+            <a:ext cx="1170305" cy="171201"/>
+          </a:xfrm>
+          <a:prstGeom prst="rect">
+            <a:avLst/>
+          </a:prstGeom>
+          <a:solidFill>
+            <a:srgbClr val="96D35F"/>
+          </a:solidFill>
+        </p:spPr>
+        <p:txBody>
+          <a:bodyPr vert="horz" wrap="square" lIns="0" tIns="9525" rIns="0" bIns="0" rtlCol="0">
+            <a:spAutoFit/>
+          </a:bodyPr>
+          <a:lstStyle/>
+          <a:p>
+            <a:pPr marL="15240">
+              <a:spcBef>
+                <a:spcPts val="75"/>
+              </a:spcBef>
+            </a:pPr>
+            <a:r>
+              <a:rPr sz="1050" dirty="0">
+                <a:latin typeface="Arial"/>
+                <a:cs typeface="Arial"/>
+              </a:rPr>
+              <a:t>Radio / Social</a:t>
+            </a:r>
+            <a:r>
+              <a:rPr sz="1050" spc="-105" dirty="0">
+                <a:latin typeface="Arial"/>
+                <a:cs typeface="Arial"/>
+              </a:rPr>
+              <a:t> </a:t>
+            </a:r>
+            <a:r>
+              <a:rPr sz="1050" dirty="0">
+                <a:latin typeface="Arial"/>
+                <a:cs typeface="Arial"/>
+              </a:rPr>
+              <a:t>Ads</a:t>
+            </a:r>
+            <a:endParaRPr sz="1050">
+              <a:latin typeface="Arial"/>
+              <a:cs typeface="Arial"/>
+            </a:endParaRPr>
+          </a:p>
+        </p:txBody>
+      </p:sp>
+      <p:sp>
+        <p:nvSpPr>
+          <p:cNvPr id="43" name="object 37">
+            <a:extLst>
+              <a:ext uri="{FF2B5EF4-FFF2-40B4-BE49-F238E27FC236}">
+                <a16:creationId xmlns:a16="http://schemas.microsoft.com/office/drawing/2014/main" id="{4C6441C5-5778-4C97-8D05-0993844E3DFA}"/>
+              </a:ext>
+            </a:extLst>
+          </p:cNvPr>
+          <p:cNvSpPr txBox="1"/>
+          <p:nvPr/>
+        </p:nvSpPr>
+        <p:spPr>
+          <a:xfrm>
+            <a:off x="1807925" y="3271605"/>
+            <a:ext cx="785495" cy="318135"/>
+          </a:xfrm>
+          <a:prstGeom prst="rect">
+            <a:avLst/>
+          </a:prstGeom>
+        </p:spPr>
+        <p:txBody>
+          <a:bodyPr vert="horz" wrap="square" lIns="0" tIns="0" rIns="0" bIns="0" rtlCol="0">
+            <a:spAutoFit/>
+          </a:bodyPr>
+          <a:lstStyle/>
+          <a:p>
+            <a:pPr marL="12700" marR="5080">
+              <a:lnSpc>
+                <a:spcPts val="1200"/>
+              </a:lnSpc>
+            </a:pPr>
+            <a:r>
+              <a:rPr sz="1050" dirty="0">
+                <a:latin typeface="Arial"/>
+                <a:cs typeface="Arial"/>
+              </a:rPr>
+              <a:t>App</a:t>
+            </a:r>
+            <a:r>
+              <a:rPr sz="1050" spc="-75" dirty="0">
+                <a:latin typeface="Arial"/>
+                <a:cs typeface="Arial"/>
+              </a:rPr>
+              <a:t> </a:t>
+            </a:r>
+            <a:r>
+              <a:rPr sz="1050" dirty="0">
+                <a:latin typeface="Arial"/>
+                <a:cs typeface="Arial"/>
+              </a:rPr>
+              <a:t>Website  </a:t>
+            </a:r>
+            <a:r>
+              <a:rPr lang="it-IT" sz="1050" dirty="0">
+                <a:latin typeface="Arial"/>
+                <a:cs typeface="Arial"/>
+              </a:rPr>
+              <a:t>(optional)</a:t>
+            </a:r>
+            <a:endParaRPr sz="1050" dirty="0">
+              <a:latin typeface="Arial"/>
+              <a:cs typeface="Arial"/>
+            </a:endParaRPr>
+          </a:p>
+        </p:txBody>
+      </p:sp>
+      <p:sp>
+        <p:nvSpPr>
+          <p:cNvPr id="44" name="object 38">
+            <a:extLst>
+              <a:ext uri="{FF2B5EF4-FFF2-40B4-BE49-F238E27FC236}">
+                <a16:creationId xmlns:a16="http://schemas.microsoft.com/office/drawing/2014/main" id="{F9313599-4AEE-4FE5-8975-9D47E29C1413}"/>
+              </a:ext>
+            </a:extLst>
+          </p:cNvPr>
+          <p:cNvSpPr txBox="1"/>
+          <p:nvPr/>
+        </p:nvSpPr>
+        <p:spPr>
+          <a:xfrm>
+            <a:off x="7309601" y="2663216"/>
+            <a:ext cx="883919" cy="171201"/>
+          </a:xfrm>
+          <a:prstGeom prst="rect">
+            <a:avLst/>
+          </a:prstGeom>
+          <a:solidFill>
+            <a:srgbClr val="FFFC41"/>
+          </a:solidFill>
+        </p:spPr>
+        <p:txBody>
+          <a:bodyPr vert="horz" wrap="square" lIns="0" tIns="9525" rIns="0" bIns="0" rtlCol="0">
+            <a:spAutoFit/>
+          </a:bodyPr>
+          <a:lstStyle/>
+          <a:p>
+            <a:pPr marL="15240">
+              <a:spcBef>
+                <a:spcPts val="75"/>
+              </a:spcBef>
+            </a:pPr>
+            <a:r>
+              <a:rPr sz="1050" dirty="0">
+                <a:latin typeface="Arial"/>
+                <a:cs typeface="Arial"/>
+              </a:rPr>
+              <a:t>In-App</a:t>
+            </a:r>
+            <a:r>
+              <a:rPr sz="1050" spc="-55" dirty="0">
+                <a:latin typeface="Arial"/>
+                <a:cs typeface="Arial"/>
+              </a:rPr>
+              <a:t> </a:t>
+            </a:r>
+            <a:r>
+              <a:rPr sz="1050" dirty="0">
+                <a:latin typeface="Arial"/>
+                <a:cs typeface="Arial"/>
+              </a:rPr>
+              <a:t>Bundle</a:t>
+            </a:r>
+            <a:endParaRPr sz="1050">
+              <a:latin typeface="Arial"/>
+              <a:cs typeface="Arial"/>
+            </a:endParaRPr>
+          </a:p>
+        </p:txBody>
+      </p:sp>
+      <p:sp>
+        <p:nvSpPr>
+          <p:cNvPr id="45" name="object 39">
+            <a:extLst>
+              <a:ext uri="{FF2B5EF4-FFF2-40B4-BE49-F238E27FC236}">
+                <a16:creationId xmlns:a16="http://schemas.microsoft.com/office/drawing/2014/main" id="{2F3EC8ED-378A-402A-86F5-9D583F70A6D2}"/>
+              </a:ext>
+            </a:extLst>
+          </p:cNvPr>
+          <p:cNvSpPr txBox="1"/>
+          <p:nvPr/>
+        </p:nvSpPr>
+        <p:spPr>
+          <a:xfrm>
+            <a:off x="7325401" y="2910968"/>
+            <a:ext cx="1480820" cy="336550"/>
+          </a:xfrm>
+          <a:prstGeom prst="rect">
+            <a:avLst/>
+          </a:prstGeom>
+          <a:solidFill>
+            <a:srgbClr val="FFFC41"/>
+          </a:solidFill>
+        </p:spPr>
+        <p:txBody>
+          <a:bodyPr vert="horz" wrap="square" lIns="0" tIns="20955" rIns="0" bIns="0" rtlCol="0">
+            <a:spAutoFit/>
+          </a:bodyPr>
+          <a:lstStyle/>
+          <a:p>
+            <a:pPr marL="15240" marR="45085">
+              <a:lnSpc>
+                <a:spcPts val="1200"/>
+              </a:lnSpc>
+              <a:spcBef>
+                <a:spcPts val="165"/>
+              </a:spcBef>
+            </a:pPr>
+            <a:r>
+              <a:rPr sz="1050" dirty="0">
+                <a:latin typeface="Arial"/>
+                <a:cs typeface="Arial"/>
+              </a:rPr>
+              <a:t>Actual quality of</a:t>
+            </a:r>
+            <a:r>
+              <a:rPr sz="1050" spc="-25" dirty="0">
+                <a:latin typeface="Arial"/>
+                <a:cs typeface="Arial"/>
+              </a:rPr>
+              <a:t> </a:t>
+            </a:r>
+            <a:r>
+              <a:rPr sz="1050" dirty="0">
+                <a:latin typeface="Arial"/>
+                <a:cs typeface="Arial"/>
+              </a:rPr>
+              <a:t>service  (on</a:t>
+            </a:r>
+            <a:r>
+              <a:rPr sz="1050" spc="-75" dirty="0">
+                <a:latin typeface="Arial"/>
+                <a:cs typeface="Arial"/>
+              </a:rPr>
+              <a:t> </a:t>
+            </a:r>
+            <a:r>
+              <a:rPr sz="1050" dirty="0">
+                <a:latin typeface="Arial"/>
+                <a:cs typeface="Arial"/>
+              </a:rPr>
+              <a:t>field)</a:t>
+            </a:r>
+            <a:endParaRPr sz="1050">
+              <a:latin typeface="Arial"/>
+              <a:cs typeface="Arial"/>
+            </a:endParaRPr>
+          </a:p>
+        </p:txBody>
+      </p:sp>
+      <p:sp>
+        <p:nvSpPr>
+          <p:cNvPr id="46" name="object 43">
+            <a:extLst>
+              <a:ext uri="{FF2B5EF4-FFF2-40B4-BE49-F238E27FC236}">
+                <a16:creationId xmlns:a16="http://schemas.microsoft.com/office/drawing/2014/main" id="{798B3924-93F9-4C14-8FEB-9A8BD7934081}"/>
+              </a:ext>
+            </a:extLst>
+          </p:cNvPr>
+          <p:cNvSpPr txBox="1"/>
+          <p:nvPr/>
+        </p:nvSpPr>
+        <p:spPr>
+          <a:xfrm>
+            <a:off x="7293797" y="3326923"/>
+            <a:ext cx="1017905" cy="171201"/>
+          </a:xfrm>
+          <a:prstGeom prst="rect">
+            <a:avLst/>
+          </a:prstGeom>
+          <a:solidFill>
+            <a:srgbClr val="96D35F"/>
+          </a:solidFill>
+        </p:spPr>
+        <p:txBody>
+          <a:bodyPr vert="horz" wrap="square" lIns="0" tIns="9525" rIns="0" bIns="0" rtlCol="0">
+            <a:spAutoFit/>
+          </a:bodyPr>
+          <a:lstStyle/>
+          <a:p>
+            <a:pPr marL="15240">
+              <a:spcBef>
+                <a:spcPts val="75"/>
+              </a:spcBef>
+            </a:pPr>
+            <a:r>
+              <a:rPr sz="1050" dirty="0">
+                <a:latin typeface="Arial"/>
+                <a:cs typeface="Arial"/>
+              </a:rPr>
+              <a:t>Email</a:t>
+            </a:r>
+            <a:r>
+              <a:rPr sz="1050" spc="-45" dirty="0">
+                <a:latin typeface="Arial"/>
+                <a:cs typeface="Arial"/>
+              </a:rPr>
+              <a:t> </a:t>
+            </a:r>
+            <a:r>
+              <a:rPr sz="1050" dirty="0">
+                <a:latin typeface="Arial"/>
+                <a:cs typeface="Arial"/>
+              </a:rPr>
+              <a:t>Promotion</a:t>
+            </a:r>
+            <a:endParaRPr sz="1050">
+              <a:latin typeface="Arial"/>
+              <a:cs typeface="Arial"/>
+            </a:endParaRPr>
+          </a:p>
+        </p:txBody>
+      </p:sp>
+      <p:sp>
+        <p:nvSpPr>
+          <p:cNvPr id="47" name="object 49">
+            <a:extLst>
+              <a:ext uri="{FF2B5EF4-FFF2-40B4-BE49-F238E27FC236}">
+                <a16:creationId xmlns:a16="http://schemas.microsoft.com/office/drawing/2014/main" id="{FC421CB9-013E-4D48-A0D3-CB20CC6838B4}"/>
+              </a:ext>
+            </a:extLst>
+          </p:cNvPr>
+          <p:cNvSpPr txBox="1"/>
+          <p:nvPr/>
+        </p:nvSpPr>
+        <p:spPr>
+          <a:xfrm>
+            <a:off x="1717591" y="5929690"/>
+            <a:ext cx="1312545" cy="678390"/>
+          </a:xfrm>
+          <a:prstGeom prst="rect">
+            <a:avLst/>
+          </a:prstGeom>
+          <a:ln/>
+        </p:spPr>
+        <p:style>
+          <a:lnRef idx="1">
+            <a:schemeClr val="accent1"/>
+          </a:lnRef>
+          <a:fillRef idx="2">
+            <a:schemeClr val="accent1"/>
+          </a:fillRef>
+          <a:effectRef idx="1">
+            <a:schemeClr val="accent1"/>
+          </a:effectRef>
+          <a:fontRef idx="minor">
+            <a:schemeClr val="dk1"/>
+          </a:fontRef>
+        </p:style>
+        <p:txBody>
+          <a:bodyPr vert="horz" wrap="square" lIns="0" tIns="64769" rIns="0" bIns="0" rtlCol="0">
+            <a:spAutoFit/>
+          </a:bodyPr>
+          <a:lstStyle/>
+          <a:p>
+            <a:pPr marL="50800">
+              <a:spcBef>
+                <a:spcPts val="509"/>
+              </a:spcBef>
+            </a:pPr>
+            <a:r>
+              <a:rPr sz="1050" dirty="0">
+                <a:latin typeface="Arial"/>
+                <a:cs typeface="Arial"/>
+              </a:rPr>
+              <a:t>Campaign</a:t>
+            </a:r>
+            <a:endParaRPr lang="en-US" sz="1050" dirty="0">
+              <a:latin typeface="Arial"/>
+              <a:cs typeface="Arial"/>
+            </a:endParaRPr>
+          </a:p>
+          <a:p>
+            <a:pPr marL="50800">
+              <a:spcBef>
+                <a:spcPts val="509"/>
+              </a:spcBef>
+            </a:pPr>
+            <a:endParaRPr lang="it-IT" sz="1050" dirty="0">
+              <a:latin typeface="Arial"/>
+              <a:cs typeface="Arial"/>
+            </a:endParaRPr>
+          </a:p>
+          <a:p>
+            <a:pPr marL="50800">
+              <a:spcBef>
+                <a:spcPts val="509"/>
+              </a:spcBef>
+            </a:pPr>
+            <a:endParaRPr sz="1050" dirty="0">
+              <a:latin typeface="Arial"/>
+              <a:cs typeface="Arial"/>
+            </a:endParaRPr>
+          </a:p>
+        </p:txBody>
+      </p:sp>
+      <p:sp>
+        <p:nvSpPr>
+          <p:cNvPr id="48" name="object 2">
+            <a:extLst>
+              <a:ext uri="{FF2B5EF4-FFF2-40B4-BE49-F238E27FC236}">
+                <a16:creationId xmlns:a16="http://schemas.microsoft.com/office/drawing/2014/main" id="{18CEEE57-6BD8-4C72-8374-2402789AAF33}"/>
+              </a:ext>
+            </a:extLst>
+          </p:cNvPr>
+          <p:cNvSpPr txBox="1"/>
+          <p:nvPr/>
+        </p:nvSpPr>
+        <p:spPr>
+          <a:xfrm>
+            <a:off x="423214" y="2231290"/>
+            <a:ext cx="1219835" cy="1435735"/>
+          </a:xfrm>
+          <a:prstGeom prst="rect">
+            <a:avLst/>
+          </a:prstGeom>
+        </p:spPr>
+        <p:style>
+          <a:lnRef idx="1">
+            <a:schemeClr val="accent2"/>
+          </a:lnRef>
+          <a:fillRef idx="2">
+            <a:schemeClr val="accent2"/>
+          </a:fillRef>
+          <a:effectRef idx="1">
+            <a:schemeClr val="accent2"/>
+          </a:effectRef>
+          <a:fontRef idx="minor">
+            <a:schemeClr val="dk1"/>
+          </a:fontRef>
+        </p:style>
+        <p:txBody>
+          <a:bodyPr vert="horz" wrap="square" lIns="0" tIns="0" rIns="0" bIns="0" rtlCol="0">
+            <a:spAutoFit/>
+          </a:bodyPr>
+          <a:lstStyle/>
+          <a:p>
+            <a:pPr>
+              <a:lnSpc>
+                <a:spcPct val="100000"/>
+              </a:lnSpc>
+            </a:pPr>
+            <a:endParaRPr sz="1300">
+              <a:latin typeface="Times New Roman"/>
+              <a:cs typeface="Times New Roman"/>
+            </a:endParaRPr>
+          </a:p>
+          <a:p>
+            <a:pPr>
+              <a:lnSpc>
+                <a:spcPct val="100000"/>
+              </a:lnSpc>
+            </a:pPr>
+            <a:endParaRPr sz="1300">
+              <a:latin typeface="Times New Roman"/>
+              <a:cs typeface="Times New Roman"/>
+            </a:endParaRPr>
+          </a:p>
+          <a:p>
+            <a:pPr marL="160655" marR="153035" indent="-635" algn="ctr">
+              <a:lnSpc>
+                <a:spcPts val="1300"/>
+              </a:lnSpc>
+              <a:spcBef>
+                <a:spcPts val="745"/>
+              </a:spcBef>
+            </a:pPr>
+            <a:r>
+              <a:rPr sz="1100" b="1" spc="5" dirty="0">
+                <a:solidFill>
+                  <a:srgbClr val="312D2B"/>
+                </a:solidFill>
+                <a:latin typeface="Arial"/>
+                <a:cs typeface="Arial"/>
+              </a:rPr>
+              <a:t>TOUCH  </a:t>
+            </a:r>
+            <a:r>
+              <a:rPr sz="1100" b="1" dirty="0">
+                <a:solidFill>
+                  <a:srgbClr val="312D2B"/>
+                </a:solidFill>
+                <a:latin typeface="Arial"/>
+                <a:cs typeface="Arial"/>
+              </a:rPr>
+              <a:t>POINTS </a:t>
+            </a:r>
+            <a:r>
+              <a:rPr sz="1100" b="1" spc="-45" dirty="0">
+                <a:solidFill>
+                  <a:srgbClr val="312D2B"/>
+                </a:solidFill>
+                <a:latin typeface="Arial"/>
+                <a:cs typeface="Arial"/>
+              </a:rPr>
+              <a:t>&amp;  </a:t>
+            </a:r>
+            <a:r>
+              <a:rPr sz="1100" b="1" spc="-5" dirty="0">
+                <a:solidFill>
+                  <a:srgbClr val="312D2B"/>
+                </a:solidFill>
+                <a:latin typeface="Arial"/>
+                <a:cs typeface="Arial"/>
+              </a:rPr>
+              <a:t>SC</a:t>
+            </a:r>
+            <a:r>
+              <a:rPr sz="1100" b="1" spc="-10" dirty="0">
+                <a:solidFill>
+                  <a:srgbClr val="312D2B"/>
+                </a:solidFill>
+                <a:latin typeface="Arial"/>
+                <a:cs typeface="Arial"/>
+              </a:rPr>
+              <a:t>O</a:t>
+            </a:r>
+            <a:r>
+              <a:rPr sz="1100" b="1" dirty="0">
+                <a:solidFill>
+                  <a:srgbClr val="312D2B"/>
+                </a:solidFill>
+                <a:latin typeface="Arial"/>
+                <a:cs typeface="Arial"/>
+              </a:rPr>
+              <a:t>R</a:t>
+            </a:r>
+            <a:r>
+              <a:rPr sz="1100" b="1" spc="-30" dirty="0">
+                <a:solidFill>
+                  <a:srgbClr val="312D2B"/>
+                </a:solidFill>
+                <a:latin typeface="Arial"/>
+                <a:cs typeface="Arial"/>
+              </a:rPr>
+              <a:t>E</a:t>
+            </a:r>
+            <a:r>
+              <a:rPr sz="1100" b="1" spc="15" dirty="0">
+                <a:solidFill>
+                  <a:srgbClr val="312D2B"/>
+                </a:solidFill>
+                <a:latin typeface="Arial"/>
+                <a:cs typeface="Arial"/>
+              </a:rPr>
+              <a:t>C</a:t>
+            </a:r>
+            <a:r>
+              <a:rPr sz="1100" b="1" spc="-50" dirty="0">
+                <a:solidFill>
+                  <a:srgbClr val="312D2B"/>
+                </a:solidFill>
+                <a:latin typeface="Arial"/>
+                <a:cs typeface="Arial"/>
+              </a:rPr>
+              <a:t>A</a:t>
+            </a:r>
+            <a:r>
+              <a:rPr sz="1100" b="1" dirty="0">
+                <a:solidFill>
+                  <a:srgbClr val="312D2B"/>
+                </a:solidFill>
+                <a:latin typeface="Arial"/>
+                <a:cs typeface="Arial"/>
+              </a:rPr>
+              <a:t>R</a:t>
+            </a:r>
+            <a:r>
+              <a:rPr sz="1100" b="1" spc="20" dirty="0">
+                <a:solidFill>
+                  <a:srgbClr val="312D2B"/>
+                </a:solidFill>
+                <a:latin typeface="Arial"/>
+                <a:cs typeface="Arial"/>
+              </a:rPr>
+              <a:t>D</a:t>
+            </a:r>
+            <a:endParaRPr sz="1100">
+              <a:latin typeface="Arial"/>
+              <a:cs typeface="Arial"/>
+            </a:endParaRPr>
+          </a:p>
+        </p:txBody>
+      </p:sp>
+      <p:sp>
+        <p:nvSpPr>
+          <p:cNvPr id="49" name="object 6">
+            <a:extLst>
+              <a:ext uri="{FF2B5EF4-FFF2-40B4-BE49-F238E27FC236}">
+                <a16:creationId xmlns:a16="http://schemas.microsoft.com/office/drawing/2014/main" id="{1A8C4E85-3555-42CD-91AE-46C41B37AAD4}"/>
+              </a:ext>
+            </a:extLst>
+          </p:cNvPr>
+          <p:cNvSpPr txBox="1"/>
+          <p:nvPr/>
+        </p:nvSpPr>
+        <p:spPr>
+          <a:xfrm>
+            <a:off x="432995" y="1139809"/>
+            <a:ext cx="1219835" cy="695325"/>
+          </a:xfrm>
+          <a:prstGeom prst="rect">
+            <a:avLst/>
+          </a:prstGeom>
+        </p:spPr>
+        <p:style>
+          <a:lnRef idx="1">
+            <a:schemeClr val="accent2"/>
+          </a:lnRef>
+          <a:fillRef idx="2">
+            <a:schemeClr val="accent2"/>
+          </a:fillRef>
+          <a:effectRef idx="1">
+            <a:schemeClr val="accent2"/>
+          </a:effectRef>
+          <a:fontRef idx="minor">
+            <a:schemeClr val="dk1"/>
+          </a:fontRef>
+        </p:style>
+        <p:txBody>
+          <a:bodyPr vert="horz" wrap="square" lIns="0" tIns="163195" rIns="0" bIns="0" rtlCol="0">
+            <a:spAutoFit/>
+          </a:bodyPr>
+          <a:lstStyle/>
+          <a:p>
+            <a:pPr marL="340360" marR="144780" indent="-187325">
+              <a:lnSpc>
+                <a:spcPts val="1490"/>
+              </a:lnSpc>
+              <a:spcBef>
+                <a:spcPts val="1285"/>
+              </a:spcBef>
+            </a:pPr>
+            <a:r>
+              <a:rPr sz="1300" b="1" spc="-15" dirty="0">
+                <a:solidFill>
+                  <a:srgbClr val="312D2B"/>
+                </a:solidFill>
+                <a:latin typeface="Arial"/>
+                <a:cs typeface="Arial"/>
+              </a:rPr>
+              <a:t>LIF</a:t>
+            </a:r>
+            <a:r>
+              <a:rPr sz="1300" b="1" spc="-20" dirty="0">
+                <a:solidFill>
+                  <a:srgbClr val="312D2B"/>
+                </a:solidFill>
+                <a:latin typeface="Arial"/>
+                <a:cs typeface="Arial"/>
+              </a:rPr>
+              <a:t>E</a:t>
+            </a:r>
+            <a:r>
+              <a:rPr sz="1300" b="1" spc="15" dirty="0">
+                <a:solidFill>
+                  <a:srgbClr val="312D2B"/>
+                </a:solidFill>
+                <a:latin typeface="Arial"/>
+                <a:cs typeface="Arial"/>
+              </a:rPr>
+              <a:t>C</a:t>
+            </a:r>
+            <a:r>
+              <a:rPr sz="1300" b="1" spc="-5" dirty="0">
+                <a:solidFill>
+                  <a:srgbClr val="312D2B"/>
+                </a:solidFill>
+                <a:latin typeface="Arial"/>
+                <a:cs typeface="Arial"/>
+              </a:rPr>
+              <a:t>Y</a:t>
+            </a:r>
+            <a:r>
+              <a:rPr sz="1300" b="1" spc="15" dirty="0">
+                <a:solidFill>
+                  <a:srgbClr val="312D2B"/>
+                </a:solidFill>
+                <a:latin typeface="Arial"/>
+                <a:cs typeface="Arial"/>
+              </a:rPr>
+              <a:t>C</a:t>
+            </a:r>
+            <a:r>
+              <a:rPr sz="1300" b="1" spc="-20" dirty="0">
+                <a:solidFill>
+                  <a:srgbClr val="312D2B"/>
+                </a:solidFill>
+                <a:latin typeface="Arial"/>
+                <a:cs typeface="Arial"/>
+              </a:rPr>
+              <a:t>LE  </a:t>
+            </a:r>
+            <a:r>
+              <a:rPr sz="1300" b="1" spc="-55" dirty="0">
+                <a:solidFill>
+                  <a:srgbClr val="312D2B"/>
+                </a:solidFill>
+                <a:latin typeface="Arial"/>
+                <a:cs typeface="Arial"/>
+              </a:rPr>
+              <a:t>STAGE</a:t>
+            </a:r>
+            <a:endParaRPr sz="1300" dirty="0">
+              <a:latin typeface="Arial"/>
+              <a:cs typeface="Arial"/>
+            </a:endParaRPr>
+          </a:p>
+        </p:txBody>
+      </p:sp>
+      <p:sp>
+        <p:nvSpPr>
+          <p:cNvPr id="50" name="object 50">
+            <a:extLst>
+              <a:ext uri="{FF2B5EF4-FFF2-40B4-BE49-F238E27FC236}">
+                <a16:creationId xmlns:a16="http://schemas.microsoft.com/office/drawing/2014/main" id="{7DEA3EB9-0946-4C94-B39E-68A8EDD32AC6}"/>
+              </a:ext>
+            </a:extLst>
+          </p:cNvPr>
+          <p:cNvSpPr txBox="1"/>
+          <p:nvPr/>
+        </p:nvSpPr>
+        <p:spPr>
+          <a:xfrm>
+            <a:off x="3115178" y="5912453"/>
+            <a:ext cx="1837055" cy="695325"/>
+          </a:xfrm>
+          <a:prstGeom prst="rect">
+            <a:avLst/>
+          </a:prstGeom>
+          <a:ln/>
+        </p:spPr>
+        <p:style>
+          <a:lnRef idx="1">
+            <a:schemeClr val="accent1"/>
+          </a:lnRef>
+          <a:fillRef idx="2">
+            <a:schemeClr val="accent1"/>
+          </a:fillRef>
+          <a:effectRef idx="1">
+            <a:schemeClr val="accent1"/>
+          </a:effectRef>
+          <a:fontRef idx="minor">
+            <a:schemeClr val="dk1"/>
+          </a:fontRef>
+        </p:style>
+        <p:txBody>
+          <a:bodyPr vert="horz" wrap="square" lIns="0" tIns="62865" rIns="0" bIns="0" rtlCol="0">
+            <a:spAutoFit/>
+          </a:bodyPr>
+          <a:lstStyle/>
+          <a:p>
+            <a:pPr marL="86360" marR="948690">
+              <a:lnSpc>
+                <a:spcPts val="1200"/>
+              </a:lnSpc>
+              <a:spcBef>
+                <a:spcPts val="495"/>
+              </a:spcBef>
+            </a:pPr>
+            <a:r>
+              <a:rPr sz="1050" dirty="0">
+                <a:latin typeface="Arial"/>
+                <a:cs typeface="Arial"/>
+              </a:rPr>
+              <a:t>Review  Management</a:t>
+            </a:r>
+            <a:endParaRPr sz="1050">
+              <a:latin typeface="Arial"/>
+              <a:cs typeface="Arial"/>
+            </a:endParaRPr>
+          </a:p>
+        </p:txBody>
+      </p:sp>
+      <p:sp>
+        <p:nvSpPr>
+          <p:cNvPr id="51" name="object 45">
+            <a:extLst>
+              <a:ext uri="{FF2B5EF4-FFF2-40B4-BE49-F238E27FC236}">
+                <a16:creationId xmlns:a16="http://schemas.microsoft.com/office/drawing/2014/main" id="{FB63E010-F0FF-4CF9-BC64-C0DAF11E7869}"/>
+              </a:ext>
+            </a:extLst>
+          </p:cNvPr>
+          <p:cNvSpPr txBox="1"/>
+          <p:nvPr/>
+        </p:nvSpPr>
+        <p:spPr>
+          <a:xfrm>
+            <a:off x="6952754" y="5116086"/>
+            <a:ext cx="2113280" cy="695325"/>
+          </a:xfrm>
+          <a:prstGeom prst="rect">
+            <a:avLst/>
+          </a:prstGeom>
+          <a:ln/>
+        </p:spPr>
+        <p:style>
+          <a:lnRef idx="1">
+            <a:schemeClr val="accent1"/>
+          </a:lnRef>
+          <a:fillRef idx="2">
+            <a:schemeClr val="accent1"/>
+          </a:fillRef>
+          <a:effectRef idx="1">
+            <a:schemeClr val="accent1"/>
+          </a:effectRef>
+          <a:fontRef idx="minor">
+            <a:schemeClr val="dk1"/>
+          </a:fontRef>
+        </p:style>
+        <p:txBody>
+          <a:bodyPr vert="horz" wrap="square" lIns="0" tIns="93980" rIns="0" bIns="0" rtlCol="0">
+            <a:spAutoFit/>
+          </a:bodyPr>
+          <a:lstStyle/>
+          <a:p>
+            <a:pPr marL="259079">
+              <a:lnSpc>
+                <a:spcPct val="100000"/>
+              </a:lnSpc>
+              <a:spcBef>
+                <a:spcPts val="740"/>
+              </a:spcBef>
+            </a:pPr>
+            <a:r>
+              <a:rPr sz="1050" dirty="0">
+                <a:latin typeface="Arial"/>
+                <a:cs typeface="Arial"/>
+              </a:rPr>
+              <a:t>N.</a:t>
+            </a:r>
+            <a:r>
+              <a:rPr sz="1050" spc="-50" dirty="0">
+                <a:latin typeface="Arial"/>
+                <a:cs typeface="Arial"/>
+              </a:rPr>
+              <a:t> </a:t>
+            </a:r>
+            <a:r>
+              <a:rPr sz="1050" dirty="0">
+                <a:latin typeface="Arial"/>
+                <a:cs typeface="Arial"/>
+              </a:rPr>
+              <a:t>prenotations</a:t>
+            </a:r>
+            <a:endParaRPr sz="1050">
+              <a:latin typeface="Arial"/>
+              <a:cs typeface="Arial"/>
+            </a:endParaRPr>
+          </a:p>
+        </p:txBody>
+      </p:sp>
+      <p:sp>
+        <p:nvSpPr>
+          <p:cNvPr id="52" name="object 46">
+            <a:extLst>
+              <a:ext uri="{FF2B5EF4-FFF2-40B4-BE49-F238E27FC236}">
+                <a16:creationId xmlns:a16="http://schemas.microsoft.com/office/drawing/2014/main" id="{A3697FFE-F8B8-4BDF-B00E-97DF63B9E56E}"/>
+              </a:ext>
+            </a:extLst>
+          </p:cNvPr>
+          <p:cNvSpPr txBox="1"/>
+          <p:nvPr/>
+        </p:nvSpPr>
+        <p:spPr>
+          <a:xfrm>
+            <a:off x="5031866" y="5116086"/>
+            <a:ext cx="1837055" cy="695325"/>
+          </a:xfrm>
+          <a:prstGeom prst="rect">
+            <a:avLst/>
+          </a:prstGeom>
+          <a:ln/>
+        </p:spPr>
+        <p:style>
+          <a:lnRef idx="1">
+            <a:schemeClr val="accent1"/>
+          </a:lnRef>
+          <a:fillRef idx="2">
+            <a:schemeClr val="accent1"/>
+          </a:fillRef>
+          <a:effectRef idx="1">
+            <a:schemeClr val="accent1"/>
+          </a:effectRef>
+          <a:fontRef idx="minor">
+            <a:schemeClr val="dk1"/>
+          </a:fontRef>
+        </p:style>
+        <p:txBody>
+          <a:bodyPr vert="horz" wrap="square" lIns="0" tIns="93980" rIns="0" bIns="0" rtlCol="0">
+            <a:spAutoFit/>
+          </a:bodyPr>
+          <a:lstStyle/>
+          <a:p>
+            <a:pPr marL="189230">
+              <a:lnSpc>
+                <a:spcPct val="100000"/>
+              </a:lnSpc>
+              <a:spcBef>
+                <a:spcPts val="740"/>
+              </a:spcBef>
+            </a:pPr>
+            <a:r>
+              <a:rPr sz="1050" dirty="0">
+                <a:latin typeface="Arial"/>
+                <a:cs typeface="Arial"/>
+              </a:rPr>
+              <a:t>N. working</a:t>
+            </a:r>
+            <a:r>
+              <a:rPr sz="1050" spc="-45" dirty="0">
+                <a:latin typeface="Arial"/>
+                <a:cs typeface="Arial"/>
+              </a:rPr>
+              <a:t> </a:t>
+            </a:r>
+            <a:r>
+              <a:rPr sz="1050" dirty="0">
+                <a:latin typeface="Arial"/>
+                <a:cs typeface="Arial"/>
+              </a:rPr>
+              <a:t>clients</a:t>
+            </a:r>
+            <a:endParaRPr sz="1050">
+              <a:latin typeface="Arial"/>
+              <a:cs typeface="Arial"/>
+            </a:endParaRPr>
+          </a:p>
+        </p:txBody>
+      </p:sp>
+      <p:sp>
+        <p:nvSpPr>
+          <p:cNvPr id="53" name="object 48">
+            <a:extLst>
+              <a:ext uri="{FF2B5EF4-FFF2-40B4-BE49-F238E27FC236}">
+                <a16:creationId xmlns:a16="http://schemas.microsoft.com/office/drawing/2014/main" id="{F5E3690C-493C-4E31-8424-A723AED31A4F}"/>
+              </a:ext>
+            </a:extLst>
+          </p:cNvPr>
+          <p:cNvSpPr txBox="1"/>
+          <p:nvPr/>
+        </p:nvSpPr>
+        <p:spPr>
+          <a:xfrm>
+            <a:off x="3110981" y="5116086"/>
+            <a:ext cx="1837055" cy="695325"/>
+          </a:xfrm>
+          <a:prstGeom prst="rect">
+            <a:avLst/>
+          </a:prstGeom>
+          <a:ln/>
+        </p:spPr>
+        <p:style>
+          <a:lnRef idx="1">
+            <a:schemeClr val="accent1"/>
+          </a:lnRef>
+          <a:fillRef idx="2">
+            <a:schemeClr val="accent1"/>
+          </a:fillRef>
+          <a:effectRef idx="1">
+            <a:schemeClr val="accent1"/>
+          </a:effectRef>
+          <a:fontRef idx="minor">
+            <a:schemeClr val="dk1"/>
+          </a:fontRef>
+        </p:style>
+        <p:txBody>
+          <a:bodyPr vert="horz" wrap="square" lIns="0" tIns="93980" rIns="0" bIns="0" rtlCol="0">
+            <a:spAutoFit/>
+          </a:bodyPr>
+          <a:lstStyle/>
+          <a:p>
+            <a:pPr marL="173990">
+              <a:lnSpc>
+                <a:spcPct val="100000"/>
+              </a:lnSpc>
+              <a:spcBef>
+                <a:spcPts val="740"/>
+              </a:spcBef>
+            </a:pPr>
+            <a:r>
+              <a:rPr sz="1050" dirty="0">
+                <a:latin typeface="Arial"/>
+                <a:cs typeface="Arial"/>
+              </a:rPr>
+              <a:t>N.</a:t>
+            </a:r>
+            <a:r>
+              <a:rPr sz="1050" spc="-65" dirty="0">
+                <a:latin typeface="Arial"/>
+                <a:cs typeface="Arial"/>
+              </a:rPr>
+              <a:t> </a:t>
+            </a:r>
+            <a:r>
+              <a:rPr sz="1050" dirty="0">
+                <a:latin typeface="Arial"/>
+                <a:cs typeface="Arial"/>
+              </a:rPr>
+              <a:t>Download</a:t>
+            </a:r>
+          </a:p>
+          <a:p>
+            <a:pPr marL="173990" marR="928369">
+              <a:lnSpc>
+                <a:spcPts val="1200"/>
+              </a:lnSpc>
+              <a:spcBef>
+                <a:spcPts val="405"/>
+              </a:spcBef>
+            </a:pPr>
+            <a:r>
+              <a:rPr sz="1050" dirty="0">
+                <a:latin typeface="Arial"/>
+                <a:cs typeface="Arial"/>
+              </a:rPr>
+              <a:t>Registration  (optional)</a:t>
+            </a:r>
+          </a:p>
+        </p:txBody>
+      </p:sp>
+      <p:sp>
+        <p:nvSpPr>
+          <p:cNvPr id="54" name="object 51">
+            <a:extLst>
+              <a:ext uri="{FF2B5EF4-FFF2-40B4-BE49-F238E27FC236}">
+                <a16:creationId xmlns:a16="http://schemas.microsoft.com/office/drawing/2014/main" id="{382D8FB2-C078-48BD-8F50-4A575BF22875}"/>
+              </a:ext>
+            </a:extLst>
+          </p:cNvPr>
+          <p:cNvSpPr txBox="1"/>
+          <p:nvPr/>
+        </p:nvSpPr>
+        <p:spPr>
+          <a:xfrm>
+            <a:off x="6952755" y="5911859"/>
+            <a:ext cx="2113280" cy="695325"/>
+          </a:xfrm>
+          <a:prstGeom prst="rect">
+            <a:avLst/>
+          </a:prstGeom>
+          <a:ln/>
+        </p:spPr>
+        <p:style>
+          <a:lnRef idx="1">
+            <a:schemeClr val="accent1"/>
+          </a:lnRef>
+          <a:fillRef idx="2">
+            <a:schemeClr val="accent1"/>
+          </a:fillRef>
+          <a:effectRef idx="1">
+            <a:schemeClr val="accent1"/>
+          </a:effectRef>
+          <a:fontRef idx="minor">
+            <a:schemeClr val="dk1"/>
+          </a:fontRef>
+        </p:style>
+        <p:txBody>
+          <a:bodyPr vert="horz" wrap="square" lIns="0" tIns="64769" rIns="0" bIns="0" rtlCol="0">
+            <a:spAutoFit/>
+          </a:bodyPr>
+          <a:lstStyle/>
+          <a:p>
+            <a:pPr marL="93345">
+              <a:lnSpc>
+                <a:spcPct val="100000"/>
+              </a:lnSpc>
+              <a:spcBef>
+                <a:spcPts val="509"/>
+              </a:spcBef>
+            </a:pPr>
+            <a:r>
+              <a:rPr sz="1050" dirty="0">
+                <a:latin typeface="Arial"/>
+                <a:cs typeface="Arial"/>
+              </a:rPr>
+              <a:t>Locals service</a:t>
+            </a:r>
+            <a:r>
+              <a:rPr sz="1050" spc="-30" dirty="0">
+                <a:latin typeface="Arial"/>
+                <a:cs typeface="Arial"/>
+              </a:rPr>
+              <a:t> </a:t>
+            </a:r>
+            <a:r>
+              <a:rPr sz="1050" dirty="0">
+                <a:latin typeface="Arial"/>
+                <a:cs typeface="Arial"/>
+              </a:rPr>
+              <a:t>check</a:t>
+            </a:r>
+            <a:endParaRPr sz="1050">
+              <a:latin typeface="Arial"/>
+              <a:cs typeface="Arial"/>
+            </a:endParaRPr>
+          </a:p>
+        </p:txBody>
+      </p:sp>
+      <p:sp>
+        <p:nvSpPr>
+          <p:cNvPr id="55" name="object 52">
+            <a:extLst>
+              <a:ext uri="{FF2B5EF4-FFF2-40B4-BE49-F238E27FC236}">
+                <a16:creationId xmlns:a16="http://schemas.microsoft.com/office/drawing/2014/main" id="{6EB7AD31-11F4-42B2-A8CA-61CC39138E84}"/>
+              </a:ext>
+            </a:extLst>
+          </p:cNvPr>
+          <p:cNvSpPr txBox="1"/>
+          <p:nvPr/>
+        </p:nvSpPr>
+        <p:spPr>
+          <a:xfrm>
+            <a:off x="5025958" y="5911859"/>
+            <a:ext cx="1837055" cy="695325"/>
+          </a:xfrm>
+          <a:prstGeom prst="rect">
+            <a:avLst/>
+          </a:prstGeom>
+          <a:ln/>
+        </p:spPr>
+        <p:style>
+          <a:lnRef idx="1">
+            <a:schemeClr val="accent1"/>
+          </a:lnRef>
+          <a:fillRef idx="2">
+            <a:schemeClr val="accent1"/>
+          </a:fillRef>
+          <a:effectRef idx="1">
+            <a:schemeClr val="accent1"/>
+          </a:effectRef>
+          <a:fontRef idx="minor">
+            <a:schemeClr val="dk1"/>
+          </a:fontRef>
+        </p:style>
+        <p:txBody>
+          <a:bodyPr vert="horz" wrap="square" lIns="0" tIns="64769" rIns="0" bIns="0" rtlCol="0">
+            <a:spAutoFit/>
+          </a:bodyPr>
+          <a:lstStyle/>
+          <a:p>
+            <a:pPr marL="131445">
+              <a:lnSpc>
+                <a:spcPct val="100000"/>
+              </a:lnSpc>
+              <a:spcBef>
+                <a:spcPts val="509"/>
+              </a:spcBef>
+            </a:pPr>
+            <a:r>
+              <a:rPr sz="1050" dirty="0">
+                <a:latin typeface="Arial"/>
+                <a:cs typeface="Arial"/>
+              </a:rPr>
+              <a:t>Usability</a:t>
+            </a:r>
+            <a:r>
+              <a:rPr sz="1050" spc="-60" dirty="0">
+                <a:latin typeface="Arial"/>
+                <a:cs typeface="Arial"/>
+              </a:rPr>
+              <a:t> </a:t>
+            </a:r>
+            <a:r>
+              <a:rPr sz="1050" dirty="0">
+                <a:latin typeface="Arial"/>
+                <a:cs typeface="Arial"/>
+              </a:rPr>
+              <a:t>test</a:t>
+            </a:r>
+            <a:endParaRPr sz="1050">
+              <a:latin typeface="Arial"/>
+              <a:cs typeface="Arial"/>
+            </a:endParaRPr>
+          </a:p>
+          <a:p>
+            <a:pPr marL="131445">
+              <a:lnSpc>
+                <a:spcPct val="100000"/>
+              </a:lnSpc>
+              <a:spcBef>
+                <a:spcPts val="295"/>
+              </a:spcBef>
+            </a:pPr>
+            <a:r>
+              <a:rPr sz="1050" dirty="0">
+                <a:latin typeface="Arial"/>
+                <a:cs typeface="Arial"/>
+              </a:rPr>
+              <a:t>Info</a:t>
+            </a:r>
+            <a:r>
+              <a:rPr sz="1050" spc="-60" dirty="0">
+                <a:latin typeface="Arial"/>
+                <a:cs typeface="Arial"/>
+              </a:rPr>
+              <a:t> </a:t>
+            </a:r>
+            <a:r>
+              <a:rPr sz="1050" spc="-5" dirty="0">
+                <a:latin typeface="Arial"/>
+                <a:cs typeface="Arial"/>
+              </a:rPr>
+              <a:t>Update</a:t>
+            </a:r>
+            <a:endParaRPr sz="1050">
+              <a:latin typeface="Arial"/>
+              <a:cs typeface="Arial"/>
+            </a:endParaRPr>
+          </a:p>
+        </p:txBody>
+      </p:sp>
+      <p:sp>
+        <p:nvSpPr>
+          <p:cNvPr id="56" name="object 47">
+            <a:extLst>
+              <a:ext uri="{FF2B5EF4-FFF2-40B4-BE49-F238E27FC236}">
+                <a16:creationId xmlns:a16="http://schemas.microsoft.com/office/drawing/2014/main" id="{13118E18-8D53-4BD9-889B-8098177920C5}"/>
+              </a:ext>
+            </a:extLst>
+          </p:cNvPr>
+          <p:cNvSpPr txBox="1"/>
+          <p:nvPr/>
+        </p:nvSpPr>
+        <p:spPr>
+          <a:xfrm>
+            <a:off x="1714603" y="5116086"/>
+            <a:ext cx="1312545" cy="695325"/>
+          </a:xfrm>
+          <a:prstGeom prst="rect">
+            <a:avLst/>
+          </a:prstGeom>
+          <a:ln/>
+        </p:spPr>
+        <p:style>
+          <a:lnRef idx="1">
+            <a:schemeClr val="accent1"/>
+          </a:lnRef>
+          <a:fillRef idx="2">
+            <a:schemeClr val="accent1"/>
+          </a:fillRef>
+          <a:effectRef idx="1">
+            <a:schemeClr val="accent1"/>
+          </a:effectRef>
+          <a:fontRef idx="minor">
+            <a:schemeClr val="dk1"/>
+          </a:fontRef>
+        </p:style>
+        <p:txBody>
+          <a:bodyPr vert="horz" wrap="square" lIns="0" tIns="0" rIns="0" bIns="0" rtlCol="0">
+            <a:spAutoFit/>
+          </a:bodyPr>
+          <a:lstStyle/>
+          <a:p>
+            <a:pPr marL="36830">
+              <a:lnSpc>
+                <a:spcPts val="1195"/>
+              </a:lnSpc>
+            </a:pPr>
+            <a:r>
+              <a:rPr sz="1050" dirty="0">
+                <a:latin typeface="Arial"/>
+                <a:cs typeface="Arial"/>
+              </a:rPr>
+              <a:t>Bounce</a:t>
+            </a:r>
+            <a:r>
+              <a:rPr sz="1050" spc="-60" dirty="0">
+                <a:latin typeface="Arial"/>
+                <a:cs typeface="Arial"/>
+              </a:rPr>
+              <a:t> </a:t>
+            </a:r>
+            <a:r>
+              <a:rPr sz="1050" dirty="0">
+                <a:latin typeface="Arial"/>
+                <a:cs typeface="Arial"/>
+              </a:rPr>
+              <a:t>Rate</a:t>
+            </a:r>
+          </a:p>
+          <a:p>
+            <a:pPr marL="36830" marR="144145">
+              <a:lnSpc>
+                <a:spcPts val="1200"/>
+              </a:lnSpc>
+              <a:spcBef>
+                <a:spcPts val="30"/>
+              </a:spcBef>
+            </a:pPr>
+            <a:r>
+              <a:rPr sz="1050" spc="5" dirty="0">
+                <a:latin typeface="Arial"/>
+                <a:cs typeface="Arial"/>
+              </a:rPr>
+              <a:t>CTR </a:t>
+            </a:r>
+            <a:r>
+              <a:rPr sz="1050" dirty="0">
+                <a:latin typeface="Arial"/>
+                <a:cs typeface="Arial"/>
+              </a:rPr>
+              <a:t>(click through  rate)</a:t>
+            </a:r>
+          </a:p>
+          <a:p>
+            <a:pPr marL="36830">
+              <a:lnSpc>
+                <a:spcPts val="1175"/>
+              </a:lnSpc>
+            </a:pPr>
+            <a:r>
+              <a:rPr sz="1050" dirty="0">
+                <a:latin typeface="Arial"/>
+                <a:cs typeface="Arial"/>
+              </a:rPr>
+              <a:t>Conversion</a:t>
+            </a:r>
+            <a:r>
+              <a:rPr sz="1050" spc="-45" dirty="0">
+                <a:latin typeface="Arial"/>
+                <a:cs typeface="Arial"/>
+              </a:rPr>
+              <a:t> </a:t>
+            </a:r>
+            <a:r>
+              <a:rPr sz="1050" dirty="0">
+                <a:latin typeface="Arial"/>
+                <a:cs typeface="Arial"/>
+              </a:rPr>
+              <a:t>Rate</a:t>
+            </a:r>
+          </a:p>
+        </p:txBody>
+      </p:sp>
+      <p:sp>
+        <p:nvSpPr>
+          <p:cNvPr id="57" name="object 40">
+            <a:extLst>
+              <a:ext uri="{FF2B5EF4-FFF2-40B4-BE49-F238E27FC236}">
+                <a16:creationId xmlns:a16="http://schemas.microsoft.com/office/drawing/2014/main" id="{2E7217E3-7983-4D16-8C71-FE8EB5E062B0}"/>
+              </a:ext>
+            </a:extLst>
+          </p:cNvPr>
+          <p:cNvSpPr txBox="1"/>
+          <p:nvPr/>
+        </p:nvSpPr>
+        <p:spPr>
+          <a:xfrm>
+            <a:off x="1736717" y="3718080"/>
+            <a:ext cx="1312545" cy="983615"/>
+          </a:xfrm>
+          <a:prstGeom prst="rect">
+            <a:avLst/>
+          </a:prstGeom>
+          <a:ln/>
+        </p:spPr>
+        <p:style>
+          <a:lnRef idx="1">
+            <a:schemeClr val="accent1"/>
+          </a:lnRef>
+          <a:fillRef idx="2">
+            <a:schemeClr val="accent1"/>
+          </a:fillRef>
+          <a:effectRef idx="1">
+            <a:schemeClr val="accent1"/>
+          </a:effectRef>
+          <a:fontRef idx="minor">
+            <a:schemeClr val="dk1"/>
+          </a:fontRef>
+        </p:style>
+        <p:txBody>
+          <a:bodyPr vert="horz" wrap="square" lIns="0" tIns="93345" rIns="0" bIns="0" rtlCol="0">
+            <a:spAutoFit/>
+          </a:bodyPr>
+          <a:lstStyle/>
+          <a:p>
+            <a:pPr marL="97155" marR="270510">
+              <a:lnSpc>
+                <a:spcPts val="1200"/>
+              </a:lnSpc>
+              <a:spcBef>
+                <a:spcPts val="735"/>
+              </a:spcBef>
+            </a:pPr>
+            <a:r>
+              <a:rPr sz="1050" dirty="0">
+                <a:latin typeface="Arial"/>
+                <a:cs typeface="Arial"/>
+              </a:rPr>
+              <a:t>Bad Reputation  (spill)</a:t>
+            </a:r>
+          </a:p>
+          <a:p>
+            <a:pPr>
+              <a:lnSpc>
+                <a:spcPct val="100000"/>
+              </a:lnSpc>
+              <a:spcBef>
+                <a:spcPts val="5"/>
+              </a:spcBef>
+            </a:pPr>
+            <a:endParaRPr sz="1000" dirty="0">
+              <a:latin typeface="Times New Roman"/>
+              <a:cs typeface="Times New Roman"/>
+            </a:endParaRPr>
+          </a:p>
+          <a:p>
+            <a:pPr marL="97155">
+              <a:lnSpc>
+                <a:spcPct val="100000"/>
+              </a:lnSpc>
+            </a:pPr>
+            <a:r>
+              <a:rPr sz="1050" dirty="0">
+                <a:latin typeface="Arial"/>
+                <a:cs typeface="Arial"/>
+              </a:rPr>
+              <a:t>Online</a:t>
+            </a:r>
+            <a:r>
+              <a:rPr sz="1050" spc="-120" dirty="0">
+                <a:latin typeface="Arial"/>
+                <a:cs typeface="Arial"/>
+              </a:rPr>
+              <a:t> </a:t>
+            </a:r>
+            <a:r>
+              <a:rPr sz="1050" dirty="0">
+                <a:latin typeface="Arial"/>
+                <a:cs typeface="Arial"/>
+              </a:rPr>
+              <a:t>Awareness</a:t>
+            </a:r>
+          </a:p>
+        </p:txBody>
+      </p:sp>
+      <p:sp>
+        <p:nvSpPr>
+          <p:cNvPr id="58" name="object 41">
+            <a:extLst>
+              <a:ext uri="{FF2B5EF4-FFF2-40B4-BE49-F238E27FC236}">
+                <a16:creationId xmlns:a16="http://schemas.microsoft.com/office/drawing/2014/main" id="{C9AD2D62-D7E2-46B1-9AA9-AB2CE3A77669}"/>
+              </a:ext>
+            </a:extLst>
+          </p:cNvPr>
+          <p:cNvSpPr txBox="1"/>
+          <p:nvPr/>
+        </p:nvSpPr>
+        <p:spPr>
+          <a:xfrm>
+            <a:off x="3123336" y="3718080"/>
+            <a:ext cx="1837055" cy="983615"/>
+          </a:xfrm>
+          <a:prstGeom prst="rect">
+            <a:avLst/>
+          </a:prstGeom>
+          <a:ln/>
+        </p:spPr>
+        <p:style>
+          <a:lnRef idx="1">
+            <a:schemeClr val="accent1"/>
+          </a:lnRef>
+          <a:fillRef idx="2">
+            <a:schemeClr val="accent1"/>
+          </a:fillRef>
+          <a:effectRef idx="1">
+            <a:schemeClr val="accent1"/>
+          </a:effectRef>
+          <a:fontRef idx="minor">
+            <a:schemeClr val="dk1"/>
+          </a:fontRef>
+        </p:style>
+        <p:txBody>
+          <a:bodyPr vert="horz" wrap="square" lIns="0" tIns="102870" rIns="0" bIns="0" rtlCol="0">
+            <a:spAutoFit/>
+          </a:bodyPr>
+          <a:lstStyle/>
+          <a:p>
+            <a:pPr marL="20320">
+              <a:lnSpc>
+                <a:spcPct val="100000"/>
+              </a:lnSpc>
+              <a:spcBef>
+                <a:spcPts val="810"/>
+              </a:spcBef>
+            </a:pPr>
+            <a:r>
+              <a:rPr sz="1050" spc="5" dirty="0">
+                <a:latin typeface="Arial"/>
+                <a:cs typeface="Arial"/>
+              </a:rPr>
+              <a:t>GDPR </a:t>
+            </a:r>
+            <a:r>
+              <a:rPr sz="1050" dirty="0">
+                <a:latin typeface="Arial"/>
+                <a:cs typeface="Arial"/>
+              </a:rPr>
+              <a:t>for data</a:t>
+            </a:r>
+            <a:r>
+              <a:rPr sz="1050" spc="-30" dirty="0">
+                <a:latin typeface="Arial"/>
+                <a:cs typeface="Arial"/>
+              </a:rPr>
+              <a:t> </a:t>
+            </a:r>
+            <a:r>
+              <a:rPr sz="1050" dirty="0">
+                <a:latin typeface="Arial"/>
+                <a:cs typeface="Arial"/>
+              </a:rPr>
+              <a:t>management</a:t>
+            </a:r>
+            <a:endParaRPr sz="1050">
+              <a:latin typeface="Arial"/>
+              <a:cs typeface="Arial"/>
+            </a:endParaRPr>
+          </a:p>
+          <a:p>
+            <a:pPr marL="35560" marR="782320">
+              <a:lnSpc>
+                <a:spcPts val="1200"/>
+              </a:lnSpc>
+              <a:spcBef>
+                <a:spcPts val="655"/>
+              </a:spcBef>
+            </a:pPr>
+            <a:r>
+              <a:rPr sz="1050" dirty="0">
+                <a:latin typeface="Arial"/>
+                <a:cs typeface="Arial"/>
+              </a:rPr>
+              <a:t>Color / Design to  attract</a:t>
+            </a:r>
+            <a:r>
+              <a:rPr sz="1050" spc="-45" dirty="0">
+                <a:latin typeface="Arial"/>
+                <a:cs typeface="Arial"/>
+              </a:rPr>
+              <a:t> </a:t>
+            </a:r>
+            <a:r>
+              <a:rPr sz="1050" dirty="0">
+                <a:latin typeface="Arial"/>
+                <a:cs typeface="Arial"/>
+              </a:rPr>
+              <a:t>customer</a:t>
+            </a:r>
+            <a:endParaRPr sz="1050">
+              <a:latin typeface="Arial"/>
+              <a:cs typeface="Arial"/>
+            </a:endParaRPr>
+          </a:p>
+          <a:p>
+            <a:pPr marL="51435">
+              <a:lnSpc>
+                <a:spcPct val="100000"/>
+              </a:lnSpc>
+              <a:spcBef>
+                <a:spcPts val="595"/>
+              </a:spcBef>
+            </a:pPr>
+            <a:r>
+              <a:rPr sz="1050" dirty="0">
+                <a:latin typeface="Arial"/>
+                <a:cs typeface="Arial"/>
+              </a:rPr>
+              <a:t>Nearby (better?) Fishing Spot</a:t>
+            </a:r>
+            <a:endParaRPr sz="1050">
+              <a:latin typeface="Arial"/>
+              <a:cs typeface="Arial"/>
+            </a:endParaRPr>
+          </a:p>
+        </p:txBody>
+      </p:sp>
+      <p:sp>
+        <p:nvSpPr>
+          <p:cNvPr id="59" name="object 42">
+            <a:extLst>
+              <a:ext uri="{FF2B5EF4-FFF2-40B4-BE49-F238E27FC236}">
+                <a16:creationId xmlns:a16="http://schemas.microsoft.com/office/drawing/2014/main" id="{319B82EF-65AF-4378-8668-C179785DC3C4}"/>
+              </a:ext>
+            </a:extLst>
+          </p:cNvPr>
+          <p:cNvSpPr txBox="1"/>
+          <p:nvPr/>
+        </p:nvSpPr>
+        <p:spPr>
+          <a:xfrm>
+            <a:off x="5037490" y="3718080"/>
+            <a:ext cx="1837055" cy="983615"/>
+          </a:xfrm>
+          <a:prstGeom prst="rect">
+            <a:avLst/>
+          </a:prstGeom>
+          <a:ln/>
+        </p:spPr>
+        <p:style>
+          <a:lnRef idx="1">
+            <a:schemeClr val="accent1"/>
+          </a:lnRef>
+          <a:fillRef idx="2">
+            <a:schemeClr val="accent1"/>
+          </a:fillRef>
+          <a:effectRef idx="1">
+            <a:schemeClr val="accent1"/>
+          </a:effectRef>
+          <a:fontRef idx="minor">
+            <a:schemeClr val="dk1"/>
+          </a:fontRef>
+        </p:style>
+        <p:txBody>
+          <a:bodyPr vert="horz" wrap="square" lIns="0" tIns="102870" rIns="0" bIns="0" rtlCol="0">
+            <a:spAutoFit/>
+          </a:bodyPr>
+          <a:lstStyle/>
+          <a:p>
+            <a:pPr marL="207645">
+              <a:lnSpc>
+                <a:spcPct val="100000"/>
+              </a:lnSpc>
+              <a:spcBef>
+                <a:spcPts val="810"/>
+              </a:spcBef>
+            </a:pPr>
+            <a:r>
+              <a:rPr sz="1050" dirty="0">
+                <a:latin typeface="Arial"/>
+                <a:cs typeface="Arial"/>
+              </a:rPr>
+              <a:t>Locals</a:t>
+            </a:r>
+            <a:r>
+              <a:rPr sz="1050" spc="-20" dirty="0">
+                <a:latin typeface="Arial"/>
+                <a:cs typeface="Arial"/>
+              </a:rPr>
+              <a:t> </a:t>
+            </a:r>
+            <a:r>
+              <a:rPr sz="1050" dirty="0">
+                <a:latin typeface="Arial"/>
+                <a:cs typeface="Arial"/>
+              </a:rPr>
+              <a:t>Responsiveness</a:t>
+            </a:r>
+          </a:p>
+          <a:p>
+            <a:pPr marL="207645">
+              <a:lnSpc>
+                <a:spcPct val="100000"/>
+              </a:lnSpc>
+              <a:spcBef>
+                <a:spcPts val="480"/>
+              </a:spcBef>
+            </a:pPr>
+            <a:r>
+              <a:rPr sz="1050" dirty="0">
+                <a:latin typeface="Arial"/>
+                <a:cs typeface="Arial"/>
+              </a:rPr>
+              <a:t>UI</a:t>
+            </a:r>
+            <a:r>
+              <a:rPr sz="1050" spc="-35" dirty="0">
+                <a:latin typeface="Arial"/>
+                <a:cs typeface="Arial"/>
+              </a:rPr>
+              <a:t> </a:t>
+            </a:r>
+            <a:r>
+              <a:rPr sz="1050" dirty="0">
+                <a:latin typeface="Arial"/>
+                <a:cs typeface="Arial"/>
+              </a:rPr>
+              <a:t>Responsiveness</a:t>
+            </a:r>
+          </a:p>
+          <a:p>
+            <a:pPr marL="207645">
+              <a:lnSpc>
+                <a:spcPct val="100000"/>
+              </a:lnSpc>
+              <a:spcBef>
+                <a:spcPts val="480"/>
+              </a:spcBef>
+            </a:pPr>
+            <a:r>
+              <a:rPr sz="1050" dirty="0">
+                <a:latin typeface="Arial"/>
+                <a:cs typeface="Arial"/>
+              </a:rPr>
+              <a:t>No</a:t>
+            </a:r>
+            <a:r>
+              <a:rPr lang="it-IT" sz="1050" dirty="0">
+                <a:latin typeface="Arial"/>
+                <a:cs typeface="Arial"/>
+              </a:rPr>
+              <a:t>t</a:t>
+            </a:r>
+            <a:r>
+              <a:rPr sz="1050" dirty="0">
+                <a:latin typeface="Arial"/>
+                <a:cs typeface="Arial"/>
+              </a:rPr>
+              <a:t> intuitive</a:t>
+            </a:r>
+            <a:r>
+              <a:rPr sz="1050" spc="-35" dirty="0">
+                <a:latin typeface="Arial"/>
+                <a:cs typeface="Arial"/>
+              </a:rPr>
+              <a:t> </a:t>
+            </a:r>
+            <a:r>
+              <a:rPr sz="1050" dirty="0">
+                <a:latin typeface="Arial"/>
+                <a:cs typeface="Arial"/>
+              </a:rPr>
+              <a:t>Design</a:t>
+            </a:r>
+          </a:p>
+        </p:txBody>
+      </p:sp>
+      <p:sp>
+        <p:nvSpPr>
+          <p:cNvPr id="60" name="object 44">
+            <a:extLst>
+              <a:ext uri="{FF2B5EF4-FFF2-40B4-BE49-F238E27FC236}">
+                <a16:creationId xmlns:a16="http://schemas.microsoft.com/office/drawing/2014/main" id="{3D3AA913-030C-4A32-A1B2-2D4294F012EE}"/>
+              </a:ext>
+            </a:extLst>
+          </p:cNvPr>
+          <p:cNvSpPr txBox="1"/>
+          <p:nvPr/>
+        </p:nvSpPr>
+        <p:spPr>
+          <a:xfrm>
+            <a:off x="6952742" y="3718080"/>
+            <a:ext cx="2113280" cy="983615"/>
+          </a:xfrm>
+          <a:prstGeom prst="rect">
+            <a:avLst/>
+          </a:prstGeom>
+          <a:ln/>
+        </p:spPr>
+        <p:style>
+          <a:lnRef idx="1">
+            <a:schemeClr val="accent1"/>
+          </a:lnRef>
+          <a:fillRef idx="2">
+            <a:schemeClr val="accent1"/>
+          </a:fillRef>
+          <a:effectRef idx="1">
+            <a:schemeClr val="accent1"/>
+          </a:effectRef>
+          <a:fontRef idx="minor">
+            <a:schemeClr val="dk1"/>
+          </a:fontRef>
+        </p:style>
+        <p:txBody>
+          <a:bodyPr vert="horz" wrap="square" lIns="0" tIns="72390" rIns="0" bIns="0" rtlCol="0">
+            <a:spAutoFit/>
+          </a:bodyPr>
+          <a:lstStyle/>
+          <a:p>
+            <a:pPr marL="93980" marR="215900">
+              <a:lnSpc>
+                <a:spcPts val="1200"/>
+              </a:lnSpc>
+              <a:spcBef>
+                <a:spcPts val="570"/>
+              </a:spcBef>
+            </a:pPr>
+            <a:r>
+              <a:rPr sz="1050" dirty="0">
+                <a:latin typeface="Arial"/>
+                <a:cs typeface="Arial"/>
+              </a:rPr>
+              <a:t>App reputation relies on every  single local behaviour  (working with the</a:t>
+            </a:r>
+            <a:r>
+              <a:rPr sz="1050" spc="-15" dirty="0">
+                <a:latin typeface="Arial"/>
+                <a:cs typeface="Arial"/>
+              </a:rPr>
+              <a:t> </a:t>
+            </a:r>
+            <a:r>
+              <a:rPr sz="1050" dirty="0">
+                <a:latin typeface="Arial"/>
+                <a:cs typeface="Arial"/>
+              </a:rPr>
+              <a:t>service)</a:t>
+            </a:r>
+          </a:p>
+          <a:p>
+            <a:pPr marL="133350">
+              <a:lnSpc>
+                <a:spcPct val="100000"/>
+              </a:lnSpc>
+              <a:spcBef>
+                <a:spcPts val="620"/>
+              </a:spcBef>
+            </a:pPr>
+            <a:r>
+              <a:rPr sz="1050" dirty="0">
+                <a:latin typeface="Arial"/>
+                <a:cs typeface="Arial"/>
+              </a:rPr>
+              <a:t>Not attractive</a:t>
+            </a:r>
+            <a:r>
+              <a:rPr sz="1050" spc="-55" dirty="0">
+                <a:latin typeface="Arial"/>
+                <a:cs typeface="Arial"/>
+              </a:rPr>
+              <a:t> </a:t>
+            </a:r>
+            <a:r>
+              <a:rPr sz="1050" dirty="0">
+                <a:latin typeface="Arial"/>
+                <a:cs typeface="Arial"/>
+              </a:rPr>
+              <a:t>offers</a:t>
+            </a:r>
+          </a:p>
+          <a:p>
+            <a:pPr marL="149225">
+              <a:lnSpc>
+                <a:spcPct val="100000"/>
+              </a:lnSpc>
+              <a:spcBef>
+                <a:spcPts val="105"/>
+              </a:spcBef>
+            </a:pPr>
+            <a:r>
+              <a:rPr sz="1050" spc="5" dirty="0">
+                <a:latin typeface="Arial"/>
+                <a:cs typeface="Arial"/>
+              </a:rPr>
+              <a:t>Spam</a:t>
+            </a:r>
+            <a:endParaRPr sz="1050" dirty="0">
+              <a:latin typeface="Arial"/>
+              <a:cs typeface="Arial"/>
+            </a:endParaRPr>
+          </a:p>
+        </p:txBody>
+      </p:sp>
+      <p:sp>
+        <p:nvSpPr>
+          <p:cNvPr id="61" name="object 8">
+            <a:extLst>
+              <a:ext uri="{FF2B5EF4-FFF2-40B4-BE49-F238E27FC236}">
+                <a16:creationId xmlns:a16="http://schemas.microsoft.com/office/drawing/2014/main" id="{5EF4BEDC-52FF-4A42-99A2-C3D78710D6F2}"/>
+              </a:ext>
+            </a:extLst>
+          </p:cNvPr>
+          <p:cNvSpPr txBox="1"/>
+          <p:nvPr/>
+        </p:nvSpPr>
+        <p:spPr>
+          <a:xfrm>
+            <a:off x="423213" y="3718080"/>
+            <a:ext cx="1219835" cy="983615"/>
+          </a:xfrm>
+          <a:prstGeom prst="rect">
+            <a:avLst/>
+          </a:prstGeom>
+        </p:spPr>
+        <p:style>
+          <a:lnRef idx="1">
+            <a:schemeClr val="accent2"/>
+          </a:lnRef>
+          <a:fillRef idx="2">
+            <a:schemeClr val="accent2"/>
+          </a:fillRef>
+          <a:effectRef idx="1">
+            <a:schemeClr val="accent2"/>
+          </a:effectRef>
+          <a:fontRef idx="minor">
+            <a:schemeClr val="dk1"/>
+          </a:fontRef>
+        </p:style>
+        <p:txBody>
+          <a:bodyPr vert="horz" wrap="square" lIns="0" tIns="0" rIns="0" bIns="0" rtlCol="0">
+            <a:spAutoFit/>
+          </a:bodyPr>
+          <a:lstStyle/>
+          <a:p>
+            <a:pPr>
+              <a:lnSpc>
+                <a:spcPct val="100000"/>
+              </a:lnSpc>
+            </a:pPr>
+            <a:endParaRPr sz="1300" dirty="0">
+              <a:latin typeface="Times New Roman"/>
+              <a:cs typeface="Times New Roman"/>
+            </a:endParaRPr>
+          </a:p>
+          <a:p>
+            <a:pPr>
+              <a:lnSpc>
+                <a:spcPct val="100000"/>
+              </a:lnSpc>
+              <a:spcBef>
+                <a:spcPts val="40"/>
+              </a:spcBef>
+            </a:pPr>
+            <a:endParaRPr sz="1450" dirty="0">
+              <a:latin typeface="Times New Roman"/>
+              <a:cs typeface="Times New Roman"/>
+            </a:endParaRPr>
+          </a:p>
+          <a:p>
+            <a:pPr marL="135255">
+              <a:lnSpc>
+                <a:spcPct val="100000"/>
+              </a:lnSpc>
+            </a:pPr>
+            <a:r>
+              <a:rPr sz="1100" b="1" spc="-15" dirty="0">
+                <a:solidFill>
+                  <a:srgbClr val="312D2B"/>
+                </a:solidFill>
+                <a:latin typeface="Arial"/>
+                <a:cs typeface="Arial"/>
+              </a:rPr>
+              <a:t>CHALLENGES</a:t>
+            </a:r>
+            <a:endParaRPr sz="1100" dirty="0">
+              <a:latin typeface="Arial"/>
+              <a:cs typeface="Arial"/>
+            </a:endParaRPr>
+          </a:p>
+        </p:txBody>
+      </p:sp>
+    </p:spTree>
+    <p:extLst>
+      <p:ext uri="{BB962C8B-B14F-4D97-AF65-F5344CB8AC3E}">
+        <p14:creationId xmlns:p14="http://schemas.microsoft.com/office/powerpoint/2010/main" val="2815340418"/>
       </p:ext>
     </p:extLst>
   </p:cSld>

</xml_diff>

<commit_message>
Added second persona, updated presentation with him too
</commit_message>
<xml_diff>
--- a/Presentation.pptx
+++ b/Presentation.pptx
@@ -9,9 +9,11 @@
     <p:sldId id="257" r:id="rId3"/>
     <p:sldId id="258" r:id="rId4"/>
     <p:sldId id="259" r:id="rId5"/>
-    <p:sldId id="260" r:id="rId6"/>
-    <p:sldId id="261" r:id="rId7"/>
-    <p:sldId id="263" r:id="rId8"/>
+    <p:sldId id="268" r:id="rId6"/>
+    <p:sldId id="267" r:id="rId7"/>
+    <p:sldId id="260" r:id="rId8"/>
+    <p:sldId id="261" r:id="rId9"/>
+    <p:sldId id="263" r:id="rId10"/>
   </p:sldIdLst>
   <p:sldSz cx="12192000" cy="6858000"/>
   <p:notesSz cx="6858000" cy="9144000"/>
@@ -863,7 +865,7 @@
           <a:p>
             <a:fld id="{C02C31D5-3281-4246-B14E-A29AB474AA1B}" type="datetimeFigureOut">
               <a:rPr lang="it-IT" smtClean="0"/>
-              <a:t>02/04/2019</a:t>
+              <a:t>16/04/2019</a:t>
             </a:fld>
             <a:endParaRPr lang="it-IT"/>
           </a:p>
@@ -1114,7 +1116,7 @@
           <a:p>
             <a:fld id="{C02C31D5-3281-4246-B14E-A29AB474AA1B}" type="datetimeFigureOut">
               <a:rPr lang="it-IT" smtClean="0"/>
-              <a:t>02/04/2019</a:t>
+              <a:t>16/04/2019</a:t>
             </a:fld>
             <a:endParaRPr lang="it-IT"/>
           </a:p>
@@ -1428,7 +1430,7 @@
           <a:p>
             <a:fld id="{C02C31D5-3281-4246-B14E-A29AB474AA1B}" type="datetimeFigureOut">
               <a:rPr lang="it-IT" smtClean="0"/>
-              <a:t>02/04/2019</a:t>
+              <a:t>16/04/2019</a:t>
             </a:fld>
             <a:endParaRPr lang="it-IT"/>
           </a:p>
@@ -1761,7 +1763,7 @@
           <a:p>
             <a:fld id="{C02C31D5-3281-4246-B14E-A29AB474AA1B}" type="datetimeFigureOut">
               <a:rPr lang="it-IT" smtClean="0"/>
-              <a:t>02/04/2019</a:t>
+              <a:t>16/04/2019</a:t>
             </a:fld>
             <a:endParaRPr lang="it-IT"/>
           </a:p>
@@ -2075,7 +2077,7 @@
           <a:p>
             <a:fld id="{C02C31D5-3281-4246-B14E-A29AB474AA1B}" type="datetimeFigureOut">
               <a:rPr lang="it-IT" smtClean="0"/>
-              <a:t>02/04/2019</a:t>
+              <a:t>16/04/2019</a:t>
             </a:fld>
             <a:endParaRPr lang="it-IT"/>
           </a:p>
@@ -2468,7 +2470,7 @@
           <a:p>
             <a:fld id="{C02C31D5-3281-4246-B14E-A29AB474AA1B}" type="datetimeFigureOut">
               <a:rPr lang="it-IT" smtClean="0"/>
-              <a:t>02/04/2019</a:t>
+              <a:t>16/04/2019</a:t>
             </a:fld>
             <a:endParaRPr lang="it-IT"/>
           </a:p>
@@ -2638,7 +2640,7 @@
           <a:p>
             <a:fld id="{C02C31D5-3281-4246-B14E-A29AB474AA1B}" type="datetimeFigureOut">
               <a:rPr lang="it-IT" smtClean="0"/>
-              <a:t>02/04/2019</a:t>
+              <a:t>16/04/2019</a:t>
             </a:fld>
             <a:endParaRPr lang="it-IT"/>
           </a:p>
@@ -2818,7 +2820,7 @@
           <a:p>
             <a:fld id="{C02C31D5-3281-4246-B14E-A29AB474AA1B}" type="datetimeFigureOut">
               <a:rPr lang="it-IT" smtClean="0"/>
-              <a:t>02/04/2019</a:t>
+              <a:t>16/04/2019</a:t>
             </a:fld>
             <a:endParaRPr lang="it-IT"/>
           </a:p>
@@ -2988,7 +2990,7 @@
           <a:p>
             <a:fld id="{C02C31D5-3281-4246-B14E-A29AB474AA1B}" type="datetimeFigureOut">
               <a:rPr lang="it-IT" smtClean="0"/>
-              <a:t>02/04/2019</a:t>
+              <a:t>16/04/2019</a:t>
             </a:fld>
             <a:endParaRPr lang="it-IT"/>
           </a:p>
@@ -3235,7 +3237,7 @@
           <a:p>
             <a:fld id="{C02C31D5-3281-4246-B14E-A29AB474AA1B}" type="datetimeFigureOut">
               <a:rPr lang="it-IT" smtClean="0"/>
-              <a:t>02/04/2019</a:t>
+              <a:t>16/04/2019</a:t>
             </a:fld>
             <a:endParaRPr lang="it-IT"/>
           </a:p>
@@ -3467,7 +3469,7 @@
           <a:p>
             <a:fld id="{C02C31D5-3281-4246-B14E-A29AB474AA1B}" type="datetimeFigureOut">
               <a:rPr lang="it-IT" smtClean="0"/>
-              <a:t>02/04/2019</a:t>
+              <a:t>16/04/2019</a:t>
             </a:fld>
             <a:endParaRPr lang="it-IT"/>
           </a:p>
@@ -3841,7 +3843,7 @@
           <a:p>
             <a:fld id="{C02C31D5-3281-4246-B14E-A29AB474AA1B}" type="datetimeFigureOut">
               <a:rPr lang="it-IT" smtClean="0"/>
-              <a:t>02/04/2019</a:t>
+              <a:t>16/04/2019</a:t>
             </a:fld>
             <a:endParaRPr lang="it-IT"/>
           </a:p>
@@ -3964,7 +3966,7 @@
           <a:p>
             <a:fld id="{C02C31D5-3281-4246-B14E-A29AB474AA1B}" type="datetimeFigureOut">
               <a:rPr lang="it-IT" smtClean="0"/>
-              <a:t>02/04/2019</a:t>
+              <a:t>16/04/2019</a:t>
             </a:fld>
             <a:endParaRPr lang="it-IT"/>
           </a:p>
@@ -4059,7 +4061,7 @@
           <a:p>
             <a:fld id="{C02C31D5-3281-4246-B14E-A29AB474AA1B}" type="datetimeFigureOut">
               <a:rPr lang="it-IT" smtClean="0"/>
-              <a:t>02/04/2019</a:t>
+              <a:t>16/04/2019</a:t>
             </a:fld>
             <a:endParaRPr lang="it-IT"/>
           </a:p>
@@ -4314,7 +4316,7 @@
           <a:p>
             <a:fld id="{C02C31D5-3281-4246-B14E-A29AB474AA1B}" type="datetimeFigureOut">
               <a:rPr lang="it-IT" smtClean="0"/>
-              <a:t>02/04/2019</a:t>
+              <a:t>16/04/2019</a:t>
             </a:fld>
             <a:endParaRPr lang="it-IT"/>
           </a:p>
@@ -4619,7 +4621,7 @@
           <a:p>
             <a:fld id="{C02C31D5-3281-4246-B14E-A29AB474AA1B}" type="datetimeFigureOut">
               <a:rPr lang="it-IT" smtClean="0"/>
-              <a:t>02/04/2019</a:t>
+              <a:t>16/04/2019</a:t>
             </a:fld>
             <a:endParaRPr lang="it-IT"/>
           </a:p>
@@ -5321,7 +5323,7 @@
           <a:p>
             <a:fld id="{C02C31D5-3281-4246-B14E-A29AB474AA1B}" type="datetimeFigureOut">
               <a:rPr lang="it-IT" smtClean="0"/>
-              <a:t>02/04/2019</a:t>
+              <a:t>16/04/2019</a:t>
             </a:fld>
             <a:endParaRPr lang="it-IT"/>
           </a:p>
@@ -5968,7 +5970,7 @@
           <a:lstStyle/>
           <a:p>
             <a:pPr algn="ctr"/>
-            <a:endParaRPr lang="en-US"/>
+            <a:endParaRPr lang="en-US" dirty="0"/>
           </a:p>
         </p:txBody>
       </p:sp>
@@ -6029,7 +6031,7 @@
           <a:bodyPr/>
           <a:lstStyle/>
           <a:p>
-            <a:endParaRPr lang="en-US"/>
+            <a:endParaRPr lang="en-US" dirty="0"/>
           </a:p>
         </p:txBody>
       </p:sp>
@@ -6776,14 +6778,14 @@
           <a:p>
             <a:pPr algn="ctr"/>
             <a:r>
-              <a:rPr lang="en-US" sz="3300"/>
+              <a:rPr lang="en-US" sz="3300" dirty="0"/>
               <a:t>Persona </a:t>
             </a:r>
             <a:br>
-              <a:rPr lang="en-US" sz="3300"/>
+              <a:rPr lang="en-US" sz="3300" dirty="0"/>
             </a:br>
             <a:r>
-              <a:rPr lang="en-US" sz="3300"/>
+              <a:rPr lang="en-US" sz="3300" dirty="0"/>
               <a:t>Bob the local fishing enthusiast</a:t>
             </a:r>
             <a:endParaRPr lang="it-IT" sz="3300" dirty="0"/>
@@ -6969,57 +6971,56 @@
           <a:lstStyle/>
           <a:p>
             <a:r>
-              <a:rPr lang="en-US"/>
+              <a:rPr lang="en-US" dirty="0"/>
               <a:t>Personality:</a:t>
             </a:r>
             <a:br>
-              <a:rPr lang="en-US"/>
+              <a:rPr lang="en-US" dirty="0"/>
             </a:br>
             <a:r>
-              <a:rPr lang="en-US"/>
+              <a:rPr lang="en-US" dirty="0"/>
               <a:t>Bob is a kind man always with a smile on his face, truly an optimist at hearth that always sees the glass half full.</a:t>
             </a:r>
           </a:p>
           <a:p>
             <a:r>
-              <a:rPr lang="en-US"/>
+              <a:rPr lang="en-US" dirty="0"/>
               <a:t>Social environment:</a:t>
             </a:r>
             <a:br>
-              <a:rPr lang="en-US"/>
+              <a:rPr lang="en-US" dirty="0"/>
             </a:br>
             <a:r>
-              <a:rPr lang="en-US"/>
+              <a:rPr lang="en-US" dirty="0"/>
               <a:t>Active member of his small community he is both well known and respected for his contributions whenever needed.</a:t>
             </a:r>
           </a:p>
           <a:p>
             <a:r>
-              <a:rPr lang="en-US"/>
+              <a:rPr lang="en-US" dirty="0"/>
               <a:t>Dreams:</a:t>
             </a:r>
           </a:p>
           <a:p>
             <a:pPr lvl="1"/>
             <a:r>
-              <a:rPr lang="en-US"/>
+              <a:rPr lang="en-US" dirty="0"/>
               <a:t>Having his own independent job</a:t>
             </a:r>
           </a:p>
           <a:p>
             <a:pPr lvl="1"/>
             <a:r>
-              <a:rPr lang="en-US"/>
+              <a:rPr lang="en-US" dirty="0"/>
               <a:t>Spending more time with his kids</a:t>
             </a:r>
           </a:p>
           <a:p>
             <a:pPr lvl="1"/>
             <a:r>
-              <a:rPr lang="en-US"/>
+              <a:rPr lang="en-US" dirty="0"/>
               <a:t>Provide more for his family</a:t>
             </a:r>
-            <a:endParaRPr lang="en-US" dirty="0"/>
           </a:p>
         </p:txBody>
       </p:sp>
@@ -7037,6 +7038,532 @@
 </file>
 
 <file path=ppt/slides/slide5.xml><?xml version="1.0" encoding="utf-8"?>
+<p:sld xmlns:a="http://schemas.openxmlformats.org/drawingml/2006/main" xmlns:r="http://schemas.openxmlformats.org/officeDocument/2006/relationships" xmlns:p="http://schemas.openxmlformats.org/presentationml/2006/main">
+  <p:cSld>
+    <p:spTree>
+      <p:nvGrpSpPr>
+        <p:cNvPr id="1" name=""/>
+        <p:cNvGrpSpPr/>
+        <p:nvPr/>
+      </p:nvGrpSpPr>
+      <p:grpSpPr>
+        <a:xfrm>
+          <a:off x="0" y="0"/>
+          <a:ext cx="0" cy="0"/>
+          <a:chOff x="0" y="0"/>
+          <a:chExt cx="0" cy="0"/>
+        </a:xfrm>
+      </p:grpSpPr>
+      <p:sp>
+        <p:nvSpPr>
+          <p:cNvPr id="2" name="Title 1">
+            <a:extLst>
+              <a:ext uri="{FF2B5EF4-FFF2-40B4-BE49-F238E27FC236}">
+                <a16:creationId xmlns:a16="http://schemas.microsoft.com/office/drawing/2014/main" id="{1AC0C4F8-7D3C-47A5-8F2A-7292AE262D70}"/>
+              </a:ext>
+            </a:extLst>
+          </p:cNvPr>
+          <p:cNvSpPr>
+            <a:spLocks noGrp="1"/>
+          </p:cNvSpPr>
+          <p:nvPr>
+            <p:ph type="title"/>
+          </p:nvPr>
+        </p:nvSpPr>
+        <p:spPr>
+          <a:xfrm>
+            <a:off x="2849562" y="609600"/>
+            <a:ext cx="6424440" cy="1320800"/>
+          </a:xfrm>
+        </p:spPr>
+        <p:txBody>
+          <a:bodyPr>
+            <a:normAutofit/>
+          </a:bodyPr>
+          <a:lstStyle/>
+          <a:p>
+            <a:r>
+              <a:rPr lang="en-US" dirty="0"/>
+              <a:t>Persona </a:t>
+            </a:r>
+            <a:br>
+              <a:rPr lang="en-US" dirty="0"/>
+            </a:br>
+            <a:r>
+              <a:rPr lang="en-US" dirty="0"/>
+              <a:t>Jack the tourist fisherman</a:t>
+            </a:r>
+            <a:endParaRPr lang="it-IT" dirty="0"/>
+          </a:p>
+        </p:txBody>
+      </p:sp>
+      <p:pic>
+        <p:nvPicPr>
+          <p:cNvPr id="7" name="Picture 6">
+            <a:extLst>
+              <a:ext uri="{FF2B5EF4-FFF2-40B4-BE49-F238E27FC236}">
+                <a16:creationId xmlns:a16="http://schemas.microsoft.com/office/drawing/2014/main" id="{B94CAE57-AD53-4C8C-A5A2-79209DE4808D}"/>
+              </a:ext>
+            </a:extLst>
+          </p:cNvPr>
+          <p:cNvPicPr>
+            <a:picLocks noChangeAspect="1"/>
+          </p:cNvPicPr>
+          <p:nvPr/>
+        </p:nvPicPr>
+        <p:blipFill rotWithShape="1">
+          <a:blip r:embed="rId2">
+            <a:extLst>
+              <a:ext uri="{28A0092B-C50C-407E-A947-70E740481C1C}">
+                <a14:useLocalDpi xmlns:a14="http://schemas.microsoft.com/office/drawing/2010/main" val="0"/>
+              </a:ext>
+            </a:extLst>
+          </a:blip>
+          <a:srcRect l="30137" r="24497" b="1996"/>
+          <a:stretch/>
+        </p:blipFill>
+        <p:spPr>
+          <a:xfrm>
+            <a:off x="20" y="10"/>
+            <a:ext cx="2734036" cy="6867719"/>
+          </a:xfrm>
+          <a:custGeom>
+            <a:avLst/>
+            <a:gdLst>
+              <a:gd name="connsiteX0" fmla="*/ 0 w 2734056"/>
+              <a:gd name="connsiteY0" fmla="*/ 0 h 6858000"/>
+              <a:gd name="connsiteX1" fmla="*/ 1674254 w 2734056"/>
+              <a:gd name="connsiteY1" fmla="*/ 0 h 6858000"/>
+              <a:gd name="connsiteX2" fmla="*/ 2734056 w 2734056"/>
+              <a:gd name="connsiteY2" fmla="*/ 6850199 h 6858000"/>
+              <a:gd name="connsiteX3" fmla="*/ 2734056 w 2734056"/>
+              <a:gd name="connsiteY3" fmla="*/ 6858000 h 6858000"/>
+              <a:gd name="connsiteX4" fmla="*/ 461457 w 2734056"/>
+              <a:gd name="connsiteY4" fmla="*/ 6858000 h 6858000"/>
+              <a:gd name="connsiteX5" fmla="*/ 0 w 2734056"/>
+              <a:gd name="connsiteY5" fmla="*/ 4134118 h 6858000"/>
+            </a:gdLst>
+            <a:ahLst/>
+            <a:cxnLst>
+              <a:cxn ang="0">
+                <a:pos x="connsiteX0" y="connsiteY0"/>
+              </a:cxn>
+              <a:cxn ang="0">
+                <a:pos x="connsiteX1" y="connsiteY1"/>
+              </a:cxn>
+              <a:cxn ang="0">
+                <a:pos x="connsiteX2" y="connsiteY2"/>
+              </a:cxn>
+              <a:cxn ang="0">
+                <a:pos x="connsiteX3" y="connsiteY3"/>
+              </a:cxn>
+              <a:cxn ang="0">
+                <a:pos x="connsiteX4" y="connsiteY4"/>
+              </a:cxn>
+              <a:cxn ang="0">
+                <a:pos x="connsiteX5" y="connsiteY5"/>
+              </a:cxn>
+            </a:cxnLst>
+            <a:rect l="l" t="t" r="r" b="b"/>
+            <a:pathLst>
+              <a:path w="2734056" h="6858000">
+                <a:moveTo>
+                  <a:pt x="0" y="0"/>
+                </a:moveTo>
+                <a:lnTo>
+                  <a:pt x="1674254" y="0"/>
+                </a:lnTo>
+                <a:lnTo>
+                  <a:pt x="2734056" y="6850199"/>
+                </a:lnTo>
+                <a:lnTo>
+                  <a:pt x="2734056" y="6858000"/>
+                </a:lnTo>
+                <a:lnTo>
+                  <a:pt x="461457" y="6858000"/>
+                </a:lnTo>
+                <a:lnTo>
+                  <a:pt x="0" y="4134118"/>
+                </a:lnTo>
+                <a:close/>
+              </a:path>
+            </a:pathLst>
+          </a:custGeom>
+        </p:spPr>
+      </p:pic>
+      <p:sp>
+        <p:nvSpPr>
+          <p:cNvPr id="3" name="Content Placeholder 2">
+            <a:extLst>
+              <a:ext uri="{FF2B5EF4-FFF2-40B4-BE49-F238E27FC236}">
+                <a16:creationId xmlns:a16="http://schemas.microsoft.com/office/drawing/2014/main" id="{C47F41CA-2A00-4472-8AC3-C94817791AF8}"/>
+              </a:ext>
+            </a:extLst>
+          </p:cNvPr>
+          <p:cNvSpPr>
+            <a:spLocks noGrp="1"/>
+          </p:cNvSpPr>
+          <p:nvPr>
+            <p:ph idx="1"/>
+          </p:nvPr>
+        </p:nvSpPr>
+        <p:spPr>
+          <a:xfrm>
+            <a:off x="2849562" y="2160589"/>
+            <a:ext cx="6424440" cy="3880773"/>
+          </a:xfrm>
+        </p:spPr>
+        <p:txBody>
+          <a:bodyPr>
+            <a:normAutofit/>
+          </a:bodyPr>
+          <a:lstStyle/>
+          <a:p>
+            <a:pPr>
+              <a:lnSpc>
+                <a:spcPct val="90000"/>
+              </a:lnSpc>
+            </a:pPr>
+            <a:r>
+              <a:rPr lang="en-GB" sz="1300" dirty="0"/>
+              <a:t>Jack (36) father of a little girl  (6 </a:t>
+            </a:r>
+            <a:r>
+              <a:rPr lang="en-GB" sz="1300" dirty="0" err="1"/>
+              <a:t>yo</a:t>
+            </a:r>
+            <a:r>
+              <a:rPr lang="en-GB" sz="1300" dirty="0"/>
+              <a:t>) lives with her and his wife in Columbus Ohio, he's an IT technician in a medium size company where he's been working since 2007. He never got a degree but studied  IT in high school and has always  been tech savvy. Jack's father always brought him to do outdoors activities, from rafting to camping and his true passion has always been fishing, which he still does. </a:t>
+            </a:r>
+          </a:p>
+          <a:p>
+            <a:pPr>
+              <a:lnSpc>
+                <a:spcPct val="90000"/>
+              </a:lnSpc>
+            </a:pPr>
+            <a:r>
+              <a:rPr lang="en-US" sz="1300" dirty="0"/>
+              <a:t>Passions and skills: fishing, camping, driving, football, rafting.</a:t>
+            </a:r>
+          </a:p>
+          <a:p>
+            <a:pPr>
+              <a:lnSpc>
+                <a:spcPct val="90000"/>
+              </a:lnSpc>
+            </a:pPr>
+            <a:r>
+              <a:rPr lang="en-US" sz="1300" dirty="0"/>
+              <a:t>Why he would engage with us: </a:t>
+            </a:r>
+          </a:p>
+          <a:p>
+            <a:pPr lvl="1">
+              <a:lnSpc>
+                <a:spcPct val="90000"/>
+              </a:lnSpc>
+            </a:pPr>
+            <a:r>
+              <a:rPr lang="en-US" sz="1300" dirty="0"/>
+              <a:t>He is looking for a new fishing area</a:t>
+            </a:r>
+          </a:p>
+          <a:p>
+            <a:pPr lvl="1">
+              <a:lnSpc>
+                <a:spcPct val="90000"/>
+              </a:lnSpc>
+            </a:pPr>
+            <a:r>
+              <a:rPr lang="en-US" sz="1300" dirty="0"/>
+              <a:t>Outdoors lover</a:t>
+            </a:r>
+          </a:p>
+          <a:p>
+            <a:pPr>
+              <a:lnSpc>
+                <a:spcPct val="90000"/>
+              </a:lnSpc>
+            </a:pPr>
+            <a:r>
+              <a:rPr lang="en-US" sz="1300" dirty="0"/>
+              <a:t>Daily routine:</a:t>
+            </a:r>
+            <a:br>
+              <a:rPr lang="it-IT" sz="1300" dirty="0"/>
+            </a:br>
+            <a:r>
+              <a:rPr lang="en-US" sz="1300" dirty="0"/>
+              <a:t>Wakes up with his wife and daughter, takes her to preschool before going to work, they then meet again at launch and after he goes back for the afternoon shift.</a:t>
+            </a:r>
+            <a:br>
+              <a:rPr lang="en-US" sz="1300" dirty="0"/>
+            </a:br>
+            <a:r>
+              <a:rPr lang="en-US" sz="1300" dirty="0"/>
+              <a:t>When he gets back in the evening they all eat together and spend the evening watching TV until the little one’s bet time comes, at which point Jack usually catches up with the latest football news.</a:t>
+            </a:r>
+          </a:p>
+        </p:txBody>
+      </p:sp>
+    </p:spTree>
+    <p:extLst>
+      <p:ext uri="{BB962C8B-B14F-4D97-AF65-F5344CB8AC3E}">
+        <p14:creationId xmlns:p14="http://schemas.microsoft.com/office/powerpoint/2010/main" val="4034178258"/>
+      </p:ext>
+    </p:extLst>
+  </p:cSld>
+  <p:clrMapOvr>
+    <a:masterClrMapping/>
+  </p:clrMapOvr>
+</p:sld>
+</file>
+
+<file path=ppt/slides/slide6.xml><?xml version="1.0" encoding="utf-8"?>
+<p:sld xmlns:a="http://schemas.openxmlformats.org/drawingml/2006/main" xmlns:r="http://schemas.openxmlformats.org/officeDocument/2006/relationships" xmlns:p="http://schemas.openxmlformats.org/presentationml/2006/main">
+  <p:cSld>
+    <p:spTree>
+      <p:nvGrpSpPr>
+        <p:cNvPr id="1" name=""/>
+        <p:cNvGrpSpPr/>
+        <p:nvPr/>
+      </p:nvGrpSpPr>
+      <p:grpSpPr>
+        <a:xfrm>
+          <a:off x="0" y="0"/>
+          <a:ext cx="0" cy="0"/>
+          <a:chOff x="0" y="0"/>
+          <a:chExt cx="0" cy="0"/>
+        </a:xfrm>
+      </p:grpSpPr>
+      <p:sp>
+        <p:nvSpPr>
+          <p:cNvPr id="2" name="Title 1">
+            <a:extLst>
+              <a:ext uri="{FF2B5EF4-FFF2-40B4-BE49-F238E27FC236}">
+                <a16:creationId xmlns:a16="http://schemas.microsoft.com/office/drawing/2014/main" id="{1AC0C4F8-7D3C-47A5-8F2A-7292AE262D70}"/>
+              </a:ext>
+            </a:extLst>
+          </p:cNvPr>
+          <p:cNvSpPr>
+            <a:spLocks noGrp="1"/>
+          </p:cNvSpPr>
+          <p:nvPr>
+            <p:ph type="title"/>
+          </p:nvPr>
+        </p:nvSpPr>
+        <p:spPr>
+          <a:xfrm>
+            <a:off x="2849562" y="609600"/>
+            <a:ext cx="6424440" cy="1320800"/>
+          </a:xfrm>
+        </p:spPr>
+        <p:txBody>
+          <a:bodyPr>
+            <a:normAutofit/>
+          </a:bodyPr>
+          <a:lstStyle/>
+          <a:p>
+            <a:r>
+              <a:rPr lang="en-US" dirty="0"/>
+              <a:t>Persona </a:t>
+            </a:r>
+            <a:br>
+              <a:rPr lang="en-US" dirty="0"/>
+            </a:br>
+            <a:r>
+              <a:rPr lang="en-US" dirty="0"/>
+              <a:t>Jack the tourist fisherman</a:t>
+            </a:r>
+            <a:endParaRPr lang="it-IT" dirty="0"/>
+          </a:p>
+        </p:txBody>
+      </p:sp>
+      <p:pic>
+        <p:nvPicPr>
+          <p:cNvPr id="7" name="Picture 6">
+            <a:extLst>
+              <a:ext uri="{FF2B5EF4-FFF2-40B4-BE49-F238E27FC236}">
+                <a16:creationId xmlns:a16="http://schemas.microsoft.com/office/drawing/2014/main" id="{B94CAE57-AD53-4C8C-A5A2-79209DE4808D}"/>
+              </a:ext>
+            </a:extLst>
+          </p:cNvPr>
+          <p:cNvPicPr>
+            <a:picLocks noChangeAspect="1"/>
+          </p:cNvPicPr>
+          <p:nvPr/>
+        </p:nvPicPr>
+        <p:blipFill rotWithShape="1">
+          <a:blip r:embed="rId2">
+            <a:extLst>
+              <a:ext uri="{28A0092B-C50C-407E-A947-70E740481C1C}">
+                <a14:useLocalDpi xmlns:a14="http://schemas.microsoft.com/office/drawing/2010/main" val="0"/>
+              </a:ext>
+            </a:extLst>
+          </a:blip>
+          <a:srcRect l="30137" r="24497" b="1996"/>
+          <a:stretch/>
+        </p:blipFill>
+        <p:spPr>
+          <a:xfrm>
+            <a:off x="20" y="10"/>
+            <a:ext cx="2734036" cy="6867719"/>
+          </a:xfrm>
+          <a:custGeom>
+            <a:avLst/>
+            <a:gdLst>
+              <a:gd name="connsiteX0" fmla="*/ 0 w 2734056"/>
+              <a:gd name="connsiteY0" fmla="*/ 0 h 6858000"/>
+              <a:gd name="connsiteX1" fmla="*/ 1674254 w 2734056"/>
+              <a:gd name="connsiteY1" fmla="*/ 0 h 6858000"/>
+              <a:gd name="connsiteX2" fmla="*/ 2734056 w 2734056"/>
+              <a:gd name="connsiteY2" fmla="*/ 6850199 h 6858000"/>
+              <a:gd name="connsiteX3" fmla="*/ 2734056 w 2734056"/>
+              <a:gd name="connsiteY3" fmla="*/ 6858000 h 6858000"/>
+              <a:gd name="connsiteX4" fmla="*/ 461457 w 2734056"/>
+              <a:gd name="connsiteY4" fmla="*/ 6858000 h 6858000"/>
+              <a:gd name="connsiteX5" fmla="*/ 0 w 2734056"/>
+              <a:gd name="connsiteY5" fmla="*/ 4134118 h 6858000"/>
+            </a:gdLst>
+            <a:ahLst/>
+            <a:cxnLst>
+              <a:cxn ang="0">
+                <a:pos x="connsiteX0" y="connsiteY0"/>
+              </a:cxn>
+              <a:cxn ang="0">
+                <a:pos x="connsiteX1" y="connsiteY1"/>
+              </a:cxn>
+              <a:cxn ang="0">
+                <a:pos x="connsiteX2" y="connsiteY2"/>
+              </a:cxn>
+              <a:cxn ang="0">
+                <a:pos x="connsiteX3" y="connsiteY3"/>
+              </a:cxn>
+              <a:cxn ang="0">
+                <a:pos x="connsiteX4" y="connsiteY4"/>
+              </a:cxn>
+              <a:cxn ang="0">
+                <a:pos x="connsiteX5" y="connsiteY5"/>
+              </a:cxn>
+            </a:cxnLst>
+            <a:rect l="l" t="t" r="r" b="b"/>
+            <a:pathLst>
+              <a:path w="2734056" h="6858000">
+                <a:moveTo>
+                  <a:pt x="0" y="0"/>
+                </a:moveTo>
+                <a:lnTo>
+                  <a:pt x="1674254" y="0"/>
+                </a:lnTo>
+                <a:lnTo>
+                  <a:pt x="2734056" y="6850199"/>
+                </a:lnTo>
+                <a:lnTo>
+                  <a:pt x="2734056" y="6858000"/>
+                </a:lnTo>
+                <a:lnTo>
+                  <a:pt x="461457" y="6858000"/>
+                </a:lnTo>
+                <a:lnTo>
+                  <a:pt x="0" y="4134118"/>
+                </a:lnTo>
+                <a:close/>
+              </a:path>
+            </a:pathLst>
+          </a:custGeom>
+        </p:spPr>
+      </p:pic>
+      <p:sp>
+        <p:nvSpPr>
+          <p:cNvPr id="3" name="Content Placeholder 2">
+            <a:extLst>
+              <a:ext uri="{FF2B5EF4-FFF2-40B4-BE49-F238E27FC236}">
+                <a16:creationId xmlns:a16="http://schemas.microsoft.com/office/drawing/2014/main" id="{C47F41CA-2A00-4472-8AC3-C94817791AF8}"/>
+              </a:ext>
+            </a:extLst>
+          </p:cNvPr>
+          <p:cNvSpPr>
+            <a:spLocks noGrp="1"/>
+          </p:cNvSpPr>
+          <p:nvPr>
+            <p:ph idx="1"/>
+          </p:nvPr>
+        </p:nvSpPr>
+        <p:spPr>
+          <a:xfrm>
+            <a:off x="2849562" y="2160589"/>
+            <a:ext cx="6424440" cy="3880773"/>
+          </a:xfrm>
+        </p:spPr>
+        <p:txBody>
+          <a:bodyPr>
+            <a:normAutofit/>
+          </a:bodyPr>
+          <a:lstStyle/>
+          <a:p>
+            <a:r>
+              <a:rPr lang="en-US" dirty="0"/>
+              <a:t>Personality:</a:t>
+            </a:r>
+            <a:br>
+              <a:rPr lang="en-US" dirty="0"/>
+            </a:br>
+            <a:r>
+              <a:rPr lang="en-US" dirty="0"/>
+              <a:t>Loving father, great friend and teacher, always enjoys learning something new.</a:t>
+            </a:r>
+          </a:p>
+          <a:p>
+            <a:r>
+              <a:rPr lang="en-US" dirty="0"/>
+              <a:t>Social environment:</a:t>
+            </a:r>
+            <a:br>
+              <a:rPr lang="en-US" dirty="0"/>
+            </a:br>
+            <a:r>
+              <a:rPr lang="en-US" dirty="0"/>
+              <a:t>Known and respected member of the company, has been working there almost since the beginning. Never misses a social occasion</a:t>
+            </a:r>
+          </a:p>
+          <a:p>
+            <a:r>
+              <a:rPr lang="en-US" dirty="0"/>
+              <a:t>Dreams:</a:t>
+            </a:r>
+          </a:p>
+          <a:p>
+            <a:pPr lvl="1"/>
+            <a:r>
+              <a:rPr lang="en-US" dirty="0"/>
+              <a:t>Becoming one of the company managers</a:t>
+            </a:r>
+          </a:p>
+          <a:p>
+            <a:pPr lvl="1"/>
+            <a:r>
+              <a:rPr lang="en-US" dirty="0"/>
+              <a:t>Teaching his daughter how to fish</a:t>
+            </a:r>
+          </a:p>
+        </p:txBody>
+      </p:sp>
+    </p:spTree>
+    <p:extLst>
+      <p:ext uri="{BB962C8B-B14F-4D97-AF65-F5344CB8AC3E}">
+        <p14:creationId xmlns:p14="http://schemas.microsoft.com/office/powerpoint/2010/main" val="2460199715"/>
+      </p:ext>
+    </p:extLst>
+  </p:cSld>
+  <p:clrMapOvr>
+    <a:masterClrMapping/>
+  </p:clrMapOvr>
+</p:sld>
+</file>
+
+<file path=ppt/slides/slide7.xml><?xml version="1.0" encoding="utf-8"?>
 <p:sld xmlns:a="http://schemas.openxmlformats.org/drawingml/2006/main" xmlns:r="http://schemas.openxmlformats.org/officeDocument/2006/relationships" xmlns:p="http://schemas.openxmlformats.org/presentationml/2006/main">
   <p:cSld>
     <p:spTree>
@@ -7622,7 +8149,7 @@
 </p:sld>
 </file>
 
-<file path=ppt/slides/slide6.xml><?xml version="1.0" encoding="utf-8"?>
+<file path=ppt/slides/slide8.xml><?xml version="1.0" encoding="utf-8"?>
 <p:sld xmlns:a="http://schemas.openxmlformats.org/drawingml/2006/main" xmlns:r="http://schemas.openxmlformats.org/officeDocument/2006/relationships" xmlns:p="http://schemas.openxmlformats.org/presentationml/2006/main">
   <p:cSld>
     <p:spTree>
@@ -8095,7 +8622,7 @@
 </p:sld>
 </file>
 
-<file path=ppt/slides/slide7.xml><?xml version="1.0" encoding="utf-8"?>
+<file path=ppt/slides/slide9.xml><?xml version="1.0" encoding="utf-8"?>
 <p:sld xmlns:a="http://schemas.openxmlformats.org/drawingml/2006/main" xmlns:r="http://schemas.openxmlformats.org/officeDocument/2006/relationships" xmlns:p="http://schemas.openxmlformats.org/presentationml/2006/main">
   <p:cSld>
     <p:spTree>

</xml_diff>

<commit_message>
Added prototype introduction slides before live demo
</commit_message>
<xml_diff>
--- a/Presentation.pptx
+++ b/Presentation.pptx
@@ -20,6 +20,10 @@
     <p:sldId id="274" r:id="rId14"/>
     <p:sldId id="272" r:id="rId15"/>
     <p:sldId id="273" r:id="rId16"/>
+    <p:sldId id="275" r:id="rId17"/>
+    <p:sldId id="276" r:id="rId18"/>
+    <p:sldId id="277" r:id="rId19"/>
+    <p:sldId id="278" r:id="rId20"/>
   </p:sldIdLst>
   <p:sldSz cx="12192000" cy="6858000"/>
   <p:notesSz cx="6858000" cy="9144000"/>
@@ -871,7 +875,7 @@
           <a:p>
             <a:fld id="{C02C31D5-3281-4246-B14E-A29AB474AA1B}" type="datetimeFigureOut">
               <a:rPr lang="it-IT" smtClean="0"/>
-              <a:t>29/05/19</a:t>
+              <a:t>05/06/2019</a:t>
             </a:fld>
             <a:endParaRPr lang="it-IT"/>
           </a:p>
@@ -913,7 +917,7 @@
           <a:p>
             <a:fld id="{9305149E-4250-428E-BBA1-80371F05ECB4}" type="slidenum">
               <a:rPr lang="it-IT" smtClean="0"/>
-              <a:t>‹N›</a:t>
+              <a:t>‹#›</a:t>
             </a:fld>
             <a:endParaRPr lang="it-IT"/>
           </a:p>
@@ -1122,7 +1126,7 @@
           <a:p>
             <a:fld id="{C02C31D5-3281-4246-B14E-A29AB474AA1B}" type="datetimeFigureOut">
               <a:rPr lang="it-IT" smtClean="0"/>
-              <a:t>29/05/19</a:t>
+              <a:t>05/06/2019</a:t>
             </a:fld>
             <a:endParaRPr lang="it-IT"/>
           </a:p>
@@ -1164,7 +1168,7 @@
           <a:p>
             <a:fld id="{9305149E-4250-428E-BBA1-80371F05ECB4}" type="slidenum">
               <a:rPr lang="it-IT" smtClean="0"/>
-              <a:t>‹N›</a:t>
+              <a:t>‹#›</a:t>
             </a:fld>
             <a:endParaRPr lang="it-IT"/>
           </a:p>
@@ -1436,7 +1440,7 @@
           <a:p>
             <a:fld id="{C02C31D5-3281-4246-B14E-A29AB474AA1B}" type="datetimeFigureOut">
               <a:rPr lang="it-IT" smtClean="0"/>
-              <a:t>29/05/19</a:t>
+              <a:t>05/06/2019</a:t>
             </a:fld>
             <a:endParaRPr lang="it-IT"/>
           </a:p>
@@ -1478,7 +1482,7 @@
           <a:p>
             <a:fld id="{9305149E-4250-428E-BBA1-80371F05ECB4}" type="slidenum">
               <a:rPr lang="it-IT" smtClean="0"/>
-              <a:t>‹N›</a:t>
+              <a:t>‹#›</a:t>
             </a:fld>
             <a:endParaRPr lang="it-IT"/>
           </a:p>
@@ -1769,7 +1773,7 @@
           <a:p>
             <a:fld id="{C02C31D5-3281-4246-B14E-A29AB474AA1B}" type="datetimeFigureOut">
               <a:rPr lang="it-IT" smtClean="0"/>
-              <a:t>29/05/19</a:t>
+              <a:t>05/06/2019</a:t>
             </a:fld>
             <a:endParaRPr lang="it-IT"/>
           </a:p>
@@ -1811,7 +1815,7 @@
           <a:p>
             <a:fld id="{9305149E-4250-428E-BBA1-80371F05ECB4}" type="slidenum">
               <a:rPr lang="it-IT" smtClean="0"/>
-              <a:t>‹N›</a:t>
+              <a:t>‹#›</a:t>
             </a:fld>
             <a:endParaRPr lang="it-IT"/>
           </a:p>
@@ -2083,7 +2087,7 @@
           <a:p>
             <a:fld id="{C02C31D5-3281-4246-B14E-A29AB474AA1B}" type="datetimeFigureOut">
               <a:rPr lang="it-IT" smtClean="0"/>
-              <a:t>29/05/19</a:t>
+              <a:t>05/06/2019</a:t>
             </a:fld>
             <a:endParaRPr lang="it-IT"/>
           </a:p>
@@ -2125,7 +2129,7 @@
           <a:p>
             <a:fld id="{9305149E-4250-428E-BBA1-80371F05ECB4}" type="slidenum">
               <a:rPr lang="it-IT" smtClean="0"/>
-              <a:t>‹N›</a:t>
+              <a:t>‹#›</a:t>
             </a:fld>
             <a:endParaRPr lang="it-IT"/>
           </a:p>
@@ -2476,7 +2480,7 @@
           <a:p>
             <a:fld id="{C02C31D5-3281-4246-B14E-A29AB474AA1B}" type="datetimeFigureOut">
               <a:rPr lang="it-IT" smtClean="0"/>
-              <a:t>29/05/19</a:t>
+              <a:t>05/06/2019</a:t>
             </a:fld>
             <a:endParaRPr lang="it-IT"/>
           </a:p>
@@ -2518,7 +2522,7 @@
           <a:p>
             <a:fld id="{9305149E-4250-428E-BBA1-80371F05ECB4}" type="slidenum">
               <a:rPr lang="it-IT" smtClean="0"/>
-              <a:t>‹N›</a:t>
+              <a:t>‹#›</a:t>
             </a:fld>
             <a:endParaRPr lang="it-IT"/>
           </a:p>
@@ -2646,7 +2650,7 @@
           <a:p>
             <a:fld id="{C02C31D5-3281-4246-B14E-A29AB474AA1B}" type="datetimeFigureOut">
               <a:rPr lang="it-IT" smtClean="0"/>
-              <a:t>29/05/19</a:t>
+              <a:t>05/06/2019</a:t>
             </a:fld>
             <a:endParaRPr lang="it-IT"/>
           </a:p>
@@ -2688,7 +2692,7 @@
           <a:p>
             <a:fld id="{9305149E-4250-428E-BBA1-80371F05ECB4}" type="slidenum">
               <a:rPr lang="it-IT" smtClean="0"/>
-              <a:t>‹N›</a:t>
+              <a:t>‹#›</a:t>
             </a:fld>
             <a:endParaRPr lang="it-IT"/>
           </a:p>
@@ -2826,7 +2830,7 @@
           <a:p>
             <a:fld id="{C02C31D5-3281-4246-B14E-A29AB474AA1B}" type="datetimeFigureOut">
               <a:rPr lang="it-IT" smtClean="0"/>
-              <a:t>29/05/19</a:t>
+              <a:t>05/06/2019</a:t>
             </a:fld>
             <a:endParaRPr lang="it-IT"/>
           </a:p>
@@ -2868,7 +2872,7 @@
           <a:p>
             <a:fld id="{9305149E-4250-428E-BBA1-80371F05ECB4}" type="slidenum">
               <a:rPr lang="it-IT" smtClean="0"/>
-              <a:t>‹N›</a:t>
+              <a:t>‹#›</a:t>
             </a:fld>
             <a:endParaRPr lang="it-IT"/>
           </a:p>
@@ -2996,7 +3000,7 @@
           <a:p>
             <a:fld id="{C02C31D5-3281-4246-B14E-A29AB474AA1B}" type="datetimeFigureOut">
               <a:rPr lang="it-IT" smtClean="0"/>
-              <a:t>29/05/19</a:t>
+              <a:t>05/06/2019</a:t>
             </a:fld>
             <a:endParaRPr lang="it-IT"/>
           </a:p>
@@ -3038,7 +3042,7 @@
           <a:p>
             <a:fld id="{9305149E-4250-428E-BBA1-80371F05ECB4}" type="slidenum">
               <a:rPr lang="it-IT" smtClean="0"/>
-              <a:t>‹N›</a:t>
+              <a:t>‹#›</a:t>
             </a:fld>
             <a:endParaRPr lang="it-IT"/>
           </a:p>
@@ -3243,7 +3247,7 @@
           <a:p>
             <a:fld id="{C02C31D5-3281-4246-B14E-A29AB474AA1B}" type="datetimeFigureOut">
               <a:rPr lang="it-IT" smtClean="0"/>
-              <a:t>29/05/19</a:t>
+              <a:t>05/06/2019</a:t>
             </a:fld>
             <a:endParaRPr lang="it-IT"/>
           </a:p>
@@ -3285,7 +3289,7 @@
           <a:p>
             <a:fld id="{9305149E-4250-428E-BBA1-80371F05ECB4}" type="slidenum">
               <a:rPr lang="it-IT" smtClean="0"/>
-              <a:t>‹N›</a:t>
+              <a:t>‹#›</a:t>
             </a:fld>
             <a:endParaRPr lang="it-IT"/>
           </a:p>
@@ -3475,7 +3479,7 @@
           <a:p>
             <a:fld id="{C02C31D5-3281-4246-B14E-A29AB474AA1B}" type="datetimeFigureOut">
               <a:rPr lang="it-IT" smtClean="0"/>
-              <a:t>29/05/19</a:t>
+              <a:t>05/06/2019</a:t>
             </a:fld>
             <a:endParaRPr lang="it-IT"/>
           </a:p>
@@ -3517,7 +3521,7 @@
           <a:p>
             <a:fld id="{9305149E-4250-428E-BBA1-80371F05ECB4}" type="slidenum">
               <a:rPr lang="it-IT" smtClean="0"/>
-              <a:t>‹N›</a:t>
+              <a:t>‹#›</a:t>
             </a:fld>
             <a:endParaRPr lang="it-IT"/>
           </a:p>
@@ -3849,7 +3853,7 @@
           <a:p>
             <a:fld id="{C02C31D5-3281-4246-B14E-A29AB474AA1B}" type="datetimeFigureOut">
               <a:rPr lang="it-IT" smtClean="0"/>
-              <a:t>29/05/19</a:t>
+              <a:t>05/06/2019</a:t>
             </a:fld>
             <a:endParaRPr lang="it-IT"/>
           </a:p>
@@ -3891,7 +3895,7 @@
           <a:p>
             <a:fld id="{9305149E-4250-428E-BBA1-80371F05ECB4}" type="slidenum">
               <a:rPr lang="it-IT" smtClean="0"/>
-              <a:t>‹N›</a:t>
+              <a:t>‹#›</a:t>
             </a:fld>
             <a:endParaRPr lang="it-IT"/>
           </a:p>
@@ -3972,7 +3976,7 @@
           <a:p>
             <a:fld id="{C02C31D5-3281-4246-B14E-A29AB474AA1B}" type="datetimeFigureOut">
               <a:rPr lang="it-IT" smtClean="0"/>
-              <a:t>29/05/19</a:t>
+              <a:t>05/06/2019</a:t>
             </a:fld>
             <a:endParaRPr lang="it-IT"/>
           </a:p>
@@ -4014,7 +4018,7 @@
           <a:p>
             <a:fld id="{9305149E-4250-428E-BBA1-80371F05ECB4}" type="slidenum">
               <a:rPr lang="it-IT" smtClean="0"/>
-              <a:t>‹N›</a:t>
+              <a:t>‹#›</a:t>
             </a:fld>
             <a:endParaRPr lang="it-IT"/>
           </a:p>
@@ -4067,7 +4071,7 @@
           <a:p>
             <a:fld id="{C02C31D5-3281-4246-B14E-A29AB474AA1B}" type="datetimeFigureOut">
               <a:rPr lang="it-IT" smtClean="0"/>
-              <a:t>29/05/19</a:t>
+              <a:t>05/06/2019</a:t>
             </a:fld>
             <a:endParaRPr lang="it-IT"/>
           </a:p>
@@ -4109,7 +4113,7 @@
           <a:p>
             <a:fld id="{9305149E-4250-428E-BBA1-80371F05ECB4}" type="slidenum">
               <a:rPr lang="it-IT" smtClean="0"/>
-              <a:t>‹N›</a:t>
+              <a:t>‹#›</a:t>
             </a:fld>
             <a:endParaRPr lang="it-IT"/>
           </a:p>
@@ -4322,7 +4326,7 @@
           <a:p>
             <a:fld id="{C02C31D5-3281-4246-B14E-A29AB474AA1B}" type="datetimeFigureOut">
               <a:rPr lang="it-IT" smtClean="0"/>
-              <a:t>29/05/19</a:t>
+              <a:t>05/06/2019</a:t>
             </a:fld>
             <a:endParaRPr lang="it-IT"/>
           </a:p>
@@ -4364,7 +4368,7 @@
           <a:p>
             <a:fld id="{9305149E-4250-428E-BBA1-80371F05ECB4}" type="slidenum">
               <a:rPr lang="it-IT" smtClean="0"/>
-              <a:t>‹N›</a:t>
+              <a:t>‹#›</a:t>
             </a:fld>
             <a:endParaRPr lang="it-IT"/>
           </a:p>
@@ -4604,7 +4608,7 @@
           <a:p>
             <a:fld id="{9305149E-4250-428E-BBA1-80371F05ECB4}" type="slidenum">
               <a:rPr lang="it-IT" smtClean="0"/>
-              <a:t>‹N›</a:t>
+              <a:t>‹#›</a:t>
             </a:fld>
             <a:endParaRPr lang="it-IT"/>
           </a:p>
@@ -4627,7 +4631,7 @@
           <a:p>
             <a:fld id="{C02C31D5-3281-4246-B14E-A29AB474AA1B}" type="datetimeFigureOut">
               <a:rPr lang="it-IT" smtClean="0"/>
-              <a:t>29/05/19</a:t>
+              <a:t>05/06/2019</a:t>
             </a:fld>
             <a:endParaRPr lang="it-IT"/>
           </a:p>
@@ -5329,7 +5333,7 @@
           <a:p>
             <a:fld id="{C02C31D5-3281-4246-B14E-A29AB474AA1B}" type="datetimeFigureOut">
               <a:rPr lang="it-IT" smtClean="0"/>
-              <a:t>29/05/19</a:t>
+              <a:t>05/06/2019</a:t>
             </a:fld>
             <a:endParaRPr lang="it-IT"/>
           </a:p>
@@ -5405,7 +5409,7 @@
           <a:p>
             <a:fld id="{9305149E-4250-428E-BBA1-80371F05ECB4}" type="slidenum">
               <a:rPr lang="it-IT" smtClean="0"/>
-              <a:t>‹N›</a:t>
+              <a:t>‹#›</a:t>
             </a:fld>
             <a:endParaRPr lang="it-IT"/>
           </a:p>
@@ -7576,6 +7580,587 @@
     <p:extLst>
       <p:ext uri="{BB962C8B-B14F-4D97-AF65-F5344CB8AC3E}">
         <p14:creationId xmlns:p14="http://schemas.microsoft.com/office/powerpoint/2010/main" val="2079682537"/>
+      </p:ext>
+    </p:extLst>
+  </p:cSld>
+  <p:clrMapOvr>
+    <a:masterClrMapping/>
+  </p:clrMapOvr>
+</p:sld>
+</file>
+
+<file path=ppt/slides/slide16.xml><?xml version="1.0" encoding="utf-8"?>
+<p:sld xmlns:a="http://schemas.openxmlformats.org/drawingml/2006/main" xmlns:r="http://schemas.openxmlformats.org/officeDocument/2006/relationships" xmlns:p="http://schemas.openxmlformats.org/presentationml/2006/main">
+  <p:cSld>
+    <p:spTree>
+      <p:nvGrpSpPr>
+        <p:cNvPr id="1" name=""/>
+        <p:cNvGrpSpPr/>
+        <p:nvPr/>
+      </p:nvGrpSpPr>
+      <p:grpSpPr>
+        <a:xfrm>
+          <a:off x="0" y="0"/>
+          <a:ext cx="0" cy="0"/>
+          <a:chOff x="0" y="0"/>
+          <a:chExt cx="0" cy="0"/>
+        </a:xfrm>
+      </p:grpSpPr>
+      <p:sp>
+        <p:nvSpPr>
+          <p:cNvPr id="2" name="Title 1">
+            <a:extLst>
+              <a:ext uri="{FF2B5EF4-FFF2-40B4-BE49-F238E27FC236}">
+                <a16:creationId xmlns:a16="http://schemas.microsoft.com/office/drawing/2014/main" id="{49DF4F9A-04BC-4330-BC62-63223F2FE85F}"/>
+              </a:ext>
+            </a:extLst>
+          </p:cNvPr>
+          <p:cNvSpPr>
+            <a:spLocks noGrp="1"/>
+          </p:cNvSpPr>
+          <p:nvPr>
+            <p:ph type="ctrTitle"/>
+          </p:nvPr>
+        </p:nvSpPr>
+        <p:spPr/>
+        <p:txBody>
+          <a:bodyPr/>
+          <a:lstStyle/>
+          <a:p>
+            <a:r>
+              <a:rPr lang="en-US" dirty="0"/>
+              <a:t>Prototype – Mobile app</a:t>
+            </a:r>
+            <a:endParaRPr lang="it-IT" dirty="0"/>
+          </a:p>
+        </p:txBody>
+      </p:sp>
+      <p:sp>
+        <p:nvSpPr>
+          <p:cNvPr id="3" name="Subtitle 2">
+            <a:extLst>
+              <a:ext uri="{FF2B5EF4-FFF2-40B4-BE49-F238E27FC236}">
+                <a16:creationId xmlns:a16="http://schemas.microsoft.com/office/drawing/2014/main" id="{8D11B659-EF65-4990-87EF-566C1BE1B7D5}"/>
+              </a:ext>
+            </a:extLst>
+          </p:cNvPr>
+          <p:cNvSpPr>
+            <a:spLocks noGrp="1"/>
+          </p:cNvSpPr>
+          <p:nvPr>
+            <p:ph type="subTitle" idx="1"/>
+          </p:nvPr>
+        </p:nvSpPr>
+        <p:spPr/>
+        <p:txBody>
+          <a:bodyPr/>
+          <a:lstStyle/>
+          <a:p>
+            <a:endParaRPr lang="it-IT" dirty="0"/>
+          </a:p>
+        </p:txBody>
+      </p:sp>
+    </p:spTree>
+    <p:extLst>
+      <p:ext uri="{BB962C8B-B14F-4D97-AF65-F5344CB8AC3E}">
+        <p14:creationId xmlns:p14="http://schemas.microsoft.com/office/powerpoint/2010/main" val="3612694838"/>
+      </p:ext>
+    </p:extLst>
+  </p:cSld>
+  <p:clrMapOvr>
+    <a:masterClrMapping/>
+  </p:clrMapOvr>
+</p:sld>
+</file>
+
+<file path=ppt/slides/slide17.xml><?xml version="1.0" encoding="utf-8"?>
+<p:sld xmlns:a="http://schemas.openxmlformats.org/drawingml/2006/main" xmlns:r="http://schemas.openxmlformats.org/officeDocument/2006/relationships" xmlns:p="http://schemas.openxmlformats.org/presentationml/2006/main">
+  <p:cSld>
+    <p:bg>
+      <p:bgPr>
+        <a:solidFill>
+          <a:schemeClr val="bg1"/>
+        </a:solidFill>
+        <a:effectLst/>
+      </p:bgPr>
+    </p:bg>
+    <p:spTree>
+      <p:nvGrpSpPr>
+        <p:cNvPr id="1" name=""/>
+        <p:cNvGrpSpPr/>
+        <p:nvPr/>
+      </p:nvGrpSpPr>
+      <p:grpSpPr>
+        <a:xfrm>
+          <a:off x="0" y="0"/>
+          <a:ext cx="0" cy="0"/>
+          <a:chOff x="0" y="0"/>
+          <a:chExt cx="0" cy="0"/>
+        </a:xfrm>
+      </p:grpSpPr>
+      <p:sp>
+        <p:nvSpPr>
+          <p:cNvPr id="2" name="Title 1">
+            <a:extLst>
+              <a:ext uri="{FF2B5EF4-FFF2-40B4-BE49-F238E27FC236}">
+                <a16:creationId xmlns:a16="http://schemas.microsoft.com/office/drawing/2014/main" id="{74B9AE9D-0346-4BAF-874B-8950824DDD21}"/>
+              </a:ext>
+            </a:extLst>
+          </p:cNvPr>
+          <p:cNvSpPr>
+            <a:spLocks noGrp="1"/>
+          </p:cNvSpPr>
+          <p:nvPr>
+            <p:ph type="title"/>
+          </p:nvPr>
+        </p:nvSpPr>
+        <p:spPr>
+          <a:xfrm>
+            <a:off x="675064" y="609600"/>
+            <a:ext cx="4416699" cy="1320800"/>
+          </a:xfrm>
+        </p:spPr>
+        <p:txBody>
+          <a:bodyPr anchor="ctr">
+            <a:normAutofit/>
+          </a:bodyPr>
+          <a:lstStyle/>
+          <a:p>
+            <a:r>
+              <a:rPr lang="en-US" sz="4000" dirty="0"/>
+              <a:t>Technologies used</a:t>
+            </a:r>
+            <a:endParaRPr lang="it-IT" sz="4000" dirty="0"/>
+          </a:p>
+        </p:txBody>
+      </p:sp>
+      <p:pic>
+        <p:nvPicPr>
+          <p:cNvPr id="1031" name="Picture 2" descr="Image result for firebase logo">
+            <a:extLst>
+              <a:ext uri="{FF2B5EF4-FFF2-40B4-BE49-F238E27FC236}">
+                <a16:creationId xmlns:a16="http://schemas.microsoft.com/office/drawing/2014/main" id="{B29DAD6E-4B35-40D7-B52A-D0310A8311DB}"/>
+              </a:ext>
+            </a:extLst>
+          </p:cNvPr>
+          <p:cNvPicPr>
+            <a:picLocks noChangeAspect="1" noChangeArrowheads="1"/>
+          </p:cNvPicPr>
+          <p:nvPr/>
+        </p:nvPicPr>
+        <p:blipFill>
+          <a:blip r:embed="rId2">
+            <a:extLst>
+              <a:ext uri="{BEBA8EAE-BF5A-486C-A8C5-ECC9F3942E4B}">
+                <a14:imgProps xmlns:a14="http://schemas.microsoft.com/office/drawing/2010/main">
+                  <a14:imgLayer r:embed="rId3">
+                    <a14:imgEffect>
+                      <a14:backgroundRemoval t="7664" b="89907" l="10000" r="90000">
+                        <a14:foregroundMark x1="37455" y1="7664" x2="37455" y2="7664"/>
+                        <a14:foregroundMark x1="15091" y1="81495" x2="15091" y2="81495"/>
+                        <a14:foregroundMark x1="25455" y1="84299" x2="25455" y2="84299"/>
+                        <a14:foregroundMark x1="25091" y1="75888" x2="25091" y2="75888"/>
+                        <a14:foregroundMark x1="30364" y1="82243" x2="30364" y2="82243"/>
+                        <a14:foregroundMark x1="37818" y1="83551" x2="37818" y2="83551"/>
+                        <a14:foregroundMark x1="48727" y1="80374" x2="48727" y2="80374"/>
+                        <a14:foregroundMark x1="65818" y1="82056" x2="65818" y2="82056"/>
+                        <a14:foregroundMark x1="71091" y1="82430" x2="71091" y2="82430"/>
+                        <a14:foregroundMark x1="81273" y1="83364" x2="81273" y2="83364"/>
+                        <a14:foregroundMark x1="81273" y1="83364" x2="81273" y2="83364"/>
+                        <a14:foregroundMark x1="81273" y1="83364" x2="81273" y2="83364"/>
+                        <a14:foregroundMark x1="81636" y1="83364" x2="81636" y2="83364"/>
+                        <a14:foregroundMark x1="81636" y1="83364" x2="81818" y2="83364"/>
+                      </a14:backgroundRemoval>
+                    </a14:imgEffect>
+                  </a14:imgLayer>
+                </a14:imgProps>
+              </a:ext>
+              <a:ext uri="{28A0092B-C50C-407E-A947-70E740481C1C}">
+                <a14:useLocalDpi xmlns:a14="http://schemas.microsoft.com/office/drawing/2010/main" val="0"/>
+              </a:ext>
+            </a:extLst>
+          </a:blip>
+          <a:stretch>
+            <a:fillRect/>
+          </a:stretch>
+        </p:blipFill>
+        <p:spPr bwMode="auto">
+          <a:xfrm>
+            <a:off x="7252007" y="609600"/>
+            <a:ext cx="2675318" cy="2601747"/>
+          </a:xfrm>
+          <a:prstGeom prst="rect">
+            <a:avLst/>
+          </a:prstGeom>
+          <a:noFill/>
+          <a:extLst>
+            <a:ext uri="{909E8E84-426E-40DD-AFC4-6F175D3DCCD1}">
+              <a14:hiddenFill xmlns:a14="http://schemas.microsoft.com/office/drawing/2010/main">
+                <a:solidFill>
+                  <a:srgbClr val="FFFFFF"/>
+                </a:solidFill>
+              </a14:hiddenFill>
+            </a:ext>
+          </a:extLst>
+        </p:spPr>
+      </p:pic>
+      <p:pic>
+        <p:nvPicPr>
+          <p:cNvPr id="1028" name="Picture 4" descr="Image result for android logo png">
+            <a:extLst>
+              <a:ext uri="{FF2B5EF4-FFF2-40B4-BE49-F238E27FC236}">
+                <a16:creationId xmlns:a16="http://schemas.microsoft.com/office/drawing/2014/main" id="{2B3AA688-095E-4C09-A27E-4E4FEADF74D4}"/>
+              </a:ext>
+            </a:extLst>
+          </p:cNvPr>
+          <p:cNvPicPr>
+            <a:picLocks noChangeAspect="1" noChangeArrowheads="1"/>
+          </p:cNvPicPr>
+          <p:nvPr/>
+        </p:nvPicPr>
+        <p:blipFill>
+          <a:blip r:embed="rId4">
+            <a:extLst>
+              <a:ext uri="{28A0092B-C50C-407E-A947-70E740481C1C}">
+                <a14:useLocalDpi xmlns:a14="http://schemas.microsoft.com/office/drawing/2010/main" val="0"/>
+              </a:ext>
+            </a:extLst>
+          </a:blip>
+          <a:stretch>
+            <a:fillRect/>
+          </a:stretch>
+        </p:blipFill>
+        <p:spPr bwMode="auto">
+          <a:xfrm>
+            <a:off x="7288496" y="3439020"/>
+            <a:ext cx="2602341" cy="2602341"/>
+          </a:xfrm>
+          <a:prstGeom prst="rect">
+            <a:avLst/>
+          </a:prstGeom>
+          <a:noFill/>
+          <a:extLst>
+            <a:ext uri="{909E8E84-426E-40DD-AFC4-6F175D3DCCD1}">
+              <a14:hiddenFill xmlns:a14="http://schemas.microsoft.com/office/drawing/2010/main">
+                <a:solidFill>
+                  <a:srgbClr val="FFFFFF"/>
+                </a:solidFill>
+              </a14:hiddenFill>
+            </a:ext>
+          </a:extLst>
+        </p:spPr>
+      </p:pic>
+      <p:sp>
+        <p:nvSpPr>
+          <p:cNvPr id="6" name="Content Placeholder 5">
+            <a:extLst>
+              <a:ext uri="{FF2B5EF4-FFF2-40B4-BE49-F238E27FC236}">
+                <a16:creationId xmlns:a16="http://schemas.microsoft.com/office/drawing/2014/main" id="{10BD915A-6E28-45FA-934D-39A45FF013AB}"/>
+              </a:ext>
+            </a:extLst>
+          </p:cNvPr>
+          <p:cNvSpPr>
+            <a:spLocks noGrp="1"/>
+          </p:cNvSpPr>
+          <p:nvPr>
+            <p:ph idx="1"/>
+          </p:nvPr>
+        </p:nvSpPr>
+        <p:spPr>
+          <a:xfrm>
+            <a:off x="677333" y="2160589"/>
+            <a:ext cx="6656527" cy="3880773"/>
+          </a:xfrm>
+        </p:spPr>
+        <p:txBody>
+          <a:bodyPr>
+            <a:normAutofit fontScale="92500" lnSpcReduction="10000"/>
+          </a:bodyPr>
+          <a:lstStyle/>
+          <a:p>
+            <a:r>
+              <a:rPr lang="en-US" sz="2400" dirty="0"/>
+              <a:t>Android (OS):</a:t>
+            </a:r>
+          </a:p>
+          <a:p>
+            <a:pPr lvl="1"/>
+            <a:r>
+              <a:rPr lang="en-US" sz="2000" dirty="0"/>
+              <a:t>Free to use and develop.</a:t>
+            </a:r>
+          </a:p>
+          <a:p>
+            <a:pPr lvl="1"/>
+            <a:r>
+              <a:rPr lang="it-IT" sz="2000" dirty="0"/>
+              <a:t>Over 75% market share.</a:t>
+            </a:r>
+          </a:p>
+          <a:p>
+            <a:pPr lvl="1"/>
+            <a:r>
+              <a:rPr lang="en-GB" sz="2000" dirty="0"/>
+              <a:t>Previous</a:t>
+            </a:r>
+            <a:r>
+              <a:rPr lang="it-IT" sz="2000" dirty="0"/>
+              <a:t> </a:t>
+            </a:r>
+            <a:r>
+              <a:rPr lang="en-GB" sz="2000" dirty="0"/>
+              <a:t>experience.</a:t>
+            </a:r>
+          </a:p>
+          <a:p>
+            <a:pPr lvl="1"/>
+            <a:endParaRPr lang="en-GB" sz="2000" dirty="0"/>
+          </a:p>
+          <a:p>
+            <a:r>
+              <a:rPr lang="en-GB" sz="2400" dirty="0"/>
+              <a:t>Firebase (DB &amp; more):</a:t>
+            </a:r>
+          </a:p>
+          <a:p>
+            <a:pPr lvl="1"/>
+            <a:r>
+              <a:rPr lang="en-GB" sz="2000" dirty="0"/>
+              <a:t>Free for small scale projects.</a:t>
+            </a:r>
+          </a:p>
+          <a:p>
+            <a:pPr lvl="1"/>
+            <a:r>
+              <a:rPr lang="en-GB" sz="2000" dirty="0"/>
+              <a:t>Easy to integrate.</a:t>
+            </a:r>
+          </a:p>
+          <a:p>
+            <a:pPr lvl="1"/>
+            <a:r>
+              <a:rPr lang="en-GB" sz="2000" dirty="0"/>
+              <a:t>Many functionalities (database, notifications, storage, authentication, cloud functions)</a:t>
+            </a:r>
+          </a:p>
+        </p:txBody>
+      </p:sp>
+    </p:spTree>
+    <p:extLst>
+      <p:ext uri="{BB962C8B-B14F-4D97-AF65-F5344CB8AC3E}">
+        <p14:creationId xmlns:p14="http://schemas.microsoft.com/office/powerpoint/2010/main" val="4279310250"/>
+      </p:ext>
+    </p:extLst>
+  </p:cSld>
+  <p:clrMapOvr>
+    <a:masterClrMapping/>
+  </p:clrMapOvr>
+</p:sld>
+</file>
+
+<file path=ppt/slides/slide18.xml><?xml version="1.0" encoding="utf-8"?>
+<p:sld xmlns:a="http://schemas.openxmlformats.org/drawingml/2006/main" xmlns:r="http://schemas.openxmlformats.org/officeDocument/2006/relationships" xmlns:p="http://schemas.openxmlformats.org/presentationml/2006/main">
+  <p:cSld>
+    <p:spTree>
+      <p:nvGrpSpPr>
+        <p:cNvPr id="1" name=""/>
+        <p:cNvGrpSpPr/>
+        <p:nvPr/>
+      </p:nvGrpSpPr>
+      <p:grpSpPr>
+        <a:xfrm>
+          <a:off x="0" y="0"/>
+          <a:ext cx="0" cy="0"/>
+          <a:chOff x="0" y="0"/>
+          <a:chExt cx="0" cy="0"/>
+        </a:xfrm>
+      </p:grpSpPr>
+      <p:sp>
+        <p:nvSpPr>
+          <p:cNvPr id="2" name="Title 1">
+            <a:extLst>
+              <a:ext uri="{FF2B5EF4-FFF2-40B4-BE49-F238E27FC236}">
+                <a16:creationId xmlns:a16="http://schemas.microsoft.com/office/drawing/2014/main" id="{A0647A44-786F-4A3B-A57E-8B8541ED64B4}"/>
+              </a:ext>
+            </a:extLst>
+          </p:cNvPr>
+          <p:cNvSpPr>
+            <a:spLocks noGrp="1"/>
+          </p:cNvSpPr>
+          <p:nvPr>
+            <p:ph type="title"/>
+          </p:nvPr>
+        </p:nvSpPr>
+        <p:spPr/>
+        <p:txBody>
+          <a:bodyPr>
+            <a:normAutofit/>
+          </a:bodyPr>
+          <a:lstStyle/>
+          <a:p>
+            <a:r>
+              <a:rPr lang="en-US" sz="4000" dirty="0"/>
+              <a:t>Goal of the application</a:t>
+            </a:r>
+            <a:endParaRPr lang="it-IT" sz="4000" dirty="0"/>
+          </a:p>
+        </p:txBody>
+      </p:sp>
+      <p:sp>
+        <p:nvSpPr>
+          <p:cNvPr id="3" name="Content Placeholder 2">
+            <a:extLst>
+              <a:ext uri="{FF2B5EF4-FFF2-40B4-BE49-F238E27FC236}">
+                <a16:creationId xmlns:a16="http://schemas.microsoft.com/office/drawing/2014/main" id="{996E71DE-8D0D-4A90-971C-6A32F83A7B19}"/>
+              </a:ext>
+            </a:extLst>
+          </p:cNvPr>
+          <p:cNvSpPr>
+            <a:spLocks noGrp="1"/>
+          </p:cNvSpPr>
+          <p:nvPr>
+            <p:ph idx="1"/>
+          </p:nvPr>
+        </p:nvSpPr>
+        <p:spPr>
+          <a:xfrm>
+            <a:off x="677334" y="2160589"/>
+            <a:ext cx="8596668" cy="4490468"/>
+          </a:xfrm>
+        </p:spPr>
+        <p:txBody>
+          <a:bodyPr>
+            <a:normAutofit lnSpcReduction="10000"/>
+          </a:bodyPr>
+          <a:lstStyle/>
+          <a:p>
+            <a:r>
+              <a:rPr lang="en-US" sz="2200" dirty="0"/>
+              <a:t>A platform for the local fishing experts to:</a:t>
+            </a:r>
+          </a:p>
+          <a:p>
+            <a:pPr lvl="1"/>
+            <a:r>
+              <a:rPr lang="en-US" sz="2000" dirty="0"/>
+              <a:t>Offer fishing lessons.</a:t>
+            </a:r>
+          </a:p>
+          <a:p>
+            <a:pPr lvl="1"/>
+            <a:r>
+              <a:rPr lang="en-US" sz="2000" dirty="0"/>
+              <a:t>Equipment rental.</a:t>
+            </a:r>
+          </a:p>
+          <a:p>
+            <a:pPr lvl="1"/>
+            <a:r>
+              <a:rPr lang="en-US" sz="2000" dirty="0"/>
+              <a:t>Add fishing spots on the map.</a:t>
+            </a:r>
+          </a:p>
+          <a:p>
+            <a:endParaRPr lang="en-US" sz="2200" dirty="0"/>
+          </a:p>
+          <a:p>
+            <a:r>
+              <a:rPr lang="en-US" sz="2200" dirty="0"/>
+              <a:t>A place where tourists can:</a:t>
+            </a:r>
+          </a:p>
+          <a:p>
+            <a:pPr lvl="1"/>
+            <a:r>
+              <a:rPr lang="en-US" sz="2000" dirty="0"/>
+              <a:t>Make reservations for a service.</a:t>
+            </a:r>
+          </a:p>
+          <a:p>
+            <a:pPr lvl="1"/>
+            <a:r>
+              <a:rPr lang="en-US" sz="2000" dirty="0"/>
+              <a:t>Leave reviews.</a:t>
+            </a:r>
+          </a:p>
+          <a:p>
+            <a:pPr lvl="1"/>
+            <a:endParaRPr lang="en-US" sz="2000" dirty="0"/>
+          </a:p>
+          <a:p>
+            <a:r>
+              <a:rPr lang="en-US" sz="2200" dirty="0"/>
+              <a:t>Users customers should be able to communicate with employees and vice-versa.</a:t>
+            </a:r>
+          </a:p>
+          <a:p>
+            <a:endParaRPr lang="it-IT" sz="2200" dirty="0"/>
+          </a:p>
+        </p:txBody>
+      </p:sp>
+    </p:spTree>
+    <p:extLst>
+      <p:ext uri="{BB962C8B-B14F-4D97-AF65-F5344CB8AC3E}">
+        <p14:creationId xmlns:p14="http://schemas.microsoft.com/office/powerpoint/2010/main" val="1668486138"/>
+      </p:ext>
+    </p:extLst>
+  </p:cSld>
+  <p:clrMapOvr>
+    <a:masterClrMapping/>
+  </p:clrMapOvr>
+</p:sld>
+</file>
+
+<file path=ppt/slides/slide19.xml><?xml version="1.0" encoding="utf-8"?>
+<p:sld xmlns:a="http://schemas.openxmlformats.org/drawingml/2006/main" xmlns:r="http://schemas.openxmlformats.org/officeDocument/2006/relationships" xmlns:p="http://schemas.openxmlformats.org/presentationml/2006/main">
+  <p:cSld>
+    <p:spTree>
+      <p:nvGrpSpPr>
+        <p:cNvPr id="1" name=""/>
+        <p:cNvGrpSpPr/>
+        <p:nvPr/>
+      </p:nvGrpSpPr>
+      <p:grpSpPr>
+        <a:xfrm>
+          <a:off x="0" y="0"/>
+          <a:ext cx="0" cy="0"/>
+          <a:chOff x="0" y="0"/>
+          <a:chExt cx="0" cy="0"/>
+        </a:xfrm>
+      </p:grpSpPr>
+      <p:sp>
+        <p:nvSpPr>
+          <p:cNvPr id="2" name="Title 1">
+            <a:extLst>
+              <a:ext uri="{FF2B5EF4-FFF2-40B4-BE49-F238E27FC236}">
+                <a16:creationId xmlns:a16="http://schemas.microsoft.com/office/drawing/2014/main" id="{5525D848-4313-4245-8ED5-617E2E36E024}"/>
+              </a:ext>
+            </a:extLst>
+          </p:cNvPr>
+          <p:cNvSpPr>
+            <a:spLocks noGrp="1"/>
+          </p:cNvSpPr>
+          <p:nvPr>
+            <p:ph type="ctrTitle"/>
+          </p:nvPr>
+        </p:nvSpPr>
+        <p:spPr/>
+        <p:txBody>
+          <a:bodyPr/>
+          <a:lstStyle/>
+          <a:p>
+            <a:r>
+              <a:rPr lang="en-US" dirty="0"/>
+              <a:t>Live demo</a:t>
+            </a:r>
+            <a:endParaRPr lang="it-IT" dirty="0"/>
+          </a:p>
+        </p:txBody>
+      </p:sp>
+    </p:spTree>
+    <p:extLst>
+      <p:ext uri="{BB962C8B-B14F-4D97-AF65-F5344CB8AC3E}">
+        <p14:creationId xmlns:p14="http://schemas.microsoft.com/office/powerpoint/2010/main" val="1754511702"/>
       </p:ext>
     </p:extLst>
   </p:cSld>

</xml_diff>